<commit_message>
fix: slide week 5
</commit_message>
<xml_diff>
--- a/5 - Week/5 - Geometry with Python.pptx
+++ b/5 - Week/5 - Geometry with Python.pptx
@@ -264,20 +264,20 @@
 <file path=ppt/changesInfos/changesInfo1.xml><?xml version="1.0" encoding="utf-8"?>
 <pc:chgInfo xmlns:a="http://schemas.openxmlformats.org/drawingml/2006/main" xmlns:r="http://schemas.openxmlformats.org/officeDocument/2006/relationships" xmlns:ac="http://schemas.microsoft.com/office/drawing/2013/main/command" xmlns:pc="http://schemas.microsoft.com/office/powerpoint/2013/main/command">
   <pc:docChgLst>
-    <pc:chgData name="Lipani, Aldo" userId="3d811883-7188-4056-86e4-ebeb30c53017" providerId="ADAL" clId="{667C833C-76E4-6248-A772-9C8DA58B4060}"/>
+    <pc:chgData name="Lipani, Aldo" userId="3d811883-7188-4056-86e4-ebeb30c53017" providerId="ADAL" clId="{1457813F-0612-9043-9EAA-808A886FE91F}"/>
     <pc:docChg chg="undo custSel addSld delSld modSld sldOrd">
-      <pc:chgData name="Lipani, Aldo" userId="3d811883-7188-4056-86e4-ebeb30c53017" providerId="ADAL" clId="{667C833C-76E4-6248-A772-9C8DA58B4060}" dt="2020-10-04T19:09:26.501" v="3402" actId="20577"/>
+      <pc:chgData name="Lipani, Aldo" userId="3d811883-7188-4056-86e4-ebeb30c53017" providerId="ADAL" clId="{1457813F-0612-9043-9EAA-808A886FE91F}" dt="2019-10-21T15:46:51.902" v="8071" actId="404"/>
       <pc:docMkLst>
         <pc:docMk/>
       </pc:docMkLst>
-      <pc:sldChg chg="modSp mod">
-        <pc:chgData name="Lipani, Aldo" userId="3d811883-7188-4056-86e4-ebeb30c53017" providerId="ADAL" clId="{667C833C-76E4-6248-A772-9C8DA58B4060}" dt="2020-10-03T21:57:44.800" v="3255" actId="20577"/>
+      <pc:sldChg chg="modSp">
+        <pc:chgData name="Lipani, Aldo" userId="3d811883-7188-4056-86e4-ebeb30c53017" providerId="ADAL" clId="{1457813F-0612-9043-9EAA-808A886FE91F}" dt="2019-10-21T11:13:11.745" v="7665" actId="20577"/>
         <pc:sldMkLst>
           <pc:docMk/>
           <pc:sldMk cId="3972362767" sldId="555"/>
         </pc:sldMkLst>
         <pc:spChg chg="mod">
-          <ac:chgData name="Lipani, Aldo" userId="3d811883-7188-4056-86e4-ebeb30c53017" providerId="ADAL" clId="{667C833C-76E4-6248-A772-9C8DA58B4060}" dt="2020-10-03T21:57:44.800" v="3255" actId="20577"/>
+          <ac:chgData name="Lipani, Aldo" userId="3d811883-7188-4056-86e4-ebeb30c53017" providerId="ADAL" clId="{1457813F-0612-9043-9EAA-808A886FE91F}" dt="2019-10-21T11:13:11.745" v="7665" actId="20577"/>
           <ac:spMkLst>
             <pc:docMk/>
             <pc:sldMk cId="3972362767" sldId="555"/>
@@ -285,1213 +285,33 @@
           </ac:spMkLst>
         </pc:spChg>
       </pc:sldChg>
-      <pc:sldChg chg="del">
-        <pc:chgData name="Lipani, Aldo" userId="3d811883-7188-4056-86e4-ebeb30c53017" providerId="ADAL" clId="{667C833C-76E4-6248-A772-9C8DA58B4060}" dt="2020-10-03T20:17:52.467" v="3173" actId="2696"/>
+      <pc:sldChg chg="modSp">
+        <pc:chgData name="Lipani, Aldo" userId="3d811883-7188-4056-86e4-ebeb30c53017" providerId="ADAL" clId="{1457813F-0612-9043-9EAA-808A886FE91F}" dt="2019-10-21T07:17:35.157" v="7540" actId="20577"/>
         <pc:sldMkLst>
           <pc:docMk/>
           <pc:sldMk cId="1434595258" sldId="774"/>
         </pc:sldMkLst>
-      </pc:sldChg>
-      <pc:sldChg chg="del">
-        <pc:chgData name="Lipani, Aldo" userId="3d811883-7188-4056-86e4-ebeb30c53017" providerId="ADAL" clId="{667C833C-76E4-6248-A772-9C8DA58B4060}" dt="2020-10-03T14:57:13.887" v="5" actId="2696"/>
-        <pc:sldMkLst>
-          <pc:docMk/>
-          <pc:sldMk cId="117916467" sldId="866"/>
-        </pc:sldMkLst>
-      </pc:sldChg>
-      <pc:sldChg chg="modSp add mod">
-        <pc:chgData name="Lipani, Aldo" userId="3d811883-7188-4056-86e4-ebeb30c53017" providerId="ADAL" clId="{667C833C-76E4-6248-A772-9C8DA58B4060}" dt="2020-10-03T15:10:17.075" v="42" actId="20577"/>
-        <pc:sldMkLst>
-          <pc:docMk/>
-          <pc:sldMk cId="3011458422" sldId="866"/>
-        </pc:sldMkLst>
         <pc:spChg chg="mod">
-          <ac:chgData name="Lipani, Aldo" userId="3d811883-7188-4056-86e4-ebeb30c53017" providerId="ADAL" clId="{667C833C-76E4-6248-A772-9C8DA58B4060}" dt="2020-10-03T15:10:17.075" v="42" actId="20577"/>
-          <ac:spMkLst>
-            <pc:docMk/>
-            <pc:sldMk cId="3011458422" sldId="866"/>
-            <ac:spMk id="9" creationId="{3AB3BC18-199B-C44F-B339-573547996898}"/>
-          </ac:spMkLst>
-        </pc:spChg>
-      </pc:sldChg>
-      <pc:sldChg chg="add">
-        <pc:chgData name="Lipani, Aldo" userId="3d811883-7188-4056-86e4-ebeb30c53017" providerId="ADAL" clId="{667C833C-76E4-6248-A772-9C8DA58B4060}" dt="2020-10-03T14:57:22.561" v="13"/>
-        <pc:sldMkLst>
-          <pc:docMk/>
-          <pc:sldMk cId="774799973" sldId="868"/>
-        </pc:sldMkLst>
-      </pc:sldChg>
-      <pc:sldChg chg="del">
-        <pc:chgData name="Lipani, Aldo" userId="3d811883-7188-4056-86e4-ebeb30c53017" providerId="ADAL" clId="{667C833C-76E4-6248-A772-9C8DA58B4060}" dt="2020-10-03T14:57:20.479" v="12" actId="2696"/>
-        <pc:sldMkLst>
-          <pc:docMk/>
-          <pc:sldMk cId="850156035" sldId="868"/>
-        </pc:sldMkLst>
-      </pc:sldChg>
-      <pc:sldChg chg="del">
-        <pc:chgData name="Lipani, Aldo" userId="3d811883-7188-4056-86e4-ebeb30c53017" providerId="ADAL" clId="{667C833C-76E4-6248-A772-9C8DA58B4060}" dt="2020-10-03T14:57:19.796" v="11" actId="2696"/>
-        <pc:sldMkLst>
-          <pc:docMk/>
-          <pc:sldMk cId="1139425063" sldId="875"/>
-        </pc:sldMkLst>
-      </pc:sldChg>
-      <pc:sldChg chg="add">
-        <pc:chgData name="Lipani, Aldo" userId="3d811883-7188-4056-86e4-ebeb30c53017" providerId="ADAL" clId="{667C833C-76E4-6248-A772-9C8DA58B4060}" dt="2020-10-03T14:57:22.561" v="13"/>
-        <pc:sldMkLst>
-          <pc:docMk/>
-          <pc:sldMk cId="1870394214" sldId="875"/>
-        </pc:sldMkLst>
-      </pc:sldChg>
-      <pc:sldChg chg="add">
-        <pc:chgData name="Lipani, Aldo" userId="3d811883-7188-4056-86e4-ebeb30c53017" providerId="ADAL" clId="{667C833C-76E4-6248-A772-9C8DA58B4060}" dt="2020-10-03T14:57:22.561" v="13"/>
-        <pc:sldMkLst>
-          <pc:docMk/>
-          <pc:sldMk cId="156753667" sldId="876"/>
-        </pc:sldMkLst>
-      </pc:sldChg>
-      <pc:sldChg chg="del">
-        <pc:chgData name="Lipani, Aldo" userId="3d811883-7188-4056-86e4-ebeb30c53017" providerId="ADAL" clId="{667C833C-76E4-6248-A772-9C8DA58B4060}" dt="2020-10-03T14:57:14.871" v="6" actId="2696"/>
-        <pc:sldMkLst>
-          <pc:docMk/>
-          <pc:sldMk cId="3508325250" sldId="876"/>
-        </pc:sldMkLst>
-      </pc:sldChg>
-      <pc:sldChg chg="add">
-        <pc:chgData name="Lipani, Aldo" userId="3d811883-7188-4056-86e4-ebeb30c53017" providerId="ADAL" clId="{667C833C-76E4-6248-A772-9C8DA58B4060}" dt="2020-10-03T14:57:22.561" v="13"/>
-        <pc:sldMkLst>
-          <pc:docMk/>
-          <pc:sldMk cId="1587345812" sldId="877"/>
-        </pc:sldMkLst>
-      </pc:sldChg>
-      <pc:sldChg chg="del">
-        <pc:chgData name="Lipani, Aldo" userId="3d811883-7188-4056-86e4-ebeb30c53017" providerId="ADAL" clId="{667C833C-76E4-6248-A772-9C8DA58B4060}" dt="2020-10-03T14:57:16.168" v="7" actId="2696"/>
-        <pc:sldMkLst>
-          <pc:docMk/>
-          <pc:sldMk cId="3771076271" sldId="877"/>
-        </pc:sldMkLst>
-      </pc:sldChg>
-      <pc:sldChg chg="add">
-        <pc:chgData name="Lipani, Aldo" userId="3d811883-7188-4056-86e4-ebeb30c53017" providerId="ADAL" clId="{667C833C-76E4-6248-A772-9C8DA58B4060}" dt="2020-10-03T14:57:22.561" v="13"/>
-        <pc:sldMkLst>
-          <pc:docMk/>
-          <pc:sldMk cId="1046622488" sldId="878"/>
-        </pc:sldMkLst>
-      </pc:sldChg>
-      <pc:sldChg chg="del">
-        <pc:chgData name="Lipani, Aldo" userId="3d811883-7188-4056-86e4-ebeb30c53017" providerId="ADAL" clId="{667C833C-76E4-6248-A772-9C8DA58B4060}" dt="2020-10-03T14:57:17.102" v="8" actId="2696"/>
-        <pc:sldMkLst>
-          <pc:docMk/>
-          <pc:sldMk cId="3795082422" sldId="878"/>
-        </pc:sldMkLst>
-      </pc:sldChg>
-      <pc:sldChg chg="del">
-        <pc:chgData name="Lipani, Aldo" userId="3d811883-7188-4056-86e4-ebeb30c53017" providerId="ADAL" clId="{667C833C-76E4-6248-A772-9C8DA58B4060}" dt="2020-10-03T14:57:18.439" v="9" actId="2696"/>
-        <pc:sldMkLst>
-          <pc:docMk/>
-          <pc:sldMk cId="1442602589" sldId="879"/>
-        </pc:sldMkLst>
-      </pc:sldChg>
-      <pc:sldChg chg="add">
-        <pc:chgData name="Lipani, Aldo" userId="3d811883-7188-4056-86e4-ebeb30c53017" providerId="ADAL" clId="{667C833C-76E4-6248-A772-9C8DA58B4060}" dt="2020-10-03T14:57:22.561" v="13"/>
-        <pc:sldMkLst>
-          <pc:docMk/>
-          <pc:sldMk cId="3809297050" sldId="879"/>
-        </pc:sldMkLst>
-      </pc:sldChg>
-      <pc:sldChg chg="add">
-        <pc:chgData name="Lipani, Aldo" userId="3d811883-7188-4056-86e4-ebeb30c53017" providerId="ADAL" clId="{667C833C-76E4-6248-A772-9C8DA58B4060}" dt="2020-10-03T14:57:22.561" v="13"/>
-        <pc:sldMkLst>
-          <pc:docMk/>
-          <pc:sldMk cId="2132466136" sldId="880"/>
-        </pc:sldMkLst>
-      </pc:sldChg>
-      <pc:sldChg chg="del">
-        <pc:chgData name="Lipani, Aldo" userId="3d811883-7188-4056-86e4-ebeb30c53017" providerId="ADAL" clId="{667C833C-76E4-6248-A772-9C8DA58B4060}" dt="2020-10-03T14:57:18.965" v="10" actId="2696"/>
-        <pc:sldMkLst>
-          <pc:docMk/>
-          <pc:sldMk cId="2324208589" sldId="880"/>
-        </pc:sldMkLst>
-      </pc:sldChg>
-      <pc:sldChg chg="modSp mod">
-        <pc:chgData name="Lipani, Aldo" userId="3d811883-7188-4056-86e4-ebeb30c53017" providerId="ADAL" clId="{667C833C-76E4-6248-A772-9C8DA58B4060}" dt="2020-10-03T15:22:27.823" v="53" actId="20577"/>
-        <pc:sldMkLst>
-          <pc:docMk/>
-          <pc:sldMk cId="2037749261" sldId="885"/>
-        </pc:sldMkLst>
-        <pc:spChg chg="mod">
-          <ac:chgData name="Lipani, Aldo" userId="3d811883-7188-4056-86e4-ebeb30c53017" providerId="ADAL" clId="{667C833C-76E4-6248-A772-9C8DA58B4060}" dt="2020-10-03T15:22:27.823" v="53" actId="20577"/>
-          <ac:spMkLst>
-            <pc:docMk/>
-            <pc:sldMk cId="2037749261" sldId="885"/>
-            <ac:spMk id="5" creationId="{599AD9FF-BF1C-5047-89FD-16C1D022729A}"/>
-          </ac:spMkLst>
-        </pc:spChg>
-      </pc:sldChg>
-      <pc:sldChg chg="modSp mod">
-        <pc:chgData name="Lipani, Aldo" userId="3d811883-7188-4056-86e4-ebeb30c53017" providerId="ADAL" clId="{667C833C-76E4-6248-A772-9C8DA58B4060}" dt="2020-10-03T15:05:52.843" v="41" actId="6549"/>
-        <pc:sldMkLst>
-          <pc:docMk/>
-          <pc:sldMk cId="2485559801" sldId="887"/>
-        </pc:sldMkLst>
-        <pc:spChg chg="mod">
-          <ac:chgData name="Lipani, Aldo" userId="3d811883-7188-4056-86e4-ebeb30c53017" providerId="ADAL" clId="{667C833C-76E4-6248-A772-9C8DA58B4060}" dt="2020-10-03T15:05:52.843" v="41" actId="6549"/>
-          <ac:spMkLst>
-            <pc:docMk/>
-            <pc:sldMk cId="2485559801" sldId="887"/>
-            <ac:spMk id="5" creationId="{599AD9FF-BF1C-5047-89FD-16C1D022729A}"/>
-          </ac:spMkLst>
-        </pc:spChg>
-      </pc:sldChg>
-      <pc:sldChg chg="modSp mod">
-        <pc:chgData name="Lipani, Aldo" userId="3d811883-7188-4056-86e4-ebeb30c53017" providerId="ADAL" clId="{667C833C-76E4-6248-A772-9C8DA58B4060}" dt="2020-10-03T18:21:12.092" v="61" actId="6549"/>
-        <pc:sldMkLst>
-          <pc:docMk/>
-          <pc:sldMk cId="589867458" sldId="888"/>
-        </pc:sldMkLst>
-        <pc:spChg chg="mod">
-          <ac:chgData name="Lipani, Aldo" userId="3d811883-7188-4056-86e4-ebeb30c53017" providerId="ADAL" clId="{667C833C-76E4-6248-A772-9C8DA58B4060}" dt="2020-10-03T18:21:12.092" v="61" actId="6549"/>
-          <ac:spMkLst>
-            <pc:docMk/>
-            <pc:sldMk cId="589867458" sldId="888"/>
-            <ac:spMk id="5" creationId="{599AD9FF-BF1C-5047-89FD-16C1D022729A}"/>
-          </ac:spMkLst>
-        </pc:spChg>
-      </pc:sldChg>
-      <pc:sldChg chg="modSp mod">
-        <pc:chgData name="Lipani, Aldo" userId="3d811883-7188-4056-86e4-ebeb30c53017" providerId="ADAL" clId="{667C833C-76E4-6248-A772-9C8DA58B4060}" dt="2020-10-03T15:12:11.347" v="44" actId="20577"/>
-        <pc:sldMkLst>
-          <pc:docMk/>
-          <pc:sldMk cId="3492446005" sldId="894"/>
-        </pc:sldMkLst>
-        <pc:spChg chg="mod">
-          <ac:chgData name="Lipani, Aldo" userId="3d811883-7188-4056-86e4-ebeb30c53017" providerId="ADAL" clId="{667C833C-76E4-6248-A772-9C8DA58B4060}" dt="2020-10-03T15:12:11.347" v="44" actId="20577"/>
-          <ac:spMkLst>
-            <pc:docMk/>
-            <pc:sldMk cId="3492446005" sldId="894"/>
-            <ac:spMk id="3" creationId="{2912DE23-1859-EC48-989A-9DCA77F0E4EE}"/>
-          </ac:spMkLst>
-        </pc:spChg>
-      </pc:sldChg>
-      <pc:sldChg chg="modSp mod">
-        <pc:chgData name="Lipani, Aldo" userId="3d811883-7188-4056-86e4-ebeb30c53017" providerId="ADAL" clId="{667C833C-76E4-6248-A772-9C8DA58B4060}" dt="2020-10-03T15:00:04.073" v="33" actId="20577"/>
-        <pc:sldMkLst>
-          <pc:docMk/>
-          <pc:sldMk cId="973325614" sldId="901"/>
-        </pc:sldMkLst>
-        <pc:spChg chg="mod">
-          <ac:chgData name="Lipani, Aldo" userId="3d811883-7188-4056-86e4-ebeb30c53017" providerId="ADAL" clId="{667C833C-76E4-6248-A772-9C8DA58B4060}" dt="2020-10-03T15:00:04.073" v="33" actId="20577"/>
-          <ac:spMkLst>
-            <pc:docMk/>
-            <pc:sldMk cId="973325614" sldId="901"/>
-            <ac:spMk id="3" creationId="{2912DE23-1859-EC48-989A-9DCA77F0E4EE}"/>
-          </ac:spMkLst>
-        </pc:spChg>
-      </pc:sldChg>
-      <pc:sldChg chg="modSp mod">
-        <pc:chgData name="Lipani, Aldo" userId="3d811883-7188-4056-86e4-ebeb30c53017" providerId="ADAL" clId="{667C833C-76E4-6248-A772-9C8DA58B4060}" dt="2020-10-03T15:15:51.139" v="47" actId="20577"/>
-        <pc:sldMkLst>
-          <pc:docMk/>
-          <pc:sldMk cId="3561329938" sldId="902"/>
-        </pc:sldMkLst>
-        <pc:spChg chg="mod">
-          <ac:chgData name="Lipani, Aldo" userId="3d811883-7188-4056-86e4-ebeb30c53017" providerId="ADAL" clId="{667C833C-76E4-6248-A772-9C8DA58B4060}" dt="2020-10-03T15:15:51.139" v="47" actId="20577"/>
-          <ac:spMkLst>
-            <pc:docMk/>
-            <pc:sldMk cId="3561329938" sldId="902"/>
-            <ac:spMk id="3" creationId="{2912DE23-1859-EC48-989A-9DCA77F0E4EE}"/>
-          </ac:spMkLst>
-        </pc:spChg>
-      </pc:sldChg>
-      <pc:sldChg chg="modSp mod">
-        <pc:chgData name="Lipani, Aldo" userId="3d811883-7188-4056-86e4-ebeb30c53017" providerId="ADAL" clId="{667C833C-76E4-6248-A772-9C8DA58B4060}" dt="2020-10-03T15:22:08.525" v="51" actId="20577"/>
-        <pc:sldMkLst>
-          <pc:docMk/>
-          <pc:sldMk cId="2425427212" sldId="904"/>
-        </pc:sldMkLst>
-        <pc:spChg chg="mod">
-          <ac:chgData name="Lipani, Aldo" userId="3d811883-7188-4056-86e4-ebeb30c53017" providerId="ADAL" clId="{667C833C-76E4-6248-A772-9C8DA58B4060}" dt="2020-10-03T15:22:08.525" v="51" actId="20577"/>
-          <ac:spMkLst>
-            <pc:docMk/>
-            <pc:sldMk cId="2425427212" sldId="904"/>
-            <ac:spMk id="3" creationId="{2912DE23-1859-EC48-989A-9DCA77F0E4EE}"/>
-          </ac:spMkLst>
-        </pc:spChg>
-      </pc:sldChg>
-      <pc:sldChg chg="ord">
-        <pc:chgData name="Lipani, Aldo" userId="3d811883-7188-4056-86e4-ebeb30c53017" providerId="ADAL" clId="{667C833C-76E4-6248-A772-9C8DA58B4060}" dt="2020-10-03T20:54:25.785" v="3179" actId="20578"/>
-        <pc:sldMkLst>
-          <pc:docMk/>
-          <pc:sldMk cId="4189697085" sldId="906"/>
-        </pc:sldMkLst>
-      </pc:sldChg>
-      <pc:sldChg chg="modSp mod ord">
-        <pc:chgData name="Lipani, Aldo" userId="3d811883-7188-4056-86e4-ebeb30c53017" providerId="ADAL" clId="{667C833C-76E4-6248-A772-9C8DA58B4060}" dt="2020-10-04T19:09:26.501" v="3402" actId="20577"/>
-        <pc:sldMkLst>
-          <pc:docMk/>
-          <pc:sldMk cId="637209470" sldId="907"/>
-        </pc:sldMkLst>
-        <pc:spChg chg="mod">
-          <ac:chgData name="Lipani, Aldo" userId="3d811883-7188-4056-86e4-ebeb30c53017" providerId="ADAL" clId="{667C833C-76E4-6248-A772-9C8DA58B4060}" dt="2020-10-04T19:09:26.501" v="3402" actId="20577"/>
-          <ac:spMkLst>
-            <pc:docMk/>
-            <pc:sldMk cId="637209470" sldId="907"/>
-            <ac:spMk id="3" creationId="{D6FCC0C7-EF96-8049-B2DE-91A4034D5765}"/>
-          </ac:spMkLst>
-        </pc:spChg>
-      </pc:sldChg>
-      <pc:sldChg chg="modSp mod ord">
-        <pc:chgData name="Lipani, Aldo" userId="3d811883-7188-4056-86e4-ebeb30c53017" providerId="ADAL" clId="{667C833C-76E4-6248-A772-9C8DA58B4060}" dt="2020-10-03T20:54:25.785" v="3179" actId="20578"/>
-        <pc:sldMkLst>
-          <pc:docMk/>
-          <pc:sldMk cId="3336511245" sldId="908"/>
-        </pc:sldMkLst>
-        <pc:spChg chg="mod">
-          <ac:chgData name="Lipani, Aldo" userId="3d811883-7188-4056-86e4-ebeb30c53017" providerId="ADAL" clId="{667C833C-76E4-6248-A772-9C8DA58B4060}" dt="2020-10-03T18:24:02.511" v="62" actId="6549"/>
-          <ac:spMkLst>
-            <pc:docMk/>
-            <pc:sldMk cId="3336511245" sldId="908"/>
-            <ac:spMk id="3" creationId="{D6FCC0C7-EF96-8049-B2DE-91A4034D5765}"/>
-          </ac:spMkLst>
-        </pc:spChg>
-      </pc:sldChg>
-      <pc:sldChg chg="ord">
-        <pc:chgData name="Lipani, Aldo" userId="3d811883-7188-4056-86e4-ebeb30c53017" providerId="ADAL" clId="{667C833C-76E4-6248-A772-9C8DA58B4060}" dt="2020-10-03T20:54:25.785" v="3179" actId="20578"/>
-        <pc:sldMkLst>
-          <pc:docMk/>
-          <pc:sldMk cId="2887500330" sldId="909"/>
-        </pc:sldMkLst>
-      </pc:sldChg>
-      <pc:sldChg chg="addSp delSp modSp mod">
-        <pc:chgData name="Lipani, Aldo" userId="3d811883-7188-4056-86e4-ebeb30c53017" providerId="ADAL" clId="{667C833C-76E4-6248-A772-9C8DA58B4060}" dt="2020-10-03T18:30:40.615" v="64"/>
-        <pc:sldMkLst>
-          <pc:docMk/>
-          <pc:sldMk cId="1416028549" sldId="913"/>
-        </pc:sldMkLst>
-        <pc:picChg chg="del">
-          <ac:chgData name="Lipani, Aldo" userId="3d811883-7188-4056-86e4-ebeb30c53017" providerId="ADAL" clId="{667C833C-76E4-6248-A772-9C8DA58B4060}" dt="2020-10-03T18:30:39.997" v="63" actId="478"/>
-          <ac:picMkLst>
-            <pc:docMk/>
-            <pc:sldMk cId="1416028549" sldId="913"/>
-            <ac:picMk id="5" creationId="{F1DF5F0E-3DB8-4C43-8070-F5DCCE70ED7E}"/>
-          </ac:picMkLst>
-        </pc:picChg>
-        <pc:picChg chg="add mod">
-          <ac:chgData name="Lipani, Aldo" userId="3d811883-7188-4056-86e4-ebeb30c53017" providerId="ADAL" clId="{667C833C-76E4-6248-A772-9C8DA58B4060}" dt="2020-10-03T18:30:40.615" v="64"/>
-          <ac:picMkLst>
-            <pc:docMk/>
-            <pc:sldMk cId="1416028549" sldId="913"/>
-            <ac:picMk id="7" creationId="{3A655659-A97A-874A-A4EB-734EB559FD23}"/>
-          </ac:picMkLst>
-        </pc:picChg>
-      </pc:sldChg>
-      <pc:sldChg chg="modSp mod">
-        <pc:chgData name="Lipani, Aldo" userId="3d811883-7188-4056-86e4-ebeb30c53017" providerId="ADAL" clId="{667C833C-76E4-6248-A772-9C8DA58B4060}" dt="2020-10-03T18:31:04.529" v="65" actId="6549"/>
-        <pc:sldMkLst>
-          <pc:docMk/>
-          <pc:sldMk cId="3221056734" sldId="915"/>
-        </pc:sldMkLst>
-        <pc:spChg chg="mod">
-          <ac:chgData name="Lipani, Aldo" userId="3d811883-7188-4056-86e4-ebeb30c53017" providerId="ADAL" clId="{667C833C-76E4-6248-A772-9C8DA58B4060}" dt="2020-10-03T18:31:04.529" v="65" actId="6549"/>
-          <ac:spMkLst>
-            <pc:docMk/>
-            <pc:sldMk cId="3221056734" sldId="915"/>
-            <ac:spMk id="3" creationId="{D6FCC0C7-EF96-8049-B2DE-91A4034D5765}"/>
-          </ac:spMkLst>
-        </pc:spChg>
-      </pc:sldChg>
-      <pc:sldChg chg="modSp mod">
-        <pc:chgData name="Lipani, Aldo" userId="3d811883-7188-4056-86e4-ebeb30c53017" providerId="ADAL" clId="{667C833C-76E4-6248-A772-9C8DA58B4060}" dt="2020-10-04T18:28:50.859" v="3285" actId="20577"/>
-        <pc:sldMkLst>
-          <pc:docMk/>
-          <pc:sldMk cId="385933789" sldId="916"/>
-        </pc:sldMkLst>
-        <pc:spChg chg="mod">
-          <ac:chgData name="Lipani, Aldo" userId="3d811883-7188-4056-86e4-ebeb30c53017" providerId="ADAL" clId="{667C833C-76E4-6248-A772-9C8DA58B4060}" dt="2020-10-04T18:28:50.859" v="3285" actId="20577"/>
-          <ac:spMkLst>
-            <pc:docMk/>
-            <pc:sldMk cId="385933789" sldId="916"/>
-            <ac:spMk id="3" creationId="{D6FCC0C7-EF96-8049-B2DE-91A4034D5765}"/>
-          </ac:spMkLst>
-        </pc:spChg>
-      </pc:sldChg>
-      <pc:sldChg chg="addSp modSp mod">
-        <pc:chgData name="Lipani, Aldo" userId="3d811883-7188-4056-86e4-ebeb30c53017" providerId="ADAL" clId="{667C833C-76E4-6248-A772-9C8DA58B4060}" dt="2020-10-03T18:49:48.388" v="641" actId="6549"/>
-        <pc:sldMkLst>
-          <pc:docMk/>
-          <pc:sldMk cId="3116661040" sldId="917"/>
-        </pc:sldMkLst>
-        <pc:spChg chg="mod">
-          <ac:chgData name="Lipani, Aldo" userId="3d811883-7188-4056-86e4-ebeb30c53017" providerId="ADAL" clId="{667C833C-76E4-6248-A772-9C8DA58B4060}" dt="2020-10-03T18:49:48.388" v="641" actId="6549"/>
-          <ac:spMkLst>
-            <pc:docMk/>
-            <pc:sldMk cId="3116661040" sldId="917"/>
-            <ac:spMk id="3" creationId="{D6FCC0C7-EF96-8049-B2DE-91A4034D5765}"/>
-          </ac:spMkLst>
-        </pc:spChg>
-        <pc:spChg chg="add mod">
-          <ac:chgData name="Lipani, Aldo" userId="3d811883-7188-4056-86e4-ebeb30c53017" providerId="ADAL" clId="{667C833C-76E4-6248-A772-9C8DA58B4060}" dt="2020-10-03T18:39:44.176" v="123" actId="1076"/>
-          <ac:spMkLst>
-            <pc:docMk/>
-            <pc:sldMk cId="3116661040" sldId="917"/>
-            <ac:spMk id="16" creationId="{F3699782-3BEB-144C-B76F-FBDA7ADBCBB9}"/>
-          </ac:spMkLst>
-        </pc:spChg>
-        <pc:spChg chg="add mod">
-          <ac:chgData name="Lipani, Aldo" userId="3d811883-7188-4056-86e4-ebeb30c53017" providerId="ADAL" clId="{667C833C-76E4-6248-A772-9C8DA58B4060}" dt="2020-10-03T18:39:47.689" v="124" actId="1076"/>
-          <ac:spMkLst>
-            <pc:docMk/>
-            <pc:sldMk cId="3116661040" sldId="917"/>
-            <ac:spMk id="18" creationId="{BA57377A-B141-4649-AEE7-B1DE9DFFB35E}"/>
-          </ac:spMkLst>
-        </pc:spChg>
-        <pc:cxnChg chg="mod">
-          <ac:chgData name="Lipani, Aldo" userId="3d811883-7188-4056-86e4-ebeb30c53017" providerId="ADAL" clId="{667C833C-76E4-6248-A772-9C8DA58B4060}" dt="2020-10-03T18:40:15.230" v="128" actId="14100"/>
-          <ac:cxnSpMkLst>
-            <pc:docMk/>
-            <pc:sldMk cId="3116661040" sldId="917"/>
-            <ac:cxnSpMk id="7" creationId="{96D19A55-D7B7-4847-882B-7F8AB184E302}"/>
-          </ac:cxnSpMkLst>
-        </pc:cxnChg>
-      </pc:sldChg>
-      <pc:sldChg chg="modSp mod">
-        <pc:chgData name="Lipani, Aldo" userId="3d811883-7188-4056-86e4-ebeb30c53017" providerId="ADAL" clId="{667C833C-76E4-6248-A772-9C8DA58B4060}" dt="2020-10-03T20:08:26.312" v="3146" actId="20577"/>
-        <pc:sldMkLst>
-          <pc:docMk/>
-          <pc:sldMk cId="2577079166" sldId="918"/>
-        </pc:sldMkLst>
-        <pc:spChg chg="mod">
-          <ac:chgData name="Lipani, Aldo" userId="3d811883-7188-4056-86e4-ebeb30c53017" providerId="ADAL" clId="{667C833C-76E4-6248-A772-9C8DA58B4060}" dt="2020-10-03T20:08:26.312" v="3146" actId="20577"/>
-          <ac:spMkLst>
-            <pc:docMk/>
-            <pc:sldMk cId="2577079166" sldId="918"/>
-            <ac:spMk id="6" creationId="{0FFAD120-D3BC-944F-9DD1-CD40205EE10E}"/>
-          </ac:spMkLst>
-        </pc:spChg>
-      </pc:sldChg>
-      <pc:sldChg chg="addSp delSp modSp mod">
-        <pc:chgData name="Lipani, Aldo" userId="3d811883-7188-4056-86e4-ebeb30c53017" providerId="ADAL" clId="{667C833C-76E4-6248-A772-9C8DA58B4060}" dt="2020-10-03T19:50:13.772" v="2613" actId="113"/>
-        <pc:sldMkLst>
-          <pc:docMk/>
-          <pc:sldMk cId="3317100214" sldId="919"/>
-        </pc:sldMkLst>
-        <pc:spChg chg="add del mod">
-          <ac:chgData name="Lipani, Aldo" userId="3d811883-7188-4056-86e4-ebeb30c53017" providerId="ADAL" clId="{667C833C-76E4-6248-A772-9C8DA58B4060}" dt="2020-10-03T19:17:32.051" v="1174" actId="478"/>
-          <ac:spMkLst>
-            <pc:docMk/>
-            <pc:sldMk cId="3317100214" sldId="919"/>
-            <ac:spMk id="2" creationId="{3E8B383A-A87E-0E4F-9751-F06CD7919FB2}"/>
-          </ac:spMkLst>
-        </pc:spChg>
-        <pc:spChg chg="mod">
-          <ac:chgData name="Lipani, Aldo" userId="3d811883-7188-4056-86e4-ebeb30c53017" providerId="ADAL" clId="{667C833C-76E4-6248-A772-9C8DA58B4060}" dt="2020-10-03T19:50:13.772" v="2613" actId="113"/>
-          <ac:spMkLst>
-            <pc:docMk/>
-            <pc:sldMk cId="3317100214" sldId="919"/>
-            <ac:spMk id="3" creationId="{D6FCC0C7-EF96-8049-B2DE-91A4034D5765}"/>
-          </ac:spMkLst>
-        </pc:spChg>
-        <pc:spChg chg="mod">
-          <ac:chgData name="Lipani, Aldo" userId="3d811883-7188-4056-86e4-ebeb30c53017" providerId="ADAL" clId="{667C833C-76E4-6248-A772-9C8DA58B4060}" dt="2020-10-03T18:59:59.674" v="815" actId="1076"/>
-          <ac:spMkLst>
-            <pc:docMk/>
-            <pc:sldMk cId="3317100214" sldId="919"/>
-            <ac:spMk id="14" creationId="{ABBA8D2C-2D13-A34C-A6DD-E6B67413544A}"/>
-          </ac:spMkLst>
-        </pc:spChg>
-        <pc:spChg chg="mod">
-          <ac:chgData name="Lipani, Aldo" userId="3d811883-7188-4056-86e4-ebeb30c53017" providerId="ADAL" clId="{667C833C-76E4-6248-A772-9C8DA58B4060}" dt="2020-10-03T18:59:56.628" v="814" actId="1076"/>
-          <ac:spMkLst>
-            <pc:docMk/>
-            <pc:sldMk cId="3317100214" sldId="919"/>
-            <ac:spMk id="15" creationId="{3A019D58-F614-5442-8CC0-09ADA36FA448}"/>
-          </ac:spMkLst>
-        </pc:spChg>
-        <pc:spChg chg="add del mod">
-          <ac:chgData name="Lipani, Aldo" userId="3d811883-7188-4056-86e4-ebeb30c53017" providerId="ADAL" clId="{667C833C-76E4-6248-A772-9C8DA58B4060}" dt="2020-10-03T19:17:33.278" v="1176" actId="478"/>
-          <ac:spMkLst>
-            <pc:docMk/>
-            <pc:sldMk cId="3317100214" sldId="919"/>
-            <ac:spMk id="18" creationId="{D25A65EB-D798-884A-8B28-85361D79D817}"/>
-          </ac:spMkLst>
-        </pc:spChg>
-        <pc:spChg chg="add del mod">
-          <ac:chgData name="Lipani, Aldo" userId="3d811883-7188-4056-86e4-ebeb30c53017" providerId="ADAL" clId="{667C833C-76E4-6248-A772-9C8DA58B4060}" dt="2020-10-03T19:17:33.820" v="1177" actId="478"/>
-          <ac:spMkLst>
-            <pc:docMk/>
-            <pc:sldMk cId="3317100214" sldId="919"/>
-            <ac:spMk id="20" creationId="{50D79408-A4D4-A642-855B-A8A6E98CF7AC}"/>
-          </ac:spMkLst>
-        </pc:spChg>
-        <pc:spChg chg="add del mod">
-          <ac:chgData name="Lipani, Aldo" userId="3d811883-7188-4056-86e4-ebeb30c53017" providerId="ADAL" clId="{667C833C-76E4-6248-A772-9C8DA58B4060}" dt="2020-10-03T19:17:32.719" v="1175" actId="478"/>
-          <ac:spMkLst>
-            <pc:docMk/>
-            <pc:sldMk cId="3317100214" sldId="919"/>
-            <ac:spMk id="21" creationId="{64878A4B-3B1F-2940-BF88-9CF409C18885}"/>
-          </ac:spMkLst>
-        </pc:spChg>
-        <pc:spChg chg="add mod">
-          <ac:chgData name="Lipani, Aldo" userId="3d811883-7188-4056-86e4-ebeb30c53017" providerId="ADAL" clId="{667C833C-76E4-6248-A772-9C8DA58B4060}" dt="2020-10-03T18:57:30.529" v="697"/>
-          <ac:spMkLst>
-            <pc:docMk/>
-            <pc:sldMk cId="3317100214" sldId="919"/>
-            <ac:spMk id="22" creationId="{7942A439-9E5A-834C-A91B-69A738A84228}"/>
-          </ac:spMkLst>
-        </pc:spChg>
-        <pc:spChg chg="add mod">
-          <ac:chgData name="Lipani, Aldo" userId="3d811883-7188-4056-86e4-ebeb30c53017" providerId="ADAL" clId="{667C833C-76E4-6248-A772-9C8DA58B4060}" dt="2020-10-03T18:59:43.600" v="812" actId="1037"/>
-          <ac:spMkLst>
-            <pc:docMk/>
-            <pc:sldMk cId="3317100214" sldId="919"/>
-            <ac:spMk id="23" creationId="{FF005369-730D-5D4E-BF0B-1AC1EC9C597E}"/>
-          </ac:spMkLst>
-        </pc:spChg>
-        <pc:spChg chg="add mod">
-          <ac:chgData name="Lipani, Aldo" userId="3d811883-7188-4056-86e4-ebeb30c53017" providerId="ADAL" clId="{667C833C-76E4-6248-A772-9C8DA58B4060}" dt="2020-10-03T18:58:09.165" v="772" actId="1036"/>
-          <ac:spMkLst>
-            <pc:docMk/>
-            <pc:sldMk cId="3317100214" sldId="919"/>
-            <ac:spMk id="28" creationId="{3C6E4BCF-3B62-6643-BCF6-D0E23EDB6DB1}"/>
-          </ac:spMkLst>
-        </pc:spChg>
-        <pc:spChg chg="add mod">
-          <ac:chgData name="Lipani, Aldo" userId="3d811883-7188-4056-86e4-ebeb30c53017" providerId="ADAL" clId="{667C833C-76E4-6248-A772-9C8DA58B4060}" dt="2020-10-03T18:58:17.663" v="804" actId="1037"/>
-          <ac:spMkLst>
-            <pc:docMk/>
-            <pc:sldMk cId="3317100214" sldId="919"/>
-            <ac:spMk id="29" creationId="{93844DDF-A03E-254E-B78D-14402935E69E}"/>
-          </ac:spMkLst>
-        </pc:spChg>
-        <pc:spChg chg="add mod">
-          <ac:chgData name="Lipani, Aldo" userId="3d811883-7188-4056-86e4-ebeb30c53017" providerId="ADAL" clId="{667C833C-76E4-6248-A772-9C8DA58B4060}" dt="2020-10-03T19:08:31.077" v="886" actId="1038"/>
-          <ac:spMkLst>
-            <pc:docMk/>
-            <pc:sldMk cId="3317100214" sldId="919"/>
-            <ac:spMk id="30" creationId="{851451E9-F70A-AB43-86B2-BA56FE7504D5}"/>
-          </ac:spMkLst>
-        </pc:spChg>
-        <pc:cxnChg chg="mod">
-          <ac:chgData name="Lipani, Aldo" userId="3d811883-7188-4056-86e4-ebeb30c53017" providerId="ADAL" clId="{667C833C-76E4-6248-A772-9C8DA58B4060}" dt="2020-10-03T18:59:48.395" v="813" actId="14100"/>
-          <ac:cxnSpMkLst>
-            <pc:docMk/>
-            <pc:sldMk cId="3317100214" sldId="919"/>
-            <ac:cxnSpMk id="5" creationId="{53230D9B-4A22-EB40-AAAE-CEC422E4D8E4}"/>
-          </ac:cxnSpMkLst>
-        </pc:cxnChg>
-        <pc:cxnChg chg="mod">
-          <ac:chgData name="Lipani, Aldo" userId="3d811883-7188-4056-86e4-ebeb30c53017" providerId="ADAL" clId="{667C833C-76E4-6248-A772-9C8DA58B4060}" dt="2020-10-03T18:59:40.527" v="810" actId="14100"/>
-          <ac:cxnSpMkLst>
-            <pc:docMk/>
-            <pc:sldMk cId="3317100214" sldId="919"/>
-            <ac:cxnSpMk id="7" creationId="{96D19A55-D7B7-4847-882B-7F8AB184E302}"/>
-          </ac:cxnSpMkLst>
-        </pc:cxnChg>
-      </pc:sldChg>
-      <pc:sldChg chg="del">
-        <pc:chgData name="Lipani, Aldo" userId="3d811883-7188-4056-86e4-ebeb30c53017" providerId="ADAL" clId="{667C833C-76E4-6248-A772-9C8DA58B4060}" dt="2020-10-03T20:04:39.775" v="3145" actId="2696"/>
-        <pc:sldMkLst>
-          <pc:docMk/>
-          <pc:sldMk cId="2085612992" sldId="920"/>
-        </pc:sldMkLst>
-      </pc:sldChg>
-      <pc:sldChg chg="modSp mod">
-        <pc:chgData name="Lipani, Aldo" userId="3d811883-7188-4056-86e4-ebeb30c53017" providerId="ADAL" clId="{667C833C-76E4-6248-A772-9C8DA58B4060}" dt="2020-10-04T18:49:35.735" v="3371" actId="20577"/>
-        <pc:sldMkLst>
-          <pc:docMk/>
-          <pc:sldMk cId="3947611980" sldId="921"/>
-        </pc:sldMkLst>
-        <pc:spChg chg="mod">
-          <ac:chgData name="Lipani, Aldo" userId="3d811883-7188-4056-86e4-ebeb30c53017" providerId="ADAL" clId="{667C833C-76E4-6248-A772-9C8DA58B4060}" dt="2020-10-04T18:49:35.735" v="3371" actId="20577"/>
-          <ac:spMkLst>
-            <pc:docMk/>
-            <pc:sldMk cId="3947611980" sldId="921"/>
-            <ac:spMk id="6" creationId="{0FFAD120-D3BC-944F-9DD1-CD40205EE10E}"/>
-          </ac:spMkLst>
-        </pc:spChg>
-        <pc:spChg chg="mod">
-          <ac:chgData name="Lipani, Aldo" userId="3d811883-7188-4056-86e4-ebeb30c53017" providerId="ADAL" clId="{667C833C-76E4-6248-A772-9C8DA58B4060}" dt="2020-10-03T20:11:36.855" v="3172" actId="1035"/>
-          <ac:spMkLst>
-            <pc:docMk/>
-            <pc:sldMk cId="3947611980" sldId="921"/>
-            <ac:spMk id="9" creationId="{3DA74DC2-411D-3442-A3A8-050EB2F814CA}"/>
-          </ac:spMkLst>
-        </pc:spChg>
-        <pc:spChg chg="mod">
-          <ac:chgData name="Lipani, Aldo" userId="3d811883-7188-4056-86e4-ebeb30c53017" providerId="ADAL" clId="{667C833C-76E4-6248-A772-9C8DA58B4060}" dt="2020-10-03T20:11:36.855" v="3172" actId="1035"/>
-          <ac:spMkLst>
-            <pc:docMk/>
-            <pc:sldMk cId="3947611980" sldId="921"/>
-            <ac:spMk id="10" creationId="{E374C0D6-69BC-964F-B48D-68955C5724FE}"/>
-          </ac:spMkLst>
-        </pc:spChg>
-        <pc:spChg chg="mod">
-          <ac:chgData name="Lipani, Aldo" userId="3d811883-7188-4056-86e4-ebeb30c53017" providerId="ADAL" clId="{667C833C-76E4-6248-A772-9C8DA58B4060}" dt="2020-10-03T20:11:36.855" v="3172" actId="1035"/>
-          <ac:spMkLst>
-            <pc:docMk/>
-            <pc:sldMk cId="3947611980" sldId="921"/>
-            <ac:spMk id="11" creationId="{0452F93D-B250-2040-9A90-C0CCBB77365F}"/>
-          </ac:spMkLst>
-        </pc:spChg>
-        <pc:spChg chg="mod">
-          <ac:chgData name="Lipani, Aldo" userId="3d811883-7188-4056-86e4-ebeb30c53017" providerId="ADAL" clId="{667C833C-76E4-6248-A772-9C8DA58B4060}" dt="2020-10-03T20:11:36.855" v="3172" actId="1035"/>
-          <ac:spMkLst>
-            <pc:docMk/>
-            <pc:sldMk cId="3947611980" sldId="921"/>
-            <ac:spMk id="12" creationId="{FB5D6A70-F64A-774C-B76A-249421556781}"/>
-          </ac:spMkLst>
-        </pc:spChg>
-        <pc:spChg chg="mod">
-          <ac:chgData name="Lipani, Aldo" userId="3d811883-7188-4056-86e4-ebeb30c53017" providerId="ADAL" clId="{667C833C-76E4-6248-A772-9C8DA58B4060}" dt="2020-10-03T20:11:36.855" v="3172" actId="1035"/>
-          <ac:spMkLst>
-            <pc:docMk/>
-            <pc:sldMk cId="3947611980" sldId="921"/>
-            <ac:spMk id="17" creationId="{B7C20929-9750-DC48-BABC-49D90F141E6A}"/>
-          </ac:spMkLst>
-        </pc:spChg>
-        <pc:spChg chg="mod">
-          <ac:chgData name="Lipani, Aldo" userId="3d811883-7188-4056-86e4-ebeb30c53017" providerId="ADAL" clId="{667C833C-76E4-6248-A772-9C8DA58B4060}" dt="2020-10-03T20:11:36.855" v="3172" actId="1035"/>
-          <ac:spMkLst>
-            <pc:docMk/>
-            <pc:sldMk cId="3947611980" sldId="921"/>
-            <ac:spMk id="18" creationId="{85618045-D9A9-D24B-922B-ABCBFC9391F5}"/>
-          </ac:spMkLst>
-        </pc:spChg>
-        <pc:spChg chg="mod">
-          <ac:chgData name="Lipani, Aldo" userId="3d811883-7188-4056-86e4-ebeb30c53017" providerId="ADAL" clId="{667C833C-76E4-6248-A772-9C8DA58B4060}" dt="2020-10-03T20:11:36.855" v="3172" actId="1035"/>
-          <ac:spMkLst>
-            <pc:docMk/>
-            <pc:sldMk cId="3947611980" sldId="921"/>
-            <ac:spMk id="22" creationId="{3E1D555F-BA7B-4E4D-BD24-75BCDFCF76E9}"/>
-          </ac:spMkLst>
-        </pc:spChg>
-        <pc:spChg chg="mod">
-          <ac:chgData name="Lipani, Aldo" userId="3d811883-7188-4056-86e4-ebeb30c53017" providerId="ADAL" clId="{667C833C-76E4-6248-A772-9C8DA58B4060}" dt="2020-10-03T20:11:36.855" v="3172" actId="1035"/>
-          <ac:spMkLst>
-            <pc:docMk/>
-            <pc:sldMk cId="3947611980" sldId="921"/>
-            <ac:spMk id="25" creationId="{81FC1C0C-2497-B142-805B-918D42E793CD}"/>
-          </ac:spMkLst>
-        </pc:spChg>
-        <pc:spChg chg="mod">
-          <ac:chgData name="Lipani, Aldo" userId="3d811883-7188-4056-86e4-ebeb30c53017" providerId="ADAL" clId="{667C833C-76E4-6248-A772-9C8DA58B4060}" dt="2020-10-03T20:11:36.855" v="3172" actId="1035"/>
-          <ac:spMkLst>
-            <pc:docMk/>
-            <pc:sldMk cId="3947611980" sldId="921"/>
-            <ac:spMk id="26" creationId="{9C83D0E0-FCEF-5848-8795-81AD08568B37}"/>
-          </ac:spMkLst>
-        </pc:spChg>
-        <pc:spChg chg="mod">
-          <ac:chgData name="Lipani, Aldo" userId="3d811883-7188-4056-86e4-ebeb30c53017" providerId="ADAL" clId="{667C833C-76E4-6248-A772-9C8DA58B4060}" dt="2020-10-03T20:11:36.855" v="3172" actId="1035"/>
-          <ac:spMkLst>
-            <pc:docMk/>
-            <pc:sldMk cId="3947611980" sldId="921"/>
-            <ac:spMk id="27" creationId="{F55CA0BD-62A6-8B4B-B4D8-777448748F75}"/>
-          </ac:spMkLst>
-        </pc:spChg>
-        <pc:spChg chg="mod">
-          <ac:chgData name="Lipani, Aldo" userId="3d811883-7188-4056-86e4-ebeb30c53017" providerId="ADAL" clId="{667C833C-76E4-6248-A772-9C8DA58B4060}" dt="2020-10-03T20:11:36.855" v="3172" actId="1035"/>
-          <ac:spMkLst>
-            <pc:docMk/>
-            <pc:sldMk cId="3947611980" sldId="921"/>
-            <ac:spMk id="28" creationId="{21D53D63-8BA7-AB45-A917-DAF212689C39}"/>
-          </ac:spMkLst>
-        </pc:spChg>
-        <pc:spChg chg="mod">
-          <ac:chgData name="Lipani, Aldo" userId="3d811883-7188-4056-86e4-ebeb30c53017" providerId="ADAL" clId="{667C833C-76E4-6248-A772-9C8DA58B4060}" dt="2020-10-03T20:11:36.855" v="3172" actId="1035"/>
-          <ac:spMkLst>
-            <pc:docMk/>
-            <pc:sldMk cId="3947611980" sldId="921"/>
-            <ac:spMk id="29" creationId="{A573EE21-2169-934A-9621-211EE3AE24BB}"/>
-          </ac:spMkLst>
-        </pc:spChg>
-        <pc:spChg chg="mod">
-          <ac:chgData name="Lipani, Aldo" userId="3d811883-7188-4056-86e4-ebeb30c53017" providerId="ADAL" clId="{667C833C-76E4-6248-A772-9C8DA58B4060}" dt="2020-10-03T20:11:36.855" v="3172" actId="1035"/>
-          <ac:spMkLst>
-            <pc:docMk/>
-            <pc:sldMk cId="3947611980" sldId="921"/>
-            <ac:spMk id="30" creationId="{BA772864-D3A7-B243-A214-FDBDA5538832}"/>
-          </ac:spMkLst>
-        </pc:spChg>
-        <pc:spChg chg="mod">
-          <ac:chgData name="Lipani, Aldo" userId="3d811883-7188-4056-86e4-ebeb30c53017" providerId="ADAL" clId="{667C833C-76E4-6248-A772-9C8DA58B4060}" dt="2020-10-03T20:11:36.855" v="3172" actId="1035"/>
-          <ac:spMkLst>
-            <pc:docMk/>
-            <pc:sldMk cId="3947611980" sldId="921"/>
-            <ac:spMk id="32" creationId="{E508B54D-7000-144F-90E6-26C6A5AF3BEB}"/>
-          </ac:spMkLst>
-        </pc:spChg>
-        <pc:spChg chg="mod">
-          <ac:chgData name="Lipani, Aldo" userId="3d811883-7188-4056-86e4-ebeb30c53017" providerId="ADAL" clId="{667C833C-76E4-6248-A772-9C8DA58B4060}" dt="2020-10-03T20:11:36.855" v="3172" actId="1035"/>
-          <ac:spMkLst>
-            <pc:docMk/>
-            <pc:sldMk cId="3947611980" sldId="921"/>
-            <ac:spMk id="34" creationId="{DDF8BE48-0255-654B-8CE5-9768B1806AF3}"/>
-          </ac:spMkLst>
-        </pc:spChg>
-        <pc:spChg chg="mod">
-          <ac:chgData name="Lipani, Aldo" userId="3d811883-7188-4056-86e4-ebeb30c53017" providerId="ADAL" clId="{667C833C-76E4-6248-A772-9C8DA58B4060}" dt="2020-10-03T20:11:36.855" v="3172" actId="1035"/>
-          <ac:spMkLst>
-            <pc:docMk/>
-            <pc:sldMk cId="3947611980" sldId="921"/>
-            <ac:spMk id="35" creationId="{977772D9-25B0-5746-8B6E-04942877155D}"/>
-          </ac:spMkLst>
-        </pc:spChg>
-        <pc:cxnChg chg="mod">
-          <ac:chgData name="Lipani, Aldo" userId="3d811883-7188-4056-86e4-ebeb30c53017" providerId="ADAL" clId="{667C833C-76E4-6248-A772-9C8DA58B4060}" dt="2020-10-03T20:11:36.855" v="3172" actId="1035"/>
-          <ac:cxnSpMkLst>
-            <pc:docMk/>
-            <pc:sldMk cId="3947611980" sldId="921"/>
-            <ac:cxnSpMk id="5" creationId="{E05BA436-22FA-6347-9297-1DACB236EF41}"/>
-          </ac:cxnSpMkLst>
-        </pc:cxnChg>
-        <pc:cxnChg chg="mod">
-          <ac:chgData name="Lipani, Aldo" userId="3d811883-7188-4056-86e4-ebeb30c53017" providerId="ADAL" clId="{667C833C-76E4-6248-A772-9C8DA58B4060}" dt="2020-10-03T20:11:36.855" v="3172" actId="1035"/>
-          <ac:cxnSpMkLst>
-            <pc:docMk/>
-            <pc:sldMk cId="3947611980" sldId="921"/>
-            <ac:cxnSpMk id="8" creationId="{D2209715-C09C-EF41-85AF-E6016E6D21AA}"/>
-          </ac:cxnSpMkLst>
-        </pc:cxnChg>
-        <pc:cxnChg chg="mod">
-          <ac:chgData name="Lipani, Aldo" userId="3d811883-7188-4056-86e4-ebeb30c53017" providerId="ADAL" clId="{667C833C-76E4-6248-A772-9C8DA58B4060}" dt="2020-10-03T20:11:36.855" v="3172" actId="1035"/>
-          <ac:cxnSpMkLst>
-            <pc:docMk/>
-            <pc:sldMk cId="3947611980" sldId="921"/>
-            <ac:cxnSpMk id="19" creationId="{7E2CA0AB-991A-CD4C-866D-D64668BBB172}"/>
-          </ac:cxnSpMkLst>
-        </pc:cxnChg>
-        <pc:cxnChg chg="mod">
-          <ac:chgData name="Lipani, Aldo" userId="3d811883-7188-4056-86e4-ebeb30c53017" providerId="ADAL" clId="{667C833C-76E4-6248-A772-9C8DA58B4060}" dt="2020-10-03T20:11:36.855" v="3172" actId="1035"/>
-          <ac:cxnSpMkLst>
-            <pc:docMk/>
-            <pc:sldMk cId="3947611980" sldId="921"/>
-            <ac:cxnSpMk id="23" creationId="{0D6C8E26-5E34-FE41-8014-FEFCF6A36CBF}"/>
-          </ac:cxnSpMkLst>
-        </pc:cxnChg>
-        <pc:cxnChg chg="mod">
-          <ac:chgData name="Lipani, Aldo" userId="3d811883-7188-4056-86e4-ebeb30c53017" providerId="ADAL" clId="{667C833C-76E4-6248-A772-9C8DA58B4060}" dt="2020-10-03T20:11:36.855" v="3172" actId="1035"/>
-          <ac:cxnSpMkLst>
-            <pc:docMk/>
-            <pc:sldMk cId="3947611980" sldId="921"/>
-            <ac:cxnSpMk id="24" creationId="{BF94228F-3712-604E-8837-465748F08498}"/>
-          </ac:cxnSpMkLst>
-        </pc:cxnChg>
-        <pc:cxnChg chg="mod">
-          <ac:chgData name="Lipani, Aldo" userId="3d811883-7188-4056-86e4-ebeb30c53017" providerId="ADAL" clId="{667C833C-76E4-6248-A772-9C8DA58B4060}" dt="2020-10-03T20:11:36.855" v="3172" actId="1035"/>
-          <ac:cxnSpMkLst>
-            <pc:docMk/>
-            <pc:sldMk cId="3947611980" sldId="921"/>
-            <ac:cxnSpMk id="31" creationId="{E371D320-3844-6849-A987-E8D2063058B8}"/>
-          </ac:cxnSpMkLst>
-        </pc:cxnChg>
-      </pc:sldChg>
-      <pc:sldChg chg="modSp mod">
-        <pc:chgData name="Lipani, Aldo" userId="3d811883-7188-4056-86e4-ebeb30c53017" providerId="ADAL" clId="{667C833C-76E4-6248-A772-9C8DA58B4060}" dt="2020-10-03T20:18:52.480" v="3178" actId="1076"/>
-        <pc:sldMkLst>
-          <pc:docMk/>
-          <pc:sldMk cId="1884611820" sldId="922"/>
-        </pc:sldMkLst>
-        <pc:picChg chg="mod">
-          <ac:chgData name="Lipani, Aldo" userId="3d811883-7188-4056-86e4-ebeb30c53017" providerId="ADAL" clId="{667C833C-76E4-6248-A772-9C8DA58B4060}" dt="2020-10-03T20:18:52.480" v="3178" actId="1076"/>
-          <ac:picMkLst>
-            <pc:docMk/>
-            <pc:sldMk cId="1884611820" sldId="922"/>
-            <ac:picMk id="2" creationId="{E7357855-0CCB-D040-A7F4-498A73F51159}"/>
-          </ac:picMkLst>
-        </pc:picChg>
-      </pc:sldChg>
-      <pc:sldChg chg="modSp mod">
-        <pc:chgData name="Lipani, Aldo" userId="3d811883-7188-4056-86e4-ebeb30c53017" providerId="ADAL" clId="{667C833C-76E4-6248-A772-9C8DA58B4060}" dt="2020-10-03T20:18:18.260" v="3177" actId="20577"/>
-        <pc:sldMkLst>
-          <pc:docMk/>
-          <pc:sldMk cId="1753081378" sldId="923"/>
-        </pc:sldMkLst>
-        <pc:spChg chg="mod">
-          <ac:chgData name="Lipani, Aldo" userId="3d811883-7188-4056-86e4-ebeb30c53017" providerId="ADAL" clId="{667C833C-76E4-6248-A772-9C8DA58B4060}" dt="2020-10-03T20:18:18.260" v="3177" actId="20577"/>
-          <ac:spMkLst>
-            <pc:docMk/>
-            <pc:sldMk cId="1753081378" sldId="923"/>
-            <ac:spMk id="6" creationId="{0FFAD120-D3BC-944F-9DD1-CD40205EE10E}"/>
-          </ac:spMkLst>
-        </pc:spChg>
-      </pc:sldChg>
-      <pc:sldChg chg="modSp add del mod">
-        <pc:chgData name="Lipani, Aldo" userId="3d811883-7188-4056-86e4-ebeb30c53017" providerId="ADAL" clId="{667C833C-76E4-6248-A772-9C8DA58B4060}" dt="2020-10-03T18:49:54.727" v="642" actId="2696"/>
-        <pc:sldMkLst>
-          <pc:docMk/>
-          <pc:sldMk cId="2087938308" sldId="925"/>
-        </pc:sldMkLst>
-        <pc:spChg chg="mod">
-          <ac:chgData name="Lipani, Aldo" userId="3d811883-7188-4056-86e4-ebeb30c53017" providerId="ADAL" clId="{667C833C-76E4-6248-A772-9C8DA58B4060}" dt="2020-10-03T18:46:48.607" v="520" actId="20577"/>
-          <ac:spMkLst>
-            <pc:docMk/>
-            <pc:sldMk cId="2087938308" sldId="925"/>
-            <ac:spMk id="4" creationId="{19D76072-E128-D849-8EB1-C4005A112DD9}"/>
-          </ac:spMkLst>
-        </pc:spChg>
-      </pc:sldChg>
-      <pc:sldChg chg="add del">
-        <pc:chgData name="Lipani, Aldo" userId="3d811883-7188-4056-86e4-ebeb30c53017" providerId="ADAL" clId="{667C833C-76E4-6248-A772-9C8DA58B4060}" dt="2020-10-03T19:51:29.345" v="2625" actId="2696"/>
-        <pc:sldMkLst>
-          <pc:docMk/>
-          <pc:sldMk cId="2166635264" sldId="925"/>
-        </pc:sldMkLst>
-      </pc:sldChg>
-      <pc:sldChg chg="addSp delSp modSp add mod">
-        <pc:chgData name="Lipani, Aldo" userId="3d811883-7188-4056-86e4-ebeb30c53017" providerId="ADAL" clId="{667C833C-76E4-6248-A772-9C8DA58B4060}" dt="2020-10-03T20:02:08.467" v="2985" actId="6549"/>
-        <pc:sldMkLst>
-          <pc:docMk/>
-          <pc:sldMk cId="3656755257" sldId="926"/>
-        </pc:sldMkLst>
-        <pc:spChg chg="del">
-          <ac:chgData name="Lipani, Aldo" userId="3d811883-7188-4056-86e4-ebeb30c53017" providerId="ADAL" clId="{667C833C-76E4-6248-A772-9C8DA58B4060}" dt="2020-10-03T19:42:20.240" v="2475" actId="478"/>
-          <ac:spMkLst>
-            <pc:docMk/>
-            <pc:sldMk cId="3656755257" sldId="926"/>
-            <ac:spMk id="2" creationId="{3E8B383A-A87E-0E4F-9751-F06CD7919FB2}"/>
-          </ac:spMkLst>
-        </pc:spChg>
-        <pc:spChg chg="mod">
-          <ac:chgData name="Lipani, Aldo" userId="3d811883-7188-4056-86e4-ebeb30c53017" providerId="ADAL" clId="{667C833C-76E4-6248-A772-9C8DA58B4060}" dt="2020-10-03T20:02:08.467" v="2985" actId="6549"/>
-          <ac:spMkLst>
-            <pc:docMk/>
-            <pc:sldMk cId="3656755257" sldId="926"/>
-            <ac:spMk id="3" creationId="{D6FCC0C7-EF96-8049-B2DE-91A4034D5765}"/>
-          </ac:spMkLst>
-        </pc:spChg>
-        <pc:spChg chg="mod">
-          <ac:chgData name="Lipani, Aldo" userId="3d811883-7188-4056-86e4-ebeb30c53017" providerId="ADAL" clId="{667C833C-76E4-6248-A772-9C8DA58B4060}" dt="2020-10-03T19:49:48.955" v="2599" actId="20577"/>
-          <ac:spMkLst>
-            <pc:docMk/>
-            <pc:sldMk cId="3656755257" sldId="926"/>
-            <ac:spMk id="4" creationId="{19D76072-E128-D849-8EB1-C4005A112DD9}"/>
-          </ac:spMkLst>
-        </pc:spChg>
-        <pc:spChg chg="add del mod">
-          <ac:chgData name="Lipani, Aldo" userId="3d811883-7188-4056-86e4-ebeb30c53017" providerId="ADAL" clId="{667C833C-76E4-6248-A772-9C8DA58B4060}" dt="2020-10-03T19:38:36.839" v="2014" actId="478"/>
-          <ac:spMkLst>
-            <pc:docMk/>
-            <pc:sldMk cId="3656755257" sldId="926"/>
-            <ac:spMk id="6" creationId="{D2A3A607-685C-724A-90E3-382AFB97864B}"/>
-          </ac:spMkLst>
-        </pc:spChg>
-        <pc:spChg chg="del">
-          <ac:chgData name="Lipani, Aldo" userId="3d811883-7188-4056-86e4-ebeb30c53017" providerId="ADAL" clId="{667C833C-76E4-6248-A772-9C8DA58B4060}" dt="2020-10-03T19:42:21.688" v="2477" actId="478"/>
-          <ac:spMkLst>
-            <pc:docMk/>
-            <pc:sldMk cId="3656755257" sldId="926"/>
-            <ac:spMk id="18" creationId="{D25A65EB-D798-884A-8B28-85361D79D817}"/>
-          </ac:spMkLst>
-        </pc:spChg>
-        <pc:spChg chg="del">
-          <ac:chgData name="Lipani, Aldo" userId="3d811883-7188-4056-86e4-ebeb30c53017" providerId="ADAL" clId="{667C833C-76E4-6248-A772-9C8DA58B4060}" dt="2020-10-03T19:42:22.087" v="2478" actId="478"/>
-          <ac:spMkLst>
-            <pc:docMk/>
-            <pc:sldMk cId="3656755257" sldId="926"/>
-            <ac:spMk id="20" creationId="{50D79408-A4D4-A642-855B-A8A6E98CF7AC}"/>
-          </ac:spMkLst>
-        </pc:spChg>
-        <pc:spChg chg="del">
-          <ac:chgData name="Lipani, Aldo" userId="3d811883-7188-4056-86e4-ebeb30c53017" providerId="ADAL" clId="{667C833C-76E4-6248-A772-9C8DA58B4060}" dt="2020-10-03T19:42:21.196" v="2476" actId="478"/>
-          <ac:spMkLst>
-            <pc:docMk/>
-            <pc:sldMk cId="3656755257" sldId="926"/>
-            <ac:spMk id="21" creationId="{64878A4B-3B1F-2940-BF88-9CF409C18885}"/>
-          </ac:spMkLst>
-        </pc:spChg>
-      </pc:sldChg>
-      <pc:sldChg chg="addSp delSp modSp add mod">
-        <pc:chgData name="Lipani, Aldo" userId="3d811883-7188-4056-86e4-ebeb30c53017" providerId="ADAL" clId="{667C833C-76E4-6248-A772-9C8DA58B4060}" dt="2020-10-04T18:41:14.232" v="3352" actId="20577"/>
-        <pc:sldMkLst>
-          <pc:docMk/>
-          <pc:sldMk cId="3703090608" sldId="927"/>
-        </pc:sldMkLst>
-        <pc:spChg chg="mod">
-          <ac:chgData name="Lipani, Aldo" userId="3d811883-7188-4056-86e4-ebeb30c53017" providerId="ADAL" clId="{667C833C-76E4-6248-A772-9C8DA58B4060}" dt="2020-10-04T18:41:14.232" v="3352" actId="20577"/>
-          <ac:spMkLst>
-            <pc:docMk/>
-            <pc:sldMk cId="3703090608" sldId="927"/>
-            <ac:spMk id="3" creationId="{D6FCC0C7-EF96-8049-B2DE-91A4034D5765}"/>
-          </ac:spMkLst>
-        </pc:spChg>
-        <pc:spChg chg="mod">
-          <ac:chgData name="Lipani, Aldo" userId="3d811883-7188-4056-86e4-ebeb30c53017" providerId="ADAL" clId="{667C833C-76E4-6248-A772-9C8DA58B4060}" dt="2020-10-03T20:04:23.719" v="3144" actId="20577"/>
-          <ac:spMkLst>
-            <pc:docMk/>
-            <pc:sldMk cId="3703090608" sldId="927"/>
-            <ac:spMk id="4" creationId="{19D76072-E128-D849-8EB1-C4005A112DD9}"/>
-          </ac:spMkLst>
-        </pc:spChg>
-        <pc:spChg chg="del">
-          <ac:chgData name="Lipani, Aldo" userId="3d811883-7188-4056-86e4-ebeb30c53017" providerId="ADAL" clId="{667C833C-76E4-6248-A772-9C8DA58B4060}" dt="2020-10-03T19:53:06.266" v="2628" actId="478"/>
-          <ac:spMkLst>
-            <pc:docMk/>
-            <pc:sldMk cId="3703090608" sldId="927"/>
-            <ac:spMk id="12" creationId="{21FA620D-FD35-DD4D-8926-CD642768FD0F}"/>
-          </ac:spMkLst>
-        </pc:spChg>
-        <pc:spChg chg="del">
-          <ac:chgData name="Lipani, Aldo" userId="3d811883-7188-4056-86e4-ebeb30c53017" providerId="ADAL" clId="{667C833C-76E4-6248-A772-9C8DA58B4060}" dt="2020-10-03T19:53:06.266" v="2628" actId="478"/>
-          <ac:spMkLst>
-            <pc:docMk/>
-            <pc:sldMk cId="3703090608" sldId="927"/>
-            <ac:spMk id="13" creationId="{09E0221B-BBBC-B04B-98E3-BE56F0FA90A1}"/>
-          </ac:spMkLst>
-        </pc:spChg>
-        <pc:spChg chg="del">
-          <ac:chgData name="Lipani, Aldo" userId="3d811883-7188-4056-86e4-ebeb30c53017" providerId="ADAL" clId="{667C833C-76E4-6248-A772-9C8DA58B4060}" dt="2020-10-03T19:53:06.266" v="2628" actId="478"/>
-          <ac:spMkLst>
-            <pc:docMk/>
-            <pc:sldMk cId="3703090608" sldId="927"/>
-            <ac:spMk id="14" creationId="{ABBA8D2C-2D13-A34C-A6DD-E6B67413544A}"/>
-          </ac:spMkLst>
-        </pc:spChg>
-        <pc:spChg chg="del">
-          <ac:chgData name="Lipani, Aldo" userId="3d811883-7188-4056-86e4-ebeb30c53017" providerId="ADAL" clId="{667C833C-76E4-6248-A772-9C8DA58B4060}" dt="2020-10-03T19:53:06.266" v="2628" actId="478"/>
-          <ac:spMkLst>
-            <pc:docMk/>
-            <pc:sldMk cId="3703090608" sldId="927"/>
-            <ac:spMk id="15" creationId="{3A019D58-F614-5442-8CC0-09ADA36FA448}"/>
-          </ac:spMkLst>
-        </pc:spChg>
-        <pc:spChg chg="del">
-          <ac:chgData name="Lipani, Aldo" userId="3d811883-7188-4056-86e4-ebeb30c53017" providerId="ADAL" clId="{667C833C-76E4-6248-A772-9C8DA58B4060}" dt="2020-10-03T19:53:06.266" v="2628" actId="478"/>
-          <ac:spMkLst>
-            <pc:docMk/>
-            <pc:sldMk cId="3703090608" sldId="927"/>
-            <ac:spMk id="22" creationId="{7942A439-9E5A-834C-A91B-69A738A84228}"/>
-          </ac:spMkLst>
-        </pc:spChg>
-        <pc:spChg chg="del">
-          <ac:chgData name="Lipani, Aldo" userId="3d811883-7188-4056-86e4-ebeb30c53017" providerId="ADAL" clId="{667C833C-76E4-6248-A772-9C8DA58B4060}" dt="2020-10-03T19:53:06.266" v="2628" actId="478"/>
-          <ac:spMkLst>
-            <pc:docMk/>
-            <pc:sldMk cId="3703090608" sldId="927"/>
-            <ac:spMk id="23" creationId="{FF005369-730D-5D4E-BF0B-1AC1EC9C597E}"/>
-          </ac:spMkLst>
-        </pc:spChg>
-        <pc:spChg chg="del">
-          <ac:chgData name="Lipani, Aldo" userId="3d811883-7188-4056-86e4-ebeb30c53017" providerId="ADAL" clId="{667C833C-76E4-6248-A772-9C8DA58B4060}" dt="2020-10-03T19:53:06.266" v="2628" actId="478"/>
-          <ac:spMkLst>
-            <pc:docMk/>
-            <pc:sldMk cId="3703090608" sldId="927"/>
-            <ac:spMk id="24" creationId="{EB3DC001-8361-6540-B003-4D86574BA2CF}"/>
-          </ac:spMkLst>
-        </pc:spChg>
-        <pc:spChg chg="del">
-          <ac:chgData name="Lipani, Aldo" userId="3d811883-7188-4056-86e4-ebeb30c53017" providerId="ADAL" clId="{667C833C-76E4-6248-A772-9C8DA58B4060}" dt="2020-10-03T19:53:06.266" v="2628" actId="478"/>
-          <ac:spMkLst>
-            <pc:docMk/>
-            <pc:sldMk cId="3703090608" sldId="927"/>
-            <ac:spMk id="25" creationId="{79C5E43C-B904-E64C-ABF5-7DC327F416CE}"/>
-          </ac:spMkLst>
-        </pc:spChg>
-        <pc:spChg chg="del">
-          <ac:chgData name="Lipani, Aldo" userId="3d811883-7188-4056-86e4-ebeb30c53017" providerId="ADAL" clId="{667C833C-76E4-6248-A772-9C8DA58B4060}" dt="2020-10-03T19:53:06.266" v="2628" actId="478"/>
-          <ac:spMkLst>
-            <pc:docMk/>
-            <pc:sldMk cId="3703090608" sldId="927"/>
-            <ac:spMk id="26" creationId="{0A98E771-D2B2-4240-A16B-D53F7DB810C6}"/>
-          </ac:spMkLst>
-        </pc:spChg>
-        <pc:spChg chg="del">
-          <ac:chgData name="Lipani, Aldo" userId="3d811883-7188-4056-86e4-ebeb30c53017" providerId="ADAL" clId="{667C833C-76E4-6248-A772-9C8DA58B4060}" dt="2020-10-03T19:53:06.266" v="2628" actId="478"/>
-          <ac:spMkLst>
-            <pc:docMk/>
-            <pc:sldMk cId="3703090608" sldId="927"/>
-            <ac:spMk id="27" creationId="{94CE4DEF-4921-6E4F-A87E-C3620A02A5A2}"/>
-          </ac:spMkLst>
-        </pc:spChg>
-        <pc:spChg chg="del">
-          <ac:chgData name="Lipani, Aldo" userId="3d811883-7188-4056-86e4-ebeb30c53017" providerId="ADAL" clId="{667C833C-76E4-6248-A772-9C8DA58B4060}" dt="2020-10-03T19:53:06.266" v="2628" actId="478"/>
-          <ac:spMkLst>
-            <pc:docMk/>
-            <pc:sldMk cId="3703090608" sldId="927"/>
-            <ac:spMk id="28" creationId="{3C6E4BCF-3B62-6643-BCF6-D0E23EDB6DB1}"/>
-          </ac:spMkLst>
-        </pc:spChg>
-        <pc:spChg chg="del">
-          <ac:chgData name="Lipani, Aldo" userId="3d811883-7188-4056-86e4-ebeb30c53017" providerId="ADAL" clId="{667C833C-76E4-6248-A772-9C8DA58B4060}" dt="2020-10-03T19:53:06.266" v="2628" actId="478"/>
-          <ac:spMkLst>
-            <pc:docMk/>
-            <pc:sldMk cId="3703090608" sldId="927"/>
-            <ac:spMk id="29" creationId="{93844DDF-A03E-254E-B78D-14402935E69E}"/>
-          </ac:spMkLst>
-        </pc:spChg>
-        <pc:spChg chg="del">
-          <ac:chgData name="Lipani, Aldo" userId="3d811883-7188-4056-86e4-ebeb30c53017" providerId="ADAL" clId="{667C833C-76E4-6248-A772-9C8DA58B4060}" dt="2020-10-03T19:53:06.266" v="2628" actId="478"/>
-          <ac:spMkLst>
-            <pc:docMk/>
-            <pc:sldMk cId="3703090608" sldId="927"/>
-            <ac:spMk id="30" creationId="{851451E9-F70A-AB43-86B2-BA56FE7504D5}"/>
-          </ac:spMkLst>
-        </pc:spChg>
-        <pc:spChg chg="add mod">
-          <ac:chgData name="Lipani, Aldo" userId="3d811883-7188-4056-86e4-ebeb30c53017" providerId="ADAL" clId="{667C833C-76E4-6248-A772-9C8DA58B4060}" dt="2020-10-03T19:53:07.108" v="2629"/>
-          <ac:spMkLst>
-            <pc:docMk/>
-            <pc:sldMk cId="3703090608" sldId="927"/>
-            <ac:spMk id="33" creationId="{84469E68-8A73-2940-B74C-6447CF4F031A}"/>
-          </ac:spMkLst>
-        </pc:spChg>
-        <pc:spChg chg="add mod">
-          <ac:chgData name="Lipani, Aldo" userId="3d811883-7188-4056-86e4-ebeb30c53017" providerId="ADAL" clId="{667C833C-76E4-6248-A772-9C8DA58B4060}" dt="2020-10-03T19:54:47.724" v="2740" actId="1076"/>
-          <ac:spMkLst>
-            <pc:docMk/>
-            <pc:sldMk cId="3703090608" sldId="927"/>
-            <ac:spMk id="34" creationId="{63F78C3A-D4FE-D743-9C57-7E60F0509297}"/>
-          </ac:spMkLst>
-        </pc:spChg>
-        <pc:spChg chg="add mod">
-          <ac:chgData name="Lipani, Aldo" userId="3d811883-7188-4056-86e4-ebeb30c53017" providerId="ADAL" clId="{667C833C-76E4-6248-A772-9C8DA58B4060}" dt="2020-10-03T19:53:58.674" v="2635" actId="1076"/>
-          <ac:spMkLst>
-            <pc:docMk/>
-            <pc:sldMk cId="3703090608" sldId="927"/>
-            <ac:spMk id="35" creationId="{2EC24E06-FFA7-F84E-9A43-8FEB83CA169A}"/>
-          </ac:spMkLst>
-        </pc:spChg>
-        <pc:spChg chg="add mod">
-          <ac:chgData name="Lipani, Aldo" userId="3d811883-7188-4056-86e4-ebeb30c53017" providerId="ADAL" clId="{667C833C-76E4-6248-A772-9C8DA58B4060}" dt="2020-10-03T19:54:11.837" v="2638" actId="1076"/>
-          <ac:spMkLst>
-            <pc:docMk/>
-            <pc:sldMk cId="3703090608" sldId="927"/>
-            <ac:spMk id="36" creationId="{9311CD2A-A4C9-E340-AB05-0A825EF84BB9}"/>
-          </ac:spMkLst>
-        </pc:spChg>
-        <pc:spChg chg="add mod">
-          <ac:chgData name="Lipani, Aldo" userId="3d811883-7188-4056-86e4-ebeb30c53017" providerId="ADAL" clId="{667C833C-76E4-6248-A772-9C8DA58B4060}" dt="2020-10-03T19:53:07.108" v="2629"/>
-          <ac:spMkLst>
-            <pc:docMk/>
-            <pc:sldMk cId="3703090608" sldId="927"/>
-            <ac:spMk id="39" creationId="{D5197CBC-1150-B44B-BC78-EE3173CA4469}"/>
-          </ac:spMkLst>
-        </pc:spChg>
-        <pc:spChg chg="add mod">
-          <ac:chgData name="Lipani, Aldo" userId="3d811883-7188-4056-86e4-ebeb30c53017" providerId="ADAL" clId="{667C833C-76E4-6248-A772-9C8DA58B4060}" dt="2020-10-03T19:53:07.108" v="2629"/>
-          <ac:spMkLst>
-            <pc:docMk/>
-            <pc:sldMk cId="3703090608" sldId="927"/>
-            <ac:spMk id="40" creationId="{4147DDB1-D1FC-FC49-B553-1B1FC6D06B37}"/>
-          </ac:spMkLst>
-        </pc:spChg>
-        <pc:spChg chg="add mod">
-          <ac:chgData name="Lipani, Aldo" userId="3d811883-7188-4056-86e4-ebeb30c53017" providerId="ADAL" clId="{667C833C-76E4-6248-A772-9C8DA58B4060}" dt="2020-10-03T19:53:07.108" v="2629"/>
-          <ac:spMkLst>
-            <pc:docMk/>
-            <pc:sldMk cId="3703090608" sldId="927"/>
-            <ac:spMk id="41" creationId="{9E635688-6D3C-124F-9787-39794AF12648}"/>
-          </ac:spMkLst>
-        </pc:spChg>
-        <pc:spChg chg="add mod">
-          <ac:chgData name="Lipani, Aldo" userId="3d811883-7188-4056-86e4-ebeb30c53017" providerId="ADAL" clId="{667C833C-76E4-6248-A772-9C8DA58B4060}" dt="2020-10-03T19:53:07.108" v="2629"/>
-          <ac:spMkLst>
-            <pc:docMk/>
-            <pc:sldMk cId="3703090608" sldId="927"/>
-            <ac:spMk id="42" creationId="{9F0867A3-0E9C-D447-9BAF-3BD846A8304B}"/>
-          </ac:spMkLst>
-        </pc:spChg>
-        <pc:spChg chg="add mod">
-          <ac:chgData name="Lipani, Aldo" userId="3d811883-7188-4056-86e4-ebeb30c53017" providerId="ADAL" clId="{667C833C-76E4-6248-A772-9C8DA58B4060}" dt="2020-10-03T19:54:41.467" v="2739" actId="1038"/>
-          <ac:spMkLst>
-            <pc:docMk/>
-            <pc:sldMk cId="3703090608" sldId="927"/>
-            <ac:spMk id="43" creationId="{50361513-DB61-2B4B-83F1-254315A27DEC}"/>
-          </ac:spMkLst>
-        </pc:spChg>
-        <pc:spChg chg="add mod">
-          <ac:chgData name="Lipani, Aldo" userId="3d811883-7188-4056-86e4-ebeb30c53017" providerId="ADAL" clId="{667C833C-76E4-6248-A772-9C8DA58B4060}" dt="2020-10-03T19:54:28.918" v="2680" actId="1037"/>
-          <ac:spMkLst>
-            <pc:docMk/>
-            <pc:sldMk cId="3703090608" sldId="927"/>
-            <ac:spMk id="44" creationId="{C73B231A-1610-464A-9E21-868C8A84C793}"/>
-          </ac:spMkLst>
-        </pc:spChg>
-        <pc:spChg chg="add mod">
-          <ac:chgData name="Lipani, Aldo" userId="3d811883-7188-4056-86e4-ebeb30c53017" providerId="ADAL" clId="{667C833C-76E4-6248-A772-9C8DA58B4060}" dt="2020-10-03T19:54:38.255" v="2738" actId="1038"/>
-          <ac:spMkLst>
-            <pc:docMk/>
-            <pc:sldMk cId="3703090608" sldId="927"/>
-            <ac:spMk id="45" creationId="{1C8209EE-B564-4A42-9AFE-CFE1798367A6}"/>
-          </ac:spMkLst>
-        </pc:spChg>
-        <pc:cxnChg chg="del">
-          <ac:chgData name="Lipani, Aldo" userId="3d811883-7188-4056-86e4-ebeb30c53017" providerId="ADAL" clId="{667C833C-76E4-6248-A772-9C8DA58B4060}" dt="2020-10-03T19:53:06.266" v="2628" actId="478"/>
-          <ac:cxnSpMkLst>
-            <pc:docMk/>
-            <pc:sldMk cId="3703090608" sldId="927"/>
-            <ac:cxnSpMk id="5" creationId="{53230D9B-4A22-EB40-AAAE-CEC422E4D8E4}"/>
-          </ac:cxnSpMkLst>
-        </pc:cxnChg>
-        <pc:cxnChg chg="del">
-          <ac:chgData name="Lipani, Aldo" userId="3d811883-7188-4056-86e4-ebeb30c53017" providerId="ADAL" clId="{667C833C-76E4-6248-A772-9C8DA58B4060}" dt="2020-10-03T19:53:06.266" v="2628" actId="478"/>
-          <ac:cxnSpMkLst>
-            <pc:docMk/>
-            <pc:sldMk cId="3703090608" sldId="927"/>
-            <ac:cxnSpMk id="7" creationId="{96D19A55-D7B7-4847-882B-7F8AB184E302}"/>
-          </ac:cxnSpMkLst>
-        </pc:cxnChg>
-        <pc:cxnChg chg="del">
-          <ac:chgData name="Lipani, Aldo" userId="3d811883-7188-4056-86e4-ebeb30c53017" providerId="ADAL" clId="{667C833C-76E4-6248-A772-9C8DA58B4060}" dt="2020-10-03T19:53:06.266" v="2628" actId="478"/>
-          <ac:cxnSpMkLst>
-            <pc:docMk/>
-            <pc:sldMk cId="3703090608" sldId="927"/>
-            <ac:cxnSpMk id="17" creationId="{F6528DCB-097C-3E42-999E-1A64780C6228}"/>
-          </ac:cxnSpMkLst>
-        </pc:cxnChg>
-        <pc:cxnChg chg="del">
-          <ac:chgData name="Lipani, Aldo" userId="3d811883-7188-4056-86e4-ebeb30c53017" providerId="ADAL" clId="{667C833C-76E4-6248-A772-9C8DA58B4060}" dt="2020-10-03T19:53:06.266" v="2628" actId="478"/>
-          <ac:cxnSpMkLst>
-            <pc:docMk/>
-            <pc:sldMk cId="3703090608" sldId="927"/>
-            <ac:cxnSpMk id="19" creationId="{3AA5E420-2E21-5A46-ABCD-5E3216BCFADC}"/>
-          </ac:cxnSpMkLst>
-        </pc:cxnChg>
-        <pc:cxnChg chg="add mod">
-          <ac:chgData name="Lipani, Aldo" userId="3d811883-7188-4056-86e4-ebeb30c53017" providerId="ADAL" clId="{667C833C-76E4-6248-A772-9C8DA58B4060}" dt="2020-10-03T19:54:06.027" v="2637" actId="14100"/>
-          <ac:cxnSpMkLst>
-            <pc:docMk/>
-            <pc:sldMk cId="3703090608" sldId="927"/>
-            <ac:cxnSpMk id="31" creationId="{2ACF9993-2954-E840-ABF7-EC61321407AE}"/>
-          </ac:cxnSpMkLst>
-        </pc:cxnChg>
-        <pc:cxnChg chg="add mod">
-          <ac:chgData name="Lipani, Aldo" userId="3d811883-7188-4056-86e4-ebeb30c53017" providerId="ADAL" clId="{667C833C-76E4-6248-A772-9C8DA58B4060}" dt="2020-10-03T19:53:42.033" v="2632" actId="14100"/>
-          <ac:cxnSpMkLst>
-            <pc:docMk/>
-            <pc:sldMk cId="3703090608" sldId="927"/>
-            <ac:cxnSpMk id="32" creationId="{8078A654-A085-4E47-A4A9-48391C5BB05D}"/>
-          </ac:cxnSpMkLst>
-        </pc:cxnChg>
-        <pc:cxnChg chg="add mod">
-          <ac:chgData name="Lipani, Aldo" userId="3d811883-7188-4056-86e4-ebeb30c53017" providerId="ADAL" clId="{667C833C-76E4-6248-A772-9C8DA58B4060}" dt="2020-10-03T19:53:07.108" v="2629"/>
-          <ac:cxnSpMkLst>
-            <pc:docMk/>
-            <pc:sldMk cId="3703090608" sldId="927"/>
-            <ac:cxnSpMk id="37" creationId="{D5B0F82D-7C79-4B4E-8654-DE9C7E2127F7}"/>
-          </ac:cxnSpMkLst>
-        </pc:cxnChg>
-        <pc:cxnChg chg="add mod">
-          <ac:chgData name="Lipani, Aldo" userId="3d811883-7188-4056-86e4-ebeb30c53017" providerId="ADAL" clId="{667C833C-76E4-6248-A772-9C8DA58B4060}" dt="2020-10-03T19:53:07.108" v="2629"/>
-          <ac:cxnSpMkLst>
-            <pc:docMk/>
-            <pc:sldMk cId="3703090608" sldId="927"/>
-            <ac:cxnSpMk id="38" creationId="{2C2360FA-DD48-8345-95F6-EEDB83B200BF}"/>
-          </ac:cxnSpMkLst>
-        </pc:cxnChg>
-      </pc:sldChg>
-      <pc:sldChg chg="add del">
-        <pc:chgData name="Lipani, Aldo" userId="3d811883-7188-4056-86e4-ebeb30c53017" providerId="ADAL" clId="{667C833C-76E4-6248-A772-9C8DA58B4060}" dt="2020-10-03T20:01:16.050" v="2984" actId="2696"/>
-        <pc:sldMkLst>
-          <pc:docMk/>
-          <pc:sldMk cId="3298382777" sldId="928"/>
-        </pc:sldMkLst>
-      </pc:sldChg>
-      <pc:sldChg chg="modSp add mod ord">
-        <pc:chgData name="Lipani, Aldo" userId="3d811883-7188-4056-86e4-ebeb30c53017" providerId="ADAL" clId="{667C833C-76E4-6248-A772-9C8DA58B4060}" dt="2020-10-03T20:55:58.534" v="3236" actId="20577"/>
-        <pc:sldMkLst>
-          <pc:docMk/>
-          <pc:sldMk cId="3742423741" sldId="928"/>
-        </pc:sldMkLst>
-        <pc:spChg chg="mod">
-          <ac:chgData name="Lipani, Aldo" userId="3d811883-7188-4056-86e4-ebeb30c53017" providerId="ADAL" clId="{667C833C-76E4-6248-A772-9C8DA58B4060}" dt="2020-10-03T20:55:58.534" v="3236" actId="20577"/>
-          <ac:spMkLst>
-            <pc:docMk/>
-            <pc:sldMk cId="3742423741" sldId="928"/>
-            <ac:spMk id="6" creationId="{566B908A-85C8-D84C-A24B-BA8943763699}"/>
-          </ac:spMkLst>
-        </pc:spChg>
-      </pc:sldChg>
-    </pc:docChg>
-  </pc:docChgLst>
-  <pc:docChgLst>
-    <pc:chgData name="Lipani, Aldo" userId="3d811883-7188-4056-86e4-ebeb30c53017" providerId="ADAL" clId="{3215D4EB-4E6F-1E44-BC52-19D9BFC4C212}"/>
-    <pc:docChg chg="undo custSel addSld delSld modSld sldOrd">
-      <pc:chgData name="Lipani, Aldo" userId="3d811883-7188-4056-86e4-ebeb30c53017" providerId="ADAL" clId="{3215D4EB-4E6F-1E44-BC52-19D9BFC4C212}" dt="2019-10-14T12:29:55.095" v="14738" actId="20577"/>
-      <pc:docMkLst>
-        <pc:docMk/>
-      </pc:docMkLst>
-      <pc:sldChg chg="modSp">
-        <pc:chgData name="Lipani, Aldo" userId="3d811883-7188-4056-86e4-ebeb30c53017" providerId="ADAL" clId="{3215D4EB-4E6F-1E44-BC52-19D9BFC4C212}" dt="2019-10-12T12:38:46.830" v="913" actId="20577"/>
-        <pc:sldMkLst>
-          <pc:docMk/>
-          <pc:sldMk cId="3972362767" sldId="555"/>
-        </pc:sldMkLst>
-        <pc:spChg chg="mod">
-          <ac:chgData name="Lipani, Aldo" userId="3d811883-7188-4056-86e4-ebeb30c53017" providerId="ADAL" clId="{3215D4EB-4E6F-1E44-BC52-19D9BFC4C212}" dt="2019-10-12T12:38:46.830" v="913" actId="20577"/>
-          <ac:spMkLst>
-            <pc:docMk/>
-            <pc:sldMk cId="3972362767" sldId="555"/>
-            <ac:spMk id="4099" creationId="{00000000-0000-0000-0000-000000000000}"/>
-          </ac:spMkLst>
-        </pc:spChg>
-      </pc:sldChg>
-      <pc:sldChg chg="addSp modSp add">
-        <pc:chgData name="Lipani, Aldo" userId="3d811883-7188-4056-86e4-ebeb30c53017" providerId="ADAL" clId="{3215D4EB-4E6F-1E44-BC52-19D9BFC4C212}" dt="2019-10-14T07:33:13.363" v="12545" actId="1076"/>
-        <pc:sldMkLst>
-          <pc:docMk/>
-          <pc:sldMk cId="1434595258" sldId="774"/>
-        </pc:sldMkLst>
-        <pc:spChg chg="add mod">
-          <ac:chgData name="Lipani, Aldo" userId="3d811883-7188-4056-86e4-ebeb30c53017" providerId="ADAL" clId="{3215D4EB-4E6F-1E44-BC52-19D9BFC4C212}" dt="2019-10-14T07:32:26.912" v="12544" actId="1076"/>
+          <ac:chgData name="Lipani, Aldo" userId="3d811883-7188-4056-86e4-ebeb30c53017" providerId="ADAL" clId="{1457813F-0612-9043-9EAA-808A886FE91F}" dt="2019-10-21T07:17:35.157" v="7540" actId="20577"/>
           <ac:spMkLst>
             <pc:docMk/>
             <pc:sldMk cId="1434595258" sldId="774"/>
             <ac:spMk id="2" creationId="{9AE5409A-9286-7044-A1EA-52438B22570C}"/>
           </ac:spMkLst>
         </pc:spChg>
-        <pc:spChg chg="mod">
-          <ac:chgData name="Lipani, Aldo" userId="3d811883-7188-4056-86e4-ebeb30c53017" providerId="ADAL" clId="{3215D4EB-4E6F-1E44-BC52-19D9BFC4C212}" dt="2019-10-14T07:33:13.363" v="12545" actId="1076"/>
-          <ac:spMkLst>
-            <pc:docMk/>
-            <pc:sldMk cId="1434595258" sldId="774"/>
-            <ac:spMk id="18" creationId="{72724FD1-1382-D145-B1B6-6C1EFC4C7110}"/>
-          </ac:spMkLst>
-        </pc:spChg>
-        <pc:picChg chg="mod">
-          <ac:chgData name="Lipani, Aldo" userId="3d811883-7188-4056-86e4-ebeb30c53017" providerId="ADAL" clId="{3215D4EB-4E6F-1E44-BC52-19D9BFC4C212}" dt="2019-10-14T07:33:13.363" v="12545" actId="1076"/>
-          <ac:picMkLst>
-            <pc:docMk/>
-            <pc:sldMk cId="1434595258" sldId="774"/>
-            <ac:picMk id="17" creationId="{5BDDDEFB-CFB0-6742-AADD-1DD215E11B8D}"/>
-          </ac:picMkLst>
-        </pc:picChg>
       </pc:sldChg>
-      <pc:sldChg chg="modSp add ord">
-        <pc:chgData name="Lipani, Aldo" userId="3d811883-7188-4056-86e4-ebeb30c53017" providerId="ADAL" clId="{3215D4EB-4E6F-1E44-BC52-19D9BFC4C212}" dt="2019-10-12T12:40:12.953" v="943" actId="20577"/>
+      <pc:sldChg chg="modSp">
+        <pc:chgData name="Lipani, Aldo" userId="3d811883-7188-4056-86e4-ebeb30c53017" providerId="ADAL" clId="{1457813F-0612-9043-9EAA-808A886FE91F}" dt="2019-10-20T18:33:11.552" v="2355" actId="20577"/>
         <pc:sldMkLst>
           <pc:docMk/>
           <pc:sldMk cId="844796453" sldId="783"/>
         </pc:sldMkLst>
         <pc:spChg chg="mod">
-          <ac:chgData name="Lipani, Aldo" userId="3d811883-7188-4056-86e4-ebeb30c53017" providerId="ADAL" clId="{3215D4EB-4E6F-1E44-BC52-19D9BFC4C212}" dt="2019-10-12T12:40:12.953" v="943" actId="20577"/>
+          <ac:chgData name="Lipani, Aldo" userId="3d811883-7188-4056-86e4-ebeb30c53017" providerId="ADAL" clId="{1457813F-0612-9043-9EAA-808A886FE91F}" dt="2019-10-20T18:33:11.552" v="2355" actId="20577"/>
           <ac:spMkLst>
             <pc:docMk/>
             <pc:sldMk cId="844796453" sldId="783"/>
             <ac:spMk id="6" creationId="{566B908A-85C8-D84C-A24B-BA8943763699}"/>
-          </ac:spMkLst>
-        </pc:spChg>
-      </pc:sldChg>
-    </pc:docChg>
-  </pc:docChgLst>
-  <pc:docChgLst>
-    <pc:chgData name="Lipani, Aldo" userId="3d811883-7188-4056-86e4-ebeb30c53017" providerId="ADAL" clId="{D276DF11-7755-1742-A60E-641ACB413E1F}"/>
-    <pc:docChg chg="undo custSel modSld sldOrd">
-      <pc:chgData name="Lipani, Aldo" userId="3d811883-7188-4056-86e4-ebeb30c53017" providerId="ADAL" clId="{D276DF11-7755-1742-A60E-641ACB413E1F}" dt="2019-09-30T12:36:23.840" v="662" actId="1035"/>
-      <pc:docMkLst>
-        <pc:docMk/>
-      </pc:docMkLst>
-      <pc:sldChg chg="modSp">
-        <pc:chgData name="Lipani, Aldo" userId="3d811883-7188-4056-86e4-ebeb30c53017" providerId="ADAL" clId="{D276DF11-7755-1742-A60E-641ACB413E1F}" dt="2019-09-30T11:12:54.887" v="12" actId="20577"/>
-        <pc:sldMkLst>
-          <pc:docMk/>
-          <pc:sldMk cId="3972362767" sldId="555"/>
-        </pc:sldMkLst>
-        <pc:spChg chg="mod">
-          <ac:chgData name="Lipani, Aldo" userId="3d811883-7188-4056-86e4-ebeb30c53017" providerId="ADAL" clId="{D276DF11-7755-1742-A60E-641ACB413E1F}" dt="2019-09-30T11:12:54.887" v="12" actId="20577"/>
-          <ac:spMkLst>
-            <pc:docMk/>
-            <pc:sldMk cId="3972362767" sldId="555"/>
-            <ac:spMk id="4099" creationId="{00000000-0000-0000-0000-000000000000}"/>
           </ac:spMkLst>
         </pc:spChg>
       </pc:sldChg>
@@ -3931,60 +2751,6 @@
     </pc:docChg>
   </pc:docChgLst>
   <pc:docChgLst>
-    <pc:chgData name="Lipani, Aldo" userId="3d811883-7188-4056-86e4-ebeb30c53017" providerId="ADAL" clId="{1457813F-0612-9043-9EAA-808A886FE91F}"/>
-    <pc:docChg chg="undo custSel addSld delSld modSld sldOrd">
-      <pc:chgData name="Lipani, Aldo" userId="3d811883-7188-4056-86e4-ebeb30c53017" providerId="ADAL" clId="{1457813F-0612-9043-9EAA-808A886FE91F}" dt="2019-10-21T15:46:51.902" v="8071" actId="404"/>
-      <pc:docMkLst>
-        <pc:docMk/>
-      </pc:docMkLst>
-      <pc:sldChg chg="modSp">
-        <pc:chgData name="Lipani, Aldo" userId="3d811883-7188-4056-86e4-ebeb30c53017" providerId="ADAL" clId="{1457813F-0612-9043-9EAA-808A886FE91F}" dt="2019-10-21T11:13:11.745" v="7665" actId="20577"/>
-        <pc:sldMkLst>
-          <pc:docMk/>
-          <pc:sldMk cId="3972362767" sldId="555"/>
-        </pc:sldMkLst>
-        <pc:spChg chg="mod">
-          <ac:chgData name="Lipani, Aldo" userId="3d811883-7188-4056-86e4-ebeb30c53017" providerId="ADAL" clId="{1457813F-0612-9043-9EAA-808A886FE91F}" dt="2019-10-21T11:13:11.745" v="7665" actId="20577"/>
-          <ac:spMkLst>
-            <pc:docMk/>
-            <pc:sldMk cId="3972362767" sldId="555"/>
-            <ac:spMk id="4099" creationId="{00000000-0000-0000-0000-000000000000}"/>
-          </ac:spMkLst>
-        </pc:spChg>
-      </pc:sldChg>
-      <pc:sldChg chg="modSp">
-        <pc:chgData name="Lipani, Aldo" userId="3d811883-7188-4056-86e4-ebeb30c53017" providerId="ADAL" clId="{1457813F-0612-9043-9EAA-808A886FE91F}" dt="2019-10-21T07:17:35.157" v="7540" actId="20577"/>
-        <pc:sldMkLst>
-          <pc:docMk/>
-          <pc:sldMk cId="1434595258" sldId="774"/>
-        </pc:sldMkLst>
-        <pc:spChg chg="mod">
-          <ac:chgData name="Lipani, Aldo" userId="3d811883-7188-4056-86e4-ebeb30c53017" providerId="ADAL" clId="{1457813F-0612-9043-9EAA-808A886FE91F}" dt="2019-10-21T07:17:35.157" v="7540" actId="20577"/>
-          <ac:spMkLst>
-            <pc:docMk/>
-            <pc:sldMk cId="1434595258" sldId="774"/>
-            <ac:spMk id="2" creationId="{9AE5409A-9286-7044-A1EA-52438B22570C}"/>
-          </ac:spMkLst>
-        </pc:spChg>
-      </pc:sldChg>
-      <pc:sldChg chg="modSp">
-        <pc:chgData name="Lipani, Aldo" userId="3d811883-7188-4056-86e4-ebeb30c53017" providerId="ADAL" clId="{1457813F-0612-9043-9EAA-808A886FE91F}" dt="2019-10-20T18:33:11.552" v="2355" actId="20577"/>
-        <pc:sldMkLst>
-          <pc:docMk/>
-          <pc:sldMk cId="844796453" sldId="783"/>
-        </pc:sldMkLst>
-        <pc:spChg chg="mod">
-          <ac:chgData name="Lipani, Aldo" userId="3d811883-7188-4056-86e4-ebeb30c53017" providerId="ADAL" clId="{1457813F-0612-9043-9EAA-808A886FE91F}" dt="2019-10-20T18:33:11.552" v="2355" actId="20577"/>
-          <ac:spMkLst>
-            <pc:docMk/>
-            <pc:sldMk cId="844796453" sldId="783"/>
-            <ac:spMk id="6" creationId="{566B908A-85C8-D84C-A24B-BA8943763699}"/>
-          </ac:spMkLst>
-        </pc:spChg>
-      </pc:sldChg>
-    </pc:docChg>
-  </pc:docChgLst>
-  <pc:docChgLst>
     <pc:chgData name="Lipani, Aldo" userId="3d811883-7188-4056-86e4-ebeb30c53017" providerId="ADAL" clId="{0C97AF31-43BD-EE43-B6C7-6475BAF3D5E0}"/>
     <pc:docChg chg="undo custSel addSld delSld modSld sldOrd">
       <pc:chgData name="Lipani, Aldo" userId="3d811883-7188-4056-86e4-ebeb30c53017" providerId="ADAL" clId="{0C97AF31-43BD-EE43-B6C7-6475BAF3D5E0}" dt="2019-10-06T14:40:04.670" v="8734" actId="20577"/>
@@ -4003,6 +2769,1240 @@
             <pc:docMk/>
             <pc:sldMk cId="3972362767" sldId="555"/>
             <ac:spMk id="4099" creationId="{00000000-0000-0000-0000-000000000000}"/>
+          </ac:spMkLst>
+        </pc:spChg>
+      </pc:sldChg>
+    </pc:docChg>
+  </pc:docChgLst>
+  <pc:docChgLst>
+    <pc:chgData name="Lipani, Aldo" userId="3d811883-7188-4056-86e4-ebeb30c53017" providerId="ADAL" clId="{3215D4EB-4E6F-1E44-BC52-19D9BFC4C212}"/>
+    <pc:docChg chg="undo custSel addSld delSld modSld sldOrd">
+      <pc:chgData name="Lipani, Aldo" userId="3d811883-7188-4056-86e4-ebeb30c53017" providerId="ADAL" clId="{3215D4EB-4E6F-1E44-BC52-19D9BFC4C212}" dt="2019-10-14T12:29:55.095" v="14738" actId="20577"/>
+      <pc:docMkLst>
+        <pc:docMk/>
+      </pc:docMkLst>
+      <pc:sldChg chg="modSp">
+        <pc:chgData name="Lipani, Aldo" userId="3d811883-7188-4056-86e4-ebeb30c53017" providerId="ADAL" clId="{3215D4EB-4E6F-1E44-BC52-19D9BFC4C212}" dt="2019-10-12T12:38:46.830" v="913" actId="20577"/>
+        <pc:sldMkLst>
+          <pc:docMk/>
+          <pc:sldMk cId="3972362767" sldId="555"/>
+        </pc:sldMkLst>
+        <pc:spChg chg="mod">
+          <ac:chgData name="Lipani, Aldo" userId="3d811883-7188-4056-86e4-ebeb30c53017" providerId="ADAL" clId="{3215D4EB-4E6F-1E44-BC52-19D9BFC4C212}" dt="2019-10-12T12:38:46.830" v="913" actId="20577"/>
+          <ac:spMkLst>
+            <pc:docMk/>
+            <pc:sldMk cId="3972362767" sldId="555"/>
+            <ac:spMk id="4099" creationId="{00000000-0000-0000-0000-000000000000}"/>
+          </ac:spMkLst>
+        </pc:spChg>
+      </pc:sldChg>
+      <pc:sldChg chg="addSp modSp add">
+        <pc:chgData name="Lipani, Aldo" userId="3d811883-7188-4056-86e4-ebeb30c53017" providerId="ADAL" clId="{3215D4EB-4E6F-1E44-BC52-19D9BFC4C212}" dt="2019-10-14T07:33:13.363" v="12545" actId="1076"/>
+        <pc:sldMkLst>
+          <pc:docMk/>
+          <pc:sldMk cId="1434595258" sldId="774"/>
+        </pc:sldMkLst>
+        <pc:spChg chg="add mod">
+          <ac:chgData name="Lipani, Aldo" userId="3d811883-7188-4056-86e4-ebeb30c53017" providerId="ADAL" clId="{3215D4EB-4E6F-1E44-BC52-19D9BFC4C212}" dt="2019-10-14T07:32:26.912" v="12544" actId="1076"/>
+          <ac:spMkLst>
+            <pc:docMk/>
+            <pc:sldMk cId="1434595258" sldId="774"/>
+            <ac:spMk id="2" creationId="{9AE5409A-9286-7044-A1EA-52438B22570C}"/>
+          </ac:spMkLst>
+        </pc:spChg>
+        <pc:spChg chg="mod">
+          <ac:chgData name="Lipani, Aldo" userId="3d811883-7188-4056-86e4-ebeb30c53017" providerId="ADAL" clId="{3215D4EB-4E6F-1E44-BC52-19D9BFC4C212}" dt="2019-10-14T07:33:13.363" v="12545" actId="1076"/>
+          <ac:spMkLst>
+            <pc:docMk/>
+            <pc:sldMk cId="1434595258" sldId="774"/>
+            <ac:spMk id="18" creationId="{72724FD1-1382-D145-B1B6-6C1EFC4C7110}"/>
+          </ac:spMkLst>
+        </pc:spChg>
+        <pc:picChg chg="mod">
+          <ac:chgData name="Lipani, Aldo" userId="3d811883-7188-4056-86e4-ebeb30c53017" providerId="ADAL" clId="{3215D4EB-4E6F-1E44-BC52-19D9BFC4C212}" dt="2019-10-14T07:33:13.363" v="12545" actId="1076"/>
+          <ac:picMkLst>
+            <pc:docMk/>
+            <pc:sldMk cId="1434595258" sldId="774"/>
+            <ac:picMk id="17" creationId="{5BDDDEFB-CFB0-6742-AADD-1DD215E11B8D}"/>
+          </ac:picMkLst>
+        </pc:picChg>
+      </pc:sldChg>
+      <pc:sldChg chg="modSp add ord">
+        <pc:chgData name="Lipani, Aldo" userId="3d811883-7188-4056-86e4-ebeb30c53017" providerId="ADAL" clId="{3215D4EB-4E6F-1E44-BC52-19D9BFC4C212}" dt="2019-10-12T12:40:12.953" v="943" actId="20577"/>
+        <pc:sldMkLst>
+          <pc:docMk/>
+          <pc:sldMk cId="844796453" sldId="783"/>
+        </pc:sldMkLst>
+        <pc:spChg chg="mod">
+          <ac:chgData name="Lipani, Aldo" userId="3d811883-7188-4056-86e4-ebeb30c53017" providerId="ADAL" clId="{3215D4EB-4E6F-1E44-BC52-19D9BFC4C212}" dt="2019-10-12T12:40:12.953" v="943" actId="20577"/>
+          <ac:spMkLst>
+            <pc:docMk/>
+            <pc:sldMk cId="844796453" sldId="783"/>
+            <ac:spMk id="6" creationId="{566B908A-85C8-D84C-A24B-BA8943763699}"/>
+          </ac:spMkLst>
+        </pc:spChg>
+      </pc:sldChg>
+    </pc:docChg>
+  </pc:docChgLst>
+  <pc:docChgLst>
+    <pc:chgData name="Lipani, Aldo" userId="3d811883-7188-4056-86e4-ebeb30c53017" providerId="ADAL" clId="{D276DF11-7755-1742-A60E-641ACB413E1F}"/>
+    <pc:docChg chg="undo custSel modSld sldOrd">
+      <pc:chgData name="Lipani, Aldo" userId="3d811883-7188-4056-86e4-ebeb30c53017" providerId="ADAL" clId="{D276DF11-7755-1742-A60E-641ACB413E1F}" dt="2019-09-30T12:36:23.840" v="662" actId="1035"/>
+      <pc:docMkLst>
+        <pc:docMk/>
+      </pc:docMkLst>
+      <pc:sldChg chg="modSp">
+        <pc:chgData name="Lipani, Aldo" userId="3d811883-7188-4056-86e4-ebeb30c53017" providerId="ADAL" clId="{D276DF11-7755-1742-A60E-641ACB413E1F}" dt="2019-09-30T11:12:54.887" v="12" actId="20577"/>
+        <pc:sldMkLst>
+          <pc:docMk/>
+          <pc:sldMk cId="3972362767" sldId="555"/>
+        </pc:sldMkLst>
+        <pc:spChg chg="mod">
+          <ac:chgData name="Lipani, Aldo" userId="3d811883-7188-4056-86e4-ebeb30c53017" providerId="ADAL" clId="{D276DF11-7755-1742-A60E-641ACB413E1F}" dt="2019-09-30T11:12:54.887" v="12" actId="20577"/>
+          <ac:spMkLst>
+            <pc:docMk/>
+            <pc:sldMk cId="3972362767" sldId="555"/>
+            <ac:spMk id="4099" creationId="{00000000-0000-0000-0000-000000000000}"/>
+          </ac:spMkLst>
+        </pc:spChg>
+      </pc:sldChg>
+    </pc:docChg>
+  </pc:docChgLst>
+  <pc:docChgLst>
+    <pc:chgData name="Lipani, Aldo" userId="3d811883-7188-4056-86e4-ebeb30c53017" providerId="ADAL" clId="{667C833C-76E4-6248-A772-9C8DA58B4060}"/>
+    <pc:docChg chg="undo custSel addSld delSld modSld sldOrd">
+      <pc:chgData name="Lipani, Aldo" userId="3d811883-7188-4056-86e4-ebeb30c53017" providerId="ADAL" clId="{667C833C-76E4-6248-A772-9C8DA58B4060}" dt="2020-10-04T19:09:26.501" v="3402" actId="20577"/>
+      <pc:docMkLst>
+        <pc:docMk/>
+      </pc:docMkLst>
+      <pc:sldChg chg="modSp mod">
+        <pc:chgData name="Lipani, Aldo" userId="3d811883-7188-4056-86e4-ebeb30c53017" providerId="ADAL" clId="{667C833C-76E4-6248-A772-9C8DA58B4060}" dt="2020-10-03T21:57:44.800" v="3255" actId="20577"/>
+        <pc:sldMkLst>
+          <pc:docMk/>
+          <pc:sldMk cId="3972362767" sldId="555"/>
+        </pc:sldMkLst>
+        <pc:spChg chg="mod">
+          <ac:chgData name="Lipani, Aldo" userId="3d811883-7188-4056-86e4-ebeb30c53017" providerId="ADAL" clId="{667C833C-76E4-6248-A772-9C8DA58B4060}" dt="2020-10-03T21:57:44.800" v="3255" actId="20577"/>
+          <ac:spMkLst>
+            <pc:docMk/>
+            <pc:sldMk cId="3972362767" sldId="555"/>
+            <ac:spMk id="4099" creationId="{00000000-0000-0000-0000-000000000000}"/>
+          </ac:spMkLst>
+        </pc:spChg>
+      </pc:sldChg>
+      <pc:sldChg chg="del">
+        <pc:chgData name="Lipani, Aldo" userId="3d811883-7188-4056-86e4-ebeb30c53017" providerId="ADAL" clId="{667C833C-76E4-6248-A772-9C8DA58B4060}" dt="2020-10-03T20:17:52.467" v="3173" actId="2696"/>
+        <pc:sldMkLst>
+          <pc:docMk/>
+          <pc:sldMk cId="1434595258" sldId="774"/>
+        </pc:sldMkLst>
+      </pc:sldChg>
+      <pc:sldChg chg="del">
+        <pc:chgData name="Lipani, Aldo" userId="3d811883-7188-4056-86e4-ebeb30c53017" providerId="ADAL" clId="{667C833C-76E4-6248-A772-9C8DA58B4060}" dt="2020-10-03T14:57:13.887" v="5" actId="2696"/>
+        <pc:sldMkLst>
+          <pc:docMk/>
+          <pc:sldMk cId="117916467" sldId="866"/>
+        </pc:sldMkLst>
+      </pc:sldChg>
+      <pc:sldChg chg="modSp add mod">
+        <pc:chgData name="Lipani, Aldo" userId="3d811883-7188-4056-86e4-ebeb30c53017" providerId="ADAL" clId="{667C833C-76E4-6248-A772-9C8DA58B4060}" dt="2020-10-03T15:10:17.075" v="42" actId="20577"/>
+        <pc:sldMkLst>
+          <pc:docMk/>
+          <pc:sldMk cId="3011458422" sldId="866"/>
+        </pc:sldMkLst>
+        <pc:spChg chg="mod">
+          <ac:chgData name="Lipani, Aldo" userId="3d811883-7188-4056-86e4-ebeb30c53017" providerId="ADAL" clId="{667C833C-76E4-6248-A772-9C8DA58B4060}" dt="2020-10-03T15:10:17.075" v="42" actId="20577"/>
+          <ac:spMkLst>
+            <pc:docMk/>
+            <pc:sldMk cId="3011458422" sldId="866"/>
+            <ac:spMk id="9" creationId="{3AB3BC18-199B-C44F-B339-573547996898}"/>
+          </ac:spMkLst>
+        </pc:spChg>
+      </pc:sldChg>
+      <pc:sldChg chg="add">
+        <pc:chgData name="Lipani, Aldo" userId="3d811883-7188-4056-86e4-ebeb30c53017" providerId="ADAL" clId="{667C833C-76E4-6248-A772-9C8DA58B4060}" dt="2020-10-03T14:57:22.561" v="13"/>
+        <pc:sldMkLst>
+          <pc:docMk/>
+          <pc:sldMk cId="774799973" sldId="868"/>
+        </pc:sldMkLst>
+      </pc:sldChg>
+      <pc:sldChg chg="del">
+        <pc:chgData name="Lipani, Aldo" userId="3d811883-7188-4056-86e4-ebeb30c53017" providerId="ADAL" clId="{667C833C-76E4-6248-A772-9C8DA58B4060}" dt="2020-10-03T14:57:20.479" v="12" actId="2696"/>
+        <pc:sldMkLst>
+          <pc:docMk/>
+          <pc:sldMk cId="850156035" sldId="868"/>
+        </pc:sldMkLst>
+      </pc:sldChg>
+      <pc:sldChg chg="del">
+        <pc:chgData name="Lipani, Aldo" userId="3d811883-7188-4056-86e4-ebeb30c53017" providerId="ADAL" clId="{667C833C-76E4-6248-A772-9C8DA58B4060}" dt="2020-10-03T14:57:19.796" v="11" actId="2696"/>
+        <pc:sldMkLst>
+          <pc:docMk/>
+          <pc:sldMk cId="1139425063" sldId="875"/>
+        </pc:sldMkLst>
+      </pc:sldChg>
+      <pc:sldChg chg="add">
+        <pc:chgData name="Lipani, Aldo" userId="3d811883-7188-4056-86e4-ebeb30c53017" providerId="ADAL" clId="{667C833C-76E4-6248-A772-9C8DA58B4060}" dt="2020-10-03T14:57:22.561" v="13"/>
+        <pc:sldMkLst>
+          <pc:docMk/>
+          <pc:sldMk cId="1870394214" sldId="875"/>
+        </pc:sldMkLst>
+      </pc:sldChg>
+      <pc:sldChg chg="add">
+        <pc:chgData name="Lipani, Aldo" userId="3d811883-7188-4056-86e4-ebeb30c53017" providerId="ADAL" clId="{667C833C-76E4-6248-A772-9C8DA58B4060}" dt="2020-10-03T14:57:22.561" v="13"/>
+        <pc:sldMkLst>
+          <pc:docMk/>
+          <pc:sldMk cId="156753667" sldId="876"/>
+        </pc:sldMkLst>
+      </pc:sldChg>
+      <pc:sldChg chg="del">
+        <pc:chgData name="Lipani, Aldo" userId="3d811883-7188-4056-86e4-ebeb30c53017" providerId="ADAL" clId="{667C833C-76E4-6248-A772-9C8DA58B4060}" dt="2020-10-03T14:57:14.871" v="6" actId="2696"/>
+        <pc:sldMkLst>
+          <pc:docMk/>
+          <pc:sldMk cId="3508325250" sldId="876"/>
+        </pc:sldMkLst>
+      </pc:sldChg>
+      <pc:sldChg chg="add">
+        <pc:chgData name="Lipani, Aldo" userId="3d811883-7188-4056-86e4-ebeb30c53017" providerId="ADAL" clId="{667C833C-76E4-6248-A772-9C8DA58B4060}" dt="2020-10-03T14:57:22.561" v="13"/>
+        <pc:sldMkLst>
+          <pc:docMk/>
+          <pc:sldMk cId="1587345812" sldId="877"/>
+        </pc:sldMkLst>
+      </pc:sldChg>
+      <pc:sldChg chg="del">
+        <pc:chgData name="Lipani, Aldo" userId="3d811883-7188-4056-86e4-ebeb30c53017" providerId="ADAL" clId="{667C833C-76E4-6248-A772-9C8DA58B4060}" dt="2020-10-03T14:57:16.168" v="7" actId="2696"/>
+        <pc:sldMkLst>
+          <pc:docMk/>
+          <pc:sldMk cId="3771076271" sldId="877"/>
+        </pc:sldMkLst>
+      </pc:sldChg>
+      <pc:sldChg chg="add">
+        <pc:chgData name="Lipani, Aldo" userId="3d811883-7188-4056-86e4-ebeb30c53017" providerId="ADAL" clId="{667C833C-76E4-6248-A772-9C8DA58B4060}" dt="2020-10-03T14:57:22.561" v="13"/>
+        <pc:sldMkLst>
+          <pc:docMk/>
+          <pc:sldMk cId="1046622488" sldId="878"/>
+        </pc:sldMkLst>
+      </pc:sldChg>
+      <pc:sldChg chg="del">
+        <pc:chgData name="Lipani, Aldo" userId="3d811883-7188-4056-86e4-ebeb30c53017" providerId="ADAL" clId="{667C833C-76E4-6248-A772-9C8DA58B4060}" dt="2020-10-03T14:57:17.102" v="8" actId="2696"/>
+        <pc:sldMkLst>
+          <pc:docMk/>
+          <pc:sldMk cId="3795082422" sldId="878"/>
+        </pc:sldMkLst>
+      </pc:sldChg>
+      <pc:sldChg chg="del">
+        <pc:chgData name="Lipani, Aldo" userId="3d811883-7188-4056-86e4-ebeb30c53017" providerId="ADAL" clId="{667C833C-76E4-6248-A772-9C8DA58B4060}" dt="2020-10-03T14:57:18.439" v="9" actId="2696"/>
+        <pc:sldMkLst>
+          <pc:docMk/>
+          <pc:sldMk cId="1442602589" sldId="879"/>
+        </pc:sldMkLst>
+      </pc:sldChg>
+      <pc:sldChg chg="add">
+        <pc:chgData name="Lipani, Aldo" userId="3d811883-7188-4056-86e4-ebeb30c53017" providerId="ADAL" clId="{667C833C-76E4-6248-A772-9C8DA58B4060}" dt="2020-10-03T14:57:22.561" v="13"/>
+        <pc:sldMkLst>
+          <pc:docMk/>
+          <pc:sldMk cId="3809297050" sldId="879"/>
+        </pc:sldMkLst>
+      </pc:sldChg>
+      <pc:sldChg chg="add">
+        <pc:chgData name="Lipani, Aldo" userId="3d811883-7188-4056-86e4-ebeb30c53017" providerId="ADAL" clId="{667C833C-76E4-6248-A772-9C8DA58B4060}" dt="2020-10-03T14:57:22.561" v="13"/>
+        <pc:sldMkLst>
+          <pc:docMk/>
+          <pc:sldMk cId="2132466136" sldId="880"/>
+        </pc:sldMkLst>
+      </pc:sldChg>
+      <pc:sldChg chg="del">
+        <pc:chgData name="Lipani, Aldo" userId="3d811883-7188-4056-86e4-ebeb30c53017" providerId="ADAL" clId="{667C833C-76E4-6248-A772-9C8DA58B4060}" dt="2020-10-03T14:57:18.965" v="10" actId="2696"/>
+        <pc:sldMkLst>
+          <pc:docMk/>
+          <pc:sldMk cId="2324208589" sldId="880"/>
+        </pc:sldMkLst>
+      </pc:sldChg>
+      <pc:sldChg chg="modSp mod">
+        <pc:chgData name="Lipani, Aldo" userId="3d811883-7188-4056-86e4-ebeb30c53017" providerId="ADAL" clId="{667C833C-76E4-6248-A772-9C8DA58B4060}" dt="2020-10-03T15:22:27.823" v="53" actId="20577"/>
+        <pc:sldMkLst>
+          <pc:docMk/>
+          <pc:sldMk cId="2037749261" sldId="885"/>
+        </pc:sldMkLst>
+        <pc:spChg chg="mod">
+          <ac:chgData name="Lipani, Aldo" userId="3d811883-7188-4056-86e4-ebeb30c53017" providerId="ADAL" clId="{667C833C-76E4-6248-A772-9C8DA58B4060}" dt="2020-10-03T15:22:27.823" v="53" actId="20577"/>
+          <ac:spMkLst>
+            <pc:docMk/>
+            <pc:sldMk cId="2037749261" sldId="885"/>
+            <ac:spMk id="5" creationId="{599AD9FF-BF1C-5047-89FD-16C1D022729A}"/>
+          </ac:spMkLst>
+        </pc:spChg>
+      </pc:sldChg>
+      <pc:sldChg chg="modSp mod">
+        <pc:chgData name="Lipani, Aldo" userId="3d811883-7188-4056-86e4-ebeb30c53017" providerId="ADAL" clId="{667C833C-76E4-6248-A772-9C8DA58B4060}" dt="2020-10-03T15:05:52.843" v="41" actId="6549"/>
+        <pc:sldMkLst>
+          <pc:docMk/>
+          <pc:sldMk cId="2485559801" sldId="887"/>
+        </pc:sldMkLst>
+        <pc:spChg chg="mod">
+          <ac:chgData name="Lipani, Aldo" userId="3d811883-7188-4056-86e4-ebeb30c53017" providerId="ADAL" clId="{667C833C-76E4-6248-A772-9C8DA58B4060}" dt="2020-10-03T15:05:52.843" v="41" actId="6549"/>
+          <ac:spMkLst>
+            <pc:docMk/>
+            <pc:sldMk cId="2485559801" sldId="887"/>
+            <ac:spMk id="5" creationId="{599AD9FF-BF1C-5047-89FD-16C1D022729A}"/>
+          </ac:spMkLst>
+        </pc:spChg>
+      </pc:sldChg>
+      <pc:sldChg chg="modSp mod">
+        <pc:chgData name="Lipani, Aldo" userId="3d811883-7188-4056-86e4-ebeb30c53017" providerId="ADAL" clId="{667C833C-76E4-6248-A772-9C8DA58B4060}" dt="2020-10-03T18:21:12.092" v="61" actId="6549"/>
+        <pc:sldMkLst>
+          <pc:docMk/>
+          <pc:sldMk cId="589867458" sldId="888"/>
+        </pc:sldMkLst>
+        <pc:spChg chg="mod">
+          <ac:chgData name="Lipani, Aldo" userId="3d811883-7188-4056-86e4-ebeb30c53017" providerId="ADAL" clId="{667C833C-76E4-6248-A772-9C8DA58B4060}" dt="2020-10-03T18:21:12.092" v="61" actId="6549"/>
+          <ac:spMkLst>
+            <pc:docMk/>
+            <pc:sldMk cId="589867458" sldId="888"/>
+            <ac:spMk id="5" creationId="{599AD9FF-BF1C-5047-89FD-16C1D022729A}"/>
+          </ac:spMkLst>
+        </pc:spChg>
+      </pc:sldChg>
+      <pc:sldChg chg="modSp mod">
+        <pc:chgData name="Lipani, Aldo" userId="3d811883-7188-4056-86e4-ebeb30c53017" providerId="ADAL" clId="{667C833C-76E4-6248-A772-9C8DA58B4060}" dt="2020-10-03T15:12:11.347" v="44" actId="20577"/>
+        <pc:sldMkLst>
+          <pc:docMk/>
+          <pc:sldMk cId="3492446005" sldId="894"/>
+        </pc:sldMkLst>
+        <pc:spChg chg="mod">
+          <ac:chgData name="Lipani, Aldo" userId="3d811883-7188-4056-86e4-ebeb30c53017" providerId="ADAL" clId="{667C833C-76E4-6248-A772-9C8DA58B4060}" dt="2020-10-03T15:12:11.347" v="44" actId="20577"/>
+          <ac:spMkLst>
+            <pc:docMk/>
+            <pc:sldMk cId="3492446005" sldId="894"/>
+            <ac:spMk id="3" creationId="{2912DE23-1859-EC48-989A-9DCA77F0E4EE}"/>
+          </ac:spMkLst>
+        </pc:spChg>
+      </pc:sldChg>
+      <pc:sldChg chg="modSp mod">
+        <pc:chgData name="Lipani, Aldo" userId="3d811883-7188-4056-86e4-ebeb30c53017" providerId="ADAL" clId="{667C833C-76E4-6248-A772-9C8DA58B4060}" dt="2020-10-03T15:00:04.073" v="33" actId="20577"/>
+        <pc:sldMkLst>
+          <pc:docMk/>
+          <pc:sldMk cId="973325614" sldId="901"/>
+        </pc:sldMkLst>
+        <pc:spChg chg="mod">
+          <ac:chgData name="Lipani, Aldo" userId="3d811883-7188-4056-86e4-ebeb30c53017" providerId="ADAL" clId="{667C833C-76E4-6248-A772-9C8DA58B4060}" dt="2020-10-03T15:00:04.073" v="33" actId="20577"/>
+          <ac:spMkLst>
+            <pc:docMk/>
+            <pc:sldMk cId="973325614" sldId="901"/>
+            <ac:spMk id="3" creationId="{2912DE23-1859-EC48-989A-9DCA77F0E4EE}"/>
+          </ac:spMkLst>
+        </pc:spChg>
+      </pc:sldChg>
+      <pc:sldChg chg="modSp mod">
+        <pc:chgData name="Lipani, Aldo" userId="3d811883-7188-4056-86e4-ebeb30c53017" providerId="ADAL" clId="{667C833C-76E4-6248-A772-9C8DA58B4060}" dt="2020-10-03T15:15:51.139" v="47" actId="20577"/>
+        <pc:sldMkLst>
+          <pc:docMk/>
+          <pc:sldMk cId="3561329938" sldId="902"/>
+        </pc:sldMkLst>
+        <pc:spChg chg="mod">
+          <ac:chgData name="Lipani, Aldo" userId="3d811883-7188-4056-86e4-ebeb30c53017" providerId="ADAL" clId="{667C833C-76E4-6248-A772-9C8DA58B4060}" dt="2020-10-03T15:15:51.139" v="47" actId="20577"/>
+          <ac:spMkLst>
+            <pc:docMk/>
+            <pc:sldMk cId="3561329938" sldId="902"/>
+            <ac:spMk id="3" creationId="{2912DE23-1859-EC48-989A-9DCA77F0E4EE}"/>
+          </ac:spMkLst>
+        </pc:spChg>
+      </pc:sldChg>
+      <pc:sldChg chg="modSp mod">
+        <pc:chgData name="Lipani, Aldo" userId="3d811883-7188-4056-86e4-ebeb30c53017" providerId="ADAL" clId="{667C833C-76E4-6248-A772-9C8DA58B4060}" dt="2020-10-03T15:22:08.525" v="51" actId="20577"/>
+        <pc:sldMkLst>
+          <pc:docMk/>
+          <pc:sldMk cId="2425427212" sldId="904"/>
+        </pc:sldMkLst>
+        <pc:spChg chg="mod">
+          <ac:chgData name="Lipani, Aldo" userId="3d811883-7188-4056-86e4-ebeb30c53017" providerId="ADAL" clId="{667C833C-76E4-6248-A772-9C8DA58B4060}" dt="2020-10-03T15:22:08.525" v="51" actId="20577"/>
+          <ac:spMkLst>
+            <pc:docMk/>
+            <pc:sldMk cId="2425427212" sldId="904"/>
+            <ac:spMk id="3" creationId="{2912DE23-1859-EC48-989A-9DCA77F0E4EE}"/>
+          </ac:spMkLst>
+        </pc:spChg>
+      </pc:sldChg>
+      <pc:sldChg chg="ord">
+        <pc:chgData name="Lipani, Aldo" userId="3d811883-7188-4056-86e4-ebeb30c53017" providerId="ADAL" clId="{667C833C-76E4-6248-A772-9C8DA58B4060}" dt="2020-10-03T20:54:25.785" v="3179" actId="20578"/>
+        <pc:sldMkLst>
+          <pc:docMk/>
+          <pc:sldMk cId="4189697085" sldId="906"/>
+        </pc:sldMkLst>
+      </pc:sldChg>
+      <pc:sldChg chg="modSp mod ord">
+        <pc:chgData name="Lipani, Aldo" userId="3d811883-7188-4056-86e4-ebeb30c53017" providerId="ADAL" clId="{667C833C-76E4-6248-A772-9C8DA58B4060}" dt="2020-10-04T19:09:26.501" v="3402" actId="20577"/>
+        <pc:sldMkLst>
+          <pc:docMk/>
+          <pc:sldMk cId="637209470" sldId="907"/>
+        </pc:sldMkLst>
+        <pc:spChg chg="mod">
+          <ac:chgData name="Lipani, Aldo" userId="3d811883-7188-4056-86e4-ebeb30c53017" providerId="ADAL" clId="{667C833C-76E4-6248-A772-9C8DA58B4060}" dt="2020-10-04T19:09:26.501" v="3402" actId="20577"/>
+          <ac:spMkLst>
+            <pc:docMk/>
+            <pc:sldMk cId="637209470" sldId="907"/>
+            <ac:spMk id="3" creationId="{D6FCC0C7-EF96-8049-B2DE-91A4034D5765}"/>
+          </ac:spMkLst>
+        </pc:spChg>
+      </pc:sldChg>
+      <pc:sldChg chg="modSp mod ord">
+        <pc:chgData name="Lipani, Aldo" userId="3d811883-7188-4056-86e4-ebeb30c53017" providerId="ADAL" clId="{667C833C-76E4-6248-A772-9C8DA58B4060}" dt="2020-10-03T20:54:25.785" v="3179" actId="20578"/>
+        <pc:sldMkLst>
+          <pc:docMk/>
+          <pc:sldMk cId="3336511245" sldId="908"/>
+        </pc:sldMkLst>
+        <pc:spChg chg="mod">
+          <ac:chgData name="Lipani, Aldo" userId="3d811883-7188-4056-86e4-ebeb30c53017" providerId="ADAL" clId="{667C833C-76E4-6248-A772-9C8DA58B4060}" dt="2020-10-03T18:24:02.511" v="62" actId="6549"/>
+          <ac:spMkLst>
+            <pc:docMk/>
+            <pc:sldMk cId="3336511245" sldId="908"/>
+            <ac:spMk id="3" creationId="{D6FCC0C7-EF96-8049-B2DE-91A4034D5765}"/>
+          </ac:spMkLst>
+        </pc:spChg>
+      </pc:sldChg>
+      <pc:sldChg chg="ord">
+        <pc:chgData name="Lipani, Aldo" userId="3d811883-7188-4056-86e4-ebeb30c53017" providerId="ADAL" clId="{667C833C-76E4-6248-A772-9C8DA58B4060}" dt="2020-10-03T20:54:25.785" v="3179" actId="20578"/>
+        <pc:sldMkLst>
+          <pc:docMk/>
+          <pc:sldMk cId="2887500330" sldId="909"/>
+        </pc:sldMkLst>
+      </pc:sldChg>
+      <pc:sldChg chg="addSp delSp modSp mod">
+        <pc:chgData name="Lipani, Aldo" userId="3d811883-7188-4056-86e4-ebeb30c53017" providerId="ADAL" clId="{667C833C-76E4-6248-A772-9C8DA58B4060}" dt="2020-10-03T18:30:40.615" v="64"/>
+        <pc:sldMkLst>
+          <pc:docMk/>
+          <pc:sldMk cId="1416028549" sldId="913"/>
+        </pc:sldMkLst>
+        <pc:picChg chg="del">
+          <ac:chgData name="Lipani, Aldo" userId="3d811883-7188-4056-86e4-ebeb30c53017" providerId="ADAL" clId="{667C833C-76E4-6248-A772-9C8DA58B4060}" dt="2020-10-03T18:30:39.997" v="63" actId="478"/>
+          <ac:picMkLst>
+            <pc:docMk/>
+            <pc:sldMk cId="1416028549" sldId="913"/>
+            <ac:picMk id="5" creationId="{F1DF5F0E-3DB8-4C43-8070-F5DCCE70ED7E}"/>
+          </ac:picMkLst>
+        </pc:picChg>
+        <pc:picChg chg="add mod">
+          <ac:chgData name="Lipani, Aldo" userId="3d811883-7188-4056-86e4-ebeb30c53017" providerId="ADAL" clId="{667C833C-76E4-6248-A772-9C8DA58B4060}" dt="2020-10-03T18:30:40.615" v="64"/>
+          <ac:picMkLst>
+            <pc:docMk/>
+            <pc:sldMk cId="1416028549" sldId="913"/>
+            <ac:picMk id="7" creationId="{3A655659-A97A-874A-A4EB-734EB559FD23}"/>
+          </ac:picMkLst>
+        </pc:picChg>
+      </pc:sldChg>
+      <pc:sldChg chg="modSp mod">
+        <pc:chgData name="Lipani, Aldo" userId="3d811883-7188-4056-86e4-ebeb30c53017" providerId="ADAL" clId="{667C833C-76E4-6248-A772-9C8DA58B4060}" dt="2020-10-03T18:31:04.529" v="65" actId="6549"/>
+        <pc:sldMkLst>
+          <pc:docMk/>
+          <pc:sldMk cId="3221056734" sldId="915"/>
+        </pc:sldMkLst>
+        <pc:spChg chg="mod">
+          <ac:chgData name="Lipani, Aldo" userId="3d811883-7188-4056-86e4-ebeb30c53017" providerId="ADAL" clId="{667C833C-76E4-6248-A772-9C8DA58B4060}" dt="2020-10-03T18:31:04.529" v="65" actId="6549"/>
+          <ac:spMkLst>
+            <pc:docMk/>
+            <pc:sldMk cId="3221056734" sldId="915"/>
+            <ac:spMk id="3" creationId="{D6FCC0C7-EF96-8049-B2DE-91A4034D5765}"/>
+          </ac:spMkLst>
+        </pc:spChg>
+      </pc:sldChg>
+      <pc:sldChg chg="modSp mod">
+        <pc:chgData name="Lipani, Aldo" userId="3d811883-7188-4056-86e4-ebeb30c53017" providerId="ADAL" clId="{667C833C-76E4-6248-A772-9C8DA58B4060}" dt="2020-10-04T18:28:50.859" v="3285" actId="20577"/>
+        <pc:sldMkLst>
+          <pc:docMk/>
+          <pc:sldMk cId="385933789" sldId="916"/>
+        </pc:sldMkLst>
+        <pc:spChg chg="mod">
+          <ac:chgData name="Lipani, Aldo" userId="3d811883-7188-4056-86e4-ebeb30c53017" providerId="ADAL" clId="{667C833C-76E4-6248-A772-9C8DA58B4060}" dt="2020-10-04T18:28:50.859" v="3285" actId="20577"/>
+          <ac:spMkLst>
+            <pc:docMk/>
+            <pc:sldMk cId="385933789" sldId="916"/>
+            <ac:spMk id="3" creationId="{D6FCC0C7-EF96-8049-B2DE-91A4034D5765}"/>
+          </ac:spMkLst>
+        </pc:spChg>
+      </pc:sldChg>
+      <pc:sldChg chg="addSp modSp mod">
+        <pc:chgData name="Lipani, Aldo" userId="3d811883-7188-4056-86e4-ebeb30c53017" providerId="ADAL" clId="{667C833C-76E4-6248-A772-9C8DA58B4060}" dt="2020-10-03T18:49:48.388" v="641" actId="6549"/>
+        <pc:sldMkLst>
+          <pc:docMk/>
+          <pc:sldMk cId="3116661040" sldId="917"/>
+        </pc:sldMkLst>
+        <pc:spChg chg="mod">
+          <ac:chgData name="Lipani, Aldo" userId="3d811883-7188-4056-86e4-ebeb30c53017" providerId="ADAL" clId="{667C833C-76E4-6248-A772-9C8DA58B4060}" dt="2020-10-03T18:49:48.388" v="641" actId="6549"/>
+          <ac:spMkLst>
+            <pc:docMk/>
+            <pc:sldMk cId="3116661040" sldId="917"/>
+            <ac:spMk id="3" creationId="{D6FCC0C7-EF96-8049-B2DE-91A4034D5765}"/>
+          </ac:spMkLst>
+        </pc:spChg>
+        <pc:spChg chg="add mod">
+          <ac:chgData name="Lipani, Aldo" userId="3d811883-7188-4056-86e4-ebeb30c53017" providerId="ADAL" clId="{667C833C-76E4-6248-A772-9C8DA58B4060}" dt="2020-10-03T18:39:44.176" v="123" actId="1076"/>
+          <ac:spMkLst>
+            <pc:docMk/>
+            <pc:sldMk cId="3116661040" sldId="917"/>
+            <ac:spMk id="16" creationId="{F3699782-3BEB-144C-B76F-FBDA7ADBCBB9}"/>
+          </ac:spMkLst>
+        </pc:spChg>
+        <pc:spChg chg="add mod">
+          <ac:chgData name="Lipani, Aldo" userId="3d811883-7188-4056-86e4-ebeb30c53017" providerId="ADAL" clId="{667C833C-76E4-6248-A772-9C8DA58B4060}" dt="2020-10-03T18:39:47.689" v="124" actId="1076"/>
+          <ac:spMkLst>
+            <pc:docMk/>
+            <pc:sldMk cId="3116661040" sldId="917"/>
+            <ac:spMk id="18" creationId="{BA57377A-B141-4649-AEE7-B1DE9DFFB35E}"/>
+          </ac:spMkLst>
+        </pc:spChg>
+        <pc:cxnChg chg="mod">
+          <ac:chgData name="Lipani, Aldo" userId="3d811883-7188-4056-86e4-ebeb30c53017" providerId="ADAL" clId="{667C833C-76E4-6248-A772-9C8DA58B4060}" dt="2020-10-03T18:40:15.230" v="128" actId="14100"/>
+          <ac:cxnSpMkLst>
+            <pc:docMk/>
+            <pc:sldMk cId="3116661040" sldId="917"/>
+            <ac:cxnSpMk id="7" creationId="{96D19A55-D7B7-4847-882B-7F8AB184E302}"/>
+          </ac:cxnSpMkLst>
+        </pc:cxnChg>
+      </pc:sldChg>
+      <pc:sldChg chg="modSp mod">
+        <pc:chgData name="Lipani, Aldo" userId="3d811883-7188-4056-86e4-ebeb30c53017" providerId="ADAL" clId="{667C833C-76E4-6248-A772-9C8DA58B4060}" dt="2020-10-03T20:08:26.312" v="3146" actId="20577"/>
+        <pc:sldMkLst>
+          <pc:docMk/>
+          <pc:sldMk cId="2577079166" sldId="918"/>
+        </pc:sldMkLst>
+        <pc:spChg chg="mod">
+          <ac:chgData name="Lipani, Aldo" userId="3d811883-7188-4056-86e4-ebeb30c53017" providerId="ADAL" clId="{667C833C-76E4-6248-A772-9C8DA58B4060}" dt="2020-10-03T20:08:26.312" v="3146" actId="20577"/>
+          <ac:spMkLst>
+            <pc:docMk/>
+            <pc:sldMk cId="2577079166" sldId="918"/>
+            <ac:spMk id="6" creationId="{0FFAD120-D3BC-944F-9DD1-CD40205EE10E}"/>
+          </ac:spMkLst>
+        </pc:spChg>
+      </pc:sldChg>
+      <pc:sldChg chg="addSp delSp modSp mod">
+        <pc:chgData name="Lipani, Aldo" userId="3d811883-7188-4056-86e4-ebeb30c53017" providerId="ADAL" clId="{667C833C-76E4-6248-A772-9C8DA58B4060}" dt="2020-10-03T19:50:13.772" v="2613" actId="113"/>
+        <pc:sldMkLst>
+          <pc:docMk/>
+          <pc:sldMk cId="3317100214" sldId="919"/>
+        </pc:sldMkLst>
+        <pc:spChg chg="add del mod">
+          <ac:chgData name="Lipani, Aldo" userId="3d811883-7188-4056-86e4-ebeb30c53017" providerId="ADAL" clId="{667C833C-76E4-6248-A772-9C8DA58B4060}" dt="2020-10-03T19:17:32.051" v="1174" actId="478"/>
+          <ac:spMkLst>
+            <pc:docMk/>
+            <pc:sldMk cId="3317100214" sldId="919"/>
+            <ac:spMk id="2" creationId="{3E8B383A-A87E-0E4F-9751-F06CD7919FB2}"/>
+          </ac:spMkLst>
+        </pc:spChg>
+        <pc:spChg chg="mod">
+          <ac:chgData name="Lipani, Aldo" userId="3d811883-7188-4056-86e4-ebeb30c53017" providerId="ADAL" clId="{667C833C-76E4-6248-A772-9C8DA58B4060}" dt="2020-10-03T19:50:13.772" v="2613" actId="113"/>
+          <ac:spMkLst>
+            <pc:docMk/>
+            <pc:sldMk cId="3317100214" sldId="919"/>
+            <ac:spMk id="3" creationId="{D6FCC0C7-EF96-8049-B2DE-91A4034D5765}"/>
+          </ac:spMkLst>
+        </pc:spChg>
+        <pc:spChg chg="mod">
+          <ac:chgData name="Lipani, Aldo" userId="3d811883-7188-4056-86e4-ebeb30c53017" providerId="ADAL" clId="{667C833C-76E4-6248-A772-9C8DA58B4060}" dt="2020-10-03T18:59:59.674" v="815" actId="1076"/>
+          <ac:spMkLst>
+            <pc:docMk/>
+            <pc:sldMk cId="3317100214" sldId="919"/>
+            <ac:spMk id="14" creationId="{ABBA8D2C-2D13-A34C-A6DD-E6B67413544A}"/>
+          </ac:spMkLst>
+        </pc:spChg>
+        <pc:spChg chg="mod">
+          <ac:chgData name="Lipani, Aldo" userId="3d811883-7188-4056-86e4-ebeb30c53017" providerId="ADAL" clId="{667C833C-76E4-6248-A772-9C8DA58B4060}" dt="2020-10-03T18:59:56.628" v="814" actId="1076"/>
+          <ac:spMkLst>
+            <pc:docMk/>
+            <pc:sldMk cId="3317100214" sldId="919"/>
+            <ac:spMk id="15" creationId="{3A019D58-F614-5442-8CC0-09ADA36FA448}"/>
+          </ac:spMkLst>
+        </pc:spChg>
+        <pc:spChg chg="add del mod">
+          <ac:chgData name="Lipani, Aldo" userId="3d811883-7188-4056-86e4-ebeb30c53017" providerId="ADAL" clId="{667C833C-76E4-6248-A772-9C8DA58B4060}" dt="2020-10-03T19:17:33.278" v="1176" actId="478"/>
+          <ac:spMkLst>
+            <pc:docMk/>
+            <pc:sldMk cId="3317100214" sldId="919"/>
+            <ac:spMk id="18" creationId="{D25A65EB-D798-884A-8B28-85361D79D817}"/>
+          </ac:spMkLst>
+        </pc:spChg>
+        <pc:spChg chg="add del mod">
+          <ac:chgData name="Lipani, Aldo" userId="3d811883-7188-4056-86e4-ebeb30c53017" providerId="ADAL" clId="{667C833C-76E4-6248-A772-9C8DA58B4060}" dt="2020-10-03T19:17:33.820" v="1177" actId="478"/>
+          <ac:spMkLst>
+            <pc:docMk/>
+            <pc:sldMk cId="3317100214" sldId="919"/>
+            <ac:spMk id="20" creationId="{50D79408-A4D4-A642-855B-A8A6E98CF7AC}"/>
+          </ac:spMkLst>
+        </pc:spChg>
+        <pc:spChg chg="add del mod">
+          <ac:chgData name="Lipani, Aldo" userId="3d811883-7188-4056-86e4-ebeb30c53017" providerId="ADAL" clId="{667C833C-76E4-6248-A772-9C8DA58B4060}" dt="2020-10-03T19:17:32.719" v="1175" actId="478"/>
+          <ac:spMkLst>
+            <pc:docMk/>
+            <pc:sldMk cId="3317100214" sldId="919"/>
+            <ac:spMk id="21" creationId="{64878A4B-3B1F-2940-BF88-9CF409C18885}"/>
+          </ac:spMkLst>
+        </pc:spChg>
+        <pc:spChg chg="add mod">
+          <ac:chgData name="Lipani, Aldo" userId="3d811883-7188-4056-86e4-ebeb30c53017" providerId="ADAL" clId="{667C833C-76E4-6248-A772-9C8DA58B4060}" dt="2020-10-03T18:57:30.529" v="697"/>
+          <ac:spMkLst>
+            <pc:docMk/>
+            <pc:sldMk cId="3317100214" sldId="919"/>
+            <ac:spMk id="22" creationId="{7942A439-9E5A-834C-A91B-69A738A84228}"/>
+          </ac:spMkLst>
+        </pc:spChg>
+        <pc:spChg chg="add mod">
+          <ac:chgData name="Lipani, Aldo" userId="3d811883-7188-4056-86e4-ebeb30c53017" providerId="ADAL" clId="{667C833C-76E4-6248-A772-9C8DA58B4060}" dt="2020-10-03T18:59:43.600" v="812" actId="1037"/>
+          <ac:spMkLst>
+            <pc:docMk/>
+            <pc:sldMk cId="3317100214" sldId="919"/>
+            <ac:spMk id="23" creationId="{FF005369-730D-5D4E-BF0B-1AC1EC9C597E}"/>
+          </ac:spMkLst>
+        </pc:spChg>
+        <pc:spChg chg="add mod">
+          <ac:chgData name="Lipani, Aldo" userId="3d811883-7188-4056-86e4-ebeb30c53017" providerId="ADAL" clId="{667C833C-76E4-6248-A772-9C8DA58B4060}" dt="2020-10-03T18:58:09.165" v="772" actId="1036"/>
+          <ac:spMkLst>
+            <pc:docMk/>
+            <pc:sldMk cId="3317100214" sldId="919"/>
+            <ac:spMk id="28" creationId="{3C6E4BCF-3B62-6643-BCF6-D0E23EDB6DB1}"/>
+          </ac:spMkLst>
+        </pc:spChg>
+        <pc:spChg chg="add mod">
+          <ac:chgData name="Lipani, Aldo" userId="3d811883-7188-4056-86e4-ebeb30c53017" providerId="ADAL" clId="{667C833C-76E4-6248-A772-9C8DA58B4060}" dt="2020-10-03T18:58:17.663" v="804" actId="1037"/>
+          <ac:spMkLst>
+            <pc:docMk/>
+            <pc:sldMk cId="3317100214" sldId="919"/>
+            <ac:spMk id="29" creationId="{93844DDF-A03E-254E-B78D-14402935E69E}"/>
+          </ac:spMkLst>
+        </pc:spChg>
+        <pc:spChg chg="add mod">
+          <ac:chgData name="Lipani, Aldo" userId="3d811883-7188-4056-86e4-ebeb30c53017" providerId="ADAL" clId="{667C833C-76E4-6248-A772-9C8DA58B4060}" dt="2020-10-03T19:08:31.077" v="886" actId="1038"/>
+          <ac:spMkLst>
+            <pc:docMk/>
+            <pc:sldMk cId="3317100214" sldId="919"/>
+            <ac:spMk id="30" creationId="{851451E9-F70A-AB43-86B2-BA56FE7504D5}"/>
+          </ac:spMkLst>
+        </pc:spChg>
+        <pc:cxnChg chg="mod">
+          <ac:chgData name="Lipani, Aldo" userId="3d811883-7188-4056-86e4-ebeb30c53017" providerId="ADAL" clId="{667C833C-76E4-6248-A772-9C8DA58B4060}" dt="2020-10-03T18:59:48.395" v="813" actId="14100"/>
+          <ac:cxnSpMkLst>
+            <pc:docMk/>
+            <pc:sldMk cId="3317100214" sldId="919"/>
+            <ac:cxnSpMk id="5" creationId="{53230D9B-4A22-EB40-AAAE-CEC422E4D8E4}"/>
+          </ac:cxnSpMkLst>
+        </pc:cxnChg>
+        <pc:cxnChg chg="mod">
+          <ac:chgData name="Lipani, Aldo" userId="3d811883-7188-4056-86e4-ebeb30c53017" providerId="ADAL" clId="{667C833C-76E4-6248-A772-9C8DA58B4060}" dt="2020-10-03T18:59:40.527" v="810" actId="14100"/>
+          <ac:cxnSpMkLst>
+            <pc:docMk/>
+            <pc:sldMk cId="3317100214" sldId="919"/>
+            <ac:cxnSpMk id="7" creationId="{96D19A55-D7B7-4847-882B-7F8AB184E302}"/>
+          </ac:cxnSpMkLst>
+        </pc:cxnChg>
+      </pc:sldChg>
+      <pc:sldChg chg="del">
+        <pc:chgData name="Lipani, Aldo" userId="3d811883-7188-4056-86e4-ebeb30c53017" providerId="ADAL" clId="{667C833C-76E4-6248-A772-9C8DA58B4060}" dt="2020-10-03T20:04:39.775" v="3145" actId="2696"/>
+        <pc:sldMkLst>
+          <pc:docMk/>
+          <pc:sldMk cId="2085612992" sldId="920"/>
+        </pc:sldMkLst>
+      </pc:sldChg>
+      <pc:sldChg chg="modSp mod">
+        <pc:chgData name="Lipani, Aldo" userId="3d811883-7188-4056-86e4-ebeb30c53017" providerId="ADAL" clId="{667C833C-76E4-6248-A772-9C8DA58B4060}" dt="2020-10-04T18:49:35.735" v="3371" actId="20577"/>
+        <pc:sldMkLst>
+          <pc:docMk/>
+          <pc:sldMk cId="3947611980" sldId="921"/>
+        </pc:sldMkLst>
+        <pc:spChg chg="mod">
+          <ac:chgData name="Lipani, Aldo" userId="3d811883-7188-4056-86e4-ebeb30c53017" providerId="ADAL" clId="{667C833C-76E4-6248-A772-9C8DA58B4060}" dt="2020-10-04T18:49:35.735" v="3371" actId="20577"/>
+          <ac:spMkLst>
+            <pc:docMk/>
+            <pc:sldMk cId="3947611980" sldId="921"/>
+            <ac:spMk id="6" creationId="{0FFAD120-D3BC-944F-9DD1-CD40205EE10E}"/>
+          </ac:spMkLst>
+        </pc:spChg>
+        <pc:spChg chg="mod">
+          <ac:chgData name="Lipani, Aldo" userId="3d811883-7188-4056-86e4-ebeb30c53017" providerId="ADAL" clId="{667C833C-76E4-6248-A772-9C8DA58B4060}" dt="2020-10-03T20:11:36.855" v="3172" actId="1035"/>
+          <ac:spMkLst>
+            <pc:docMk/>
+            <pc:sldMk cId="3947611980" sldId="921"/>
+            <ac:spMk id="9" creationId="{3DA74DC2-411D-3442-A3A8-050EB2F814CA}"/>
+          </ac:spMkLst>
+        </pc:spChg>
+        <pc:spChg chg="mod">
+          <ac:chgData name="Lipani, Aldo" userId="3d811883-7188-4056-86e4-ebeb30c53017" providerId="ADAL" clId="{667C833C-76E4-6248-A772-9C8DA58B4060}" dt="2020-10-03T20:11:36.855" v="3172" actId="1035"/>
+          <ac:spMkLst>
+            <pc:docMk/>
+            <pc:sldMk cId="3947611980" sldId="921"/>
+            <ac:spMk id="10" creationId="{E374C0D6-69BC-964F-B48D-68955C5724FE}"/>
+          </ac:spMkLst>
+        </pc:spChg>
+        <pc:spChg chg="mod">
+          <ac:chgData name="Lipani, Aldo" userId="3d811883-7188-4056-86e4-ebeb30c53017" providerId="ADAL" clId="{667C833C-76E4-6248-A772-9C8DA58B4060}" dt="2020-10-03T20:11:36.855" v="3172" actId="1035"/>
+          <ac:spMkLst>
+            <pc:docMk/>
+            <pc:sldMk cId="3947611980" sldId="921"/>
+            <ac:spMk id="11" creationId="{0452F93D-B250-2040-9A90-C0CCBB77365F}"/>
+          </ac:spMkLst>
+        </pc:spChg>
+        <pc:spChg chg="mod">
+          <ac:chgData name="Lipani, Aldo" userId="3d811883-7188-4056-86e4-ebeb30c53017" providerId="ADAL" clId="{667C833C-76E4-6248-A772-9C8DA58B4060}" dt="2020-10-03T20:11:36.855" v="3172" actId="1035"/>
+          <ac:spMkLst>
+            <pc:docMk/>
+            <pc:sldMk cId="3947611980" sldId="921"/>
+            <ac:spMk id="12" creationId="{FB5D6A70-F64A-774C-B76A-249421556781}"/>
+          </ac:spMkLst>
+        </pc:spChg>
+        <pc:spChg chg="mod">
+          <ac:chgData name="Lipani, Aldo" userId="3d811883-7188-4056-86e4-ebeb30c53017" providerId="ADAL" clId="{667C833C-76E4-6248-A772-9C8DA58B4060}" dt="2020-10-03T20:11:36.855" v="3172" actId="1035"/>
+          <ac:spMkLst>
+            <pc:docMk/>
+            <pc:sldMk cId="3947611980" sldId="921"/>
+            <ac:spMk id="17" creationId="{B7C20929-9750-DC48-BABC-49D90F141E6A}"/>
+          </ac:spMkLst>
+        </pc:spChg>
+        <pc:spChg chg="mod">
+          <ac:chgData name="Lipani, Aldo" userId="3d811883-7188-4056-86e4-ebeb30c53017" providerId="ADAL" clId="{667C833C-76E4-6248-A772-9C8DA58B4060}" dt="2020-10-03T20:11:36.855" v="3172" actId="1035"/>
+          <ac:spMkLst>
+            <pc:docMk/>
+            <pc:sldMk cId="3947611980" sldId="921"/>
+            <ac:spMk id="18" creationId="{85618045-D9A9-D24B-922B-ABCBFC9391F5}"/>
+          </ac:spMkLst>
+        </pc:spChg>
+        <pc:spChg chg="mod">
+          <ac:chgData name="Lipani, Aldo" userId="3d811883-7188-4056-86e4-ebeb30c53017" providerId="ADAL" clId="{667C833C-76E4-6248-A772-9C8DA58B4060}" dt="2020-10-03T20:11:36.855" v="3172" actId="1035"/>
+          <ac:spMkLst>
+            <pc:docMk/>
+            <pc:sldMk cId="3947611980" sldId="921"/>
+            <ac:spMk id="22" creationId="{3E1D555F-BA7B-4E4D-BD24-75BCDFCF76E9}"/>
+          </ac:spMkLst>
+        </pc:spChg>
+        <pc:spChg chg="mod">
+          <ac:chgData name="Lipani, Aldo" userId="3d811883-7188-4056-86e4-ebeb30c53017" providerId="ADAL" clId="{667C833C-76E4-6248-A772-9C8DA58B4060}" dt="2020-10-03T20:11:36.855" v="3172" actId="1035"/>
+          <ac:spMkLst>
+            <pc:docMk/>
+            <pc:sldMk cId="3947611980" sldId="921"/>
+            <ac:spMk id="25" creationId="{81FC1C0C-2497-B142-805B-918D42E793CD}"/>
+          </ac:spMkLst>
+        </pc:spChg>
+        <pc:spChg chg="mod">
+          <ac:chgData name="Lipani, Aldo" userId="3d811883-7188-4056-86e4-ebeb30c53017" providerId="ADAL" clId="{667C833C-76E4-6248-A772-9C8DA58B4060}" dt="2020-10-03T20:11:36.855" v="3172" actId="1035"/>
+          <ac:spMkLst>
+            <pc:docMk/>
+            <pc:sldMk cId="3947611980" sldId="921"/>
+            <ac:spMk id="26" creationId="{9C83D0E0-FCEF-5848-8795-81AD08568B37}"/>
+          </ac:spMkLst>
+        </pc:spChg>
+        <pc:spChg chg="mod">
+          <ac:chgData name="Lipani, Aldo" userId="3d811883-7188-4056-86e4-ebeb30c53017" providerId="ADAL" clId="{667C833C-76E4-6248-A772-9C8DA58B4060}" dt="2020-10-03T20:11:36.855" v="3172" actId="1035"/>
+          <ac:spMkLst>
+            <pc:docMk/>
+            <pc:sldMk cId="3947611980" sldId="921"/>
+            <ac:spMk id="27" creationId="{F55CA0BD-62A6-8B4B-B4D8-777448748F75}"/>
+          </ac:spMkLst>
+        </pc:spChg>
+        <pc:spChg chg="mod">
+          <ac:chgData name="Lipani, Aldo" userId="3d811883-7188-4056-86e4-ebeb30c53017" providerId="ADAL" clId="{667C833C-76E4-6248-A772-9C8DA58B4060}" dt="2020-10-03T20:11:36.855" v="3172" actId="1035"/>
+          <ac:spMkLst>
+            <pc:docMk/>
+            <pc:sldMk cId="3947611980" sldId="921"/>
+            <ac:spMk id="28" creationId="{21D53D63-8BA7-AB45-A917-DAF212689C39}"/>
+          </ac:spMkLst>
+        </pc:spChg>
+        <pc:spChg chg="mod">
+          <ac:chgData name="Lipani, Aldo" userId="3d811883-7188-4056-86e4-ebeb30c53017" providerId="ADAL" clId="{667C833C-76E4-6248-A772-9C8DA58B4060}" dt="2020-10-03T20:11:36.855" v="3172" actId="1035"/>
+          <ac:spMkLst>
+            <pc:docMk/>
+            <pc:sldMk cId="3947611980" sldId="921"/>
+            <ac:spMk id="29" creationId="{A573EE21-2169-934A-9621-211EE3AE24BB}"/>
+          </ac:spMkLst>
+        </pc:spChg>
+        <pc:spChg chg="mod">
+          <ac:chgData name="Lipani, Aldo" userId="3d811883-7188-4056-86e4-ebeb30c53017" providerId="ADAL" clId="{667C833C-76E4-6248-A772-9C8DA58B4060}" dt="2020-10-03T20:11:36.855" v="3172" actId="1035"/>
+          <ac:spMkLst>
+            <pc:docMk/>
+            <pc:sldMk cId="3947611980" sldId="921"/>
+            <ac:spMk id="30" creationId="{BA772864-D3A7-B243-A214-FDBDA5538832}"/>
+          </ac:spMkLst>
+        </pc:spChg>
+        <pc:spChg chg="mod">
+          <ac:chgData name="Lipani, Aldo" userId="3d811883-7188-4056-86e4-ebeb30c53017" providerId="ADAL" clId="{667C833C-76E4-6248-A772-9C8DA58B4060}" dt="2020-10-03T20:11:36.855" v="3172" actId="1035"/>
+          <ac:spMkLst>
+            <pc:docMk/>
+            <pc:sldMk cId="3947611980" sldId="921"/>
+            <ac:spMk id="32" creationId="{E508B54D-7000-144F-90E6-26C6A5AF3BEB}"/>
+          </ac:spMkLst>
+        </pc:spChg>
+        <pc:spChg chg="mod">
+          <ac:chgData name="Lipani, Aldo" userId="3d811883-7188-4056-86e4-ebeb30c53017" providerId="ADAL" clId="{667C833C-76E4-6248-A772-9C8DA58B4060}" dt="2020-10-03T20:11:36.855" v="3172" actId="1035"/>
+          <ac:spMkLst>
+            <pc:docMk/>
+            <pc:sldMk cId="3947611980" sldId="921"/>
+            <ac:spMk id="34" creationId="{DDF8BE48-0255-654B-8CE5-9768B1806AF3}"/>
+          </ac:spMkLst>
+        </pc:spChg>
+        <pc:spChg chg="mod">
+          <ac:chgData name="Lipani, Aldo" userId="3d811883-7188-4056-86e4-ebeb30c53017" providerId="ADAL" clId="{667C833C-76E4-6248-A772-9C8DA58B4060}" dt="2020-10-03T20:11:36.855" v="3172" actId="1035"/>
+          <ac:spMkLst>
+            <pc:docMk/>
+            <pc:sldMk cId="3947611980" sldId="921"/>
+            <ac:spMk id="35" creationId="{977772D9-25B0-5746-8B6E-04942877155D}"/>
+          </ac:spMkLst>
+        </pc:spChg>
+        <pc:cxnChg chg="mod">
+          <ac:chgData name="Lipani, Aldo" userId="3d811883-7188-4056-86e4-ebeb30c53017" providerId="ADAL" clId="{667C833C-76E4-6248-A772-9C8DA58B4060}" dt="2020-10-03T20:11:36.855" v="3172" actId="1035"/>
+          <ac:cxnSpMkLst>
+            <pc:docMk/>
+            <pc:sldMk cId="3947611980" sldId="921"/>
+            <ac:cxnSpMk id="5" creationId="{E05BA436-22FA-6347-9297-1DACB236EF41}"/>
+          </ac:cxnSpMkLst>
+        </pc:cxnChg>
+        <pc:cxnChg chg="mod">
+          <ac:chgData name="Lipani, Aldo" userId="3d811883-7188-4056-86e4-ebeb30c53017" providerId="ADAL" clId="{667C833C-76E4-6248-A772-9C8DA58B4060}" dt="2020-10-03T20:11:36.855" v="3172" actId="1035"/>
+          <ac:cxnSpMkLst>
+            <pc:docMk/>
+            <pc:sldMk cId="3947611980" sldId="921"/>
+            <ac:cxnSpMk id="8" creationId="{D2209715-C09C-EF41-85AF-E6016E6D21AA}"/>
+          </ac:cxnSpMkLst>
+        </pc:cxnChg>
+        <pc:cxnChg chg="mod">
+          <ac:chgData name="Lipani, Aldo" userId="3d811883-7188-4056-86e4-ebeb30c53017" providerId="ADAL" clId="{667C833C-76E4-6248-A772-9C8DA58B4060}" dt="2020-10-03T20:11:36.855" v="3172" actId="1035"/>
+          <ac:cxnSpMkLst>
+            <pc:docMk/>
+            <pc:sldMk cId="3947611980" sldId="921"/>
+            <ac:cxnSpMk id="19" creationId="{7E2CA0AB-991A-CD4C-866D-D64668BBB172}"/>
+          </ac:cxnSpMkLst>
+        </pc:cxnChg>
+        <pc:cxnChg chg="mod">
+          <ac:chgData name="Lipani, Aldo" userId="3d811883-7188-4056-86e4-ebeb30c53017" providerId="ADAL" clId="{667C833C-76E4-6248-A772-9C8DA58B4060}" dt="2020-10-03T20:11:36.855" v="3172" actId="1035"/>
+          <ac:cxnSpMkLst>
+            <pc:docMk/>
+            <pc:sldMk cId="3947611980" sldId="921"/>
+            <ac:cxnSpMk id="23" creationId="{0D6C8E26-5E34-FE41-8014-FEFCF6A36CBF}"/>
+          </ac:cxnSpMkLst>
+        </pc:cxnChg>
+        <pc:cxnChg chg="mod">
+          <ac:chgData name="Lipani, Aldo" userId="3d811883-7188-4056-86e4-ebeb30c53017" providerId="ADAL" clId="{667C833C-76E4-6248-A772-9C8DA58B4060}" dt="2020-10-03T20:11:36.855" v="3172" actId="1035"/>
+          <ac:cxnSpMkLst>
+            <pc:docMk/>
+            <pc:sldMk cId="3947611980" sldId="921"/>
+            <ac:cxnSpMk id="24" creationId="{BF94228F-3712-604E-8837-465748F08498}"/>
+          </ac:cxnSpMkLst>
+        </pc:cxnChg>
+        <pc:cxnChg chg="mod">
+          <ac:chgData name="Lipani, Aldo" userId="3d811883-7188-4056-86e4-ebeb30c53017" providerId="ADAL" clId="{667C833C-76E4-6248-A772-9C8DA58B4060}" dt="2020-10-03T20:11:36.855" v="3172" actId="1035"/>
+          <ac:cxnSpMkLst>
+            <pc:docMk/>
+            <pc:sldMk cId="3947611980" sldId="921"/>
+            <ac:cxnSpMk id="31" creationId="{E371D320-3844-6849-A987-E8D2063058B8}"/>
+          </ac:cxnSpMkLst>
+        </pc:cxnChg>
+      </pc:sldChg>
+      <pc:sldChg chg="modSp mod">
+        <pc:chgData name="Lipani, Aldo" userId="3d811883-7188-4056-86e4-ebeb30c53017" providerId="ADAL" clId="{667C833C-76E4-6248-A772-9C8DA58B4060}" dt="2020-10-03T20:18:52.480" v="3178" actId="1076"/>
+        <pc:sldMkLst>
+          <pc:docMk/>
+          <pc:sldMk cId="1884611820" sldId="922"/>
+        </pc:sldMkLst>
+        <pc:picChg chg="mod">
+          <ac:chgData name="Lipani, Aldo" userId="3d811883-7188-4056-86e4-ebeb30c53017" providerId="ADAL" clId="{667C833C-76E4-6248-A772-9C8DA58B4060}" dt="2020-10-03T20:18:52.480" v="3178" actId="1076"/>
+          <ac:picMkLst>
+            <pc:docMk/>
+            <pc:sldMk cId="1884611820" sldId="922"/>
+            <ac:picMk id="2" creationId="{E7357855-0CCB-D040-A7F4-498A73F51159}"/>
+          </ac:picMkLst>
+        </pc:picChg>
+      </pc:sldChg>
+      <pc:sldChg chg="modSp mod">
+        <pc:chgData name="Lipani, Aldo" userId="3d811883-7188-4056-86e4-ebeb30c53017" providerId="ADAL" clId="{667C833C-76E4-6248-A772-9C8DA58B4060}" dt="2020-10-03T20:18:18.260" v="3177" actId="20577"/>
+        <pc:sldMkLst>
+          <pc:docMk/>
+          <pc:sldMk cId="1753081378" sldId="923"/>
+        </pc:sldMkLst>
+        <pc:spChg chg="mod">
+          <ac:chgData name="Lipani, Aldo" userId="3d811883-7188-4056-86e4-ebeb30c53017" providerId="ADAL" clId="{667C833C-76E4-6248-A772-9C8DA58B4060}" dt="2020-10-03T20:18:18.260" v="3177" actId="20577"/>
+          <ac:spMkLst>
+            <pc:docMk/>
+            <pc:sldMk cId="1753081378" sldId="923"/>
+            <ac:spMk id="6" creationId="{0FFAD120-D3BC-944F-9DD1-CD40205EE10E}"/>
+          </ac:spMkLst>
+        </pc:spChg>
+      </pc:sldChg>
+      <pc:sldChg chg="modSp add del mod">
+        <pc:chgData name="Lipani, Aldo" userId="3d811883-7188-4056-86e4-ebeb30c53017" providerId="ADAL" clId="{667C833C-76E4-6248-A772-9C8DA58B4060}" dt="2020-10-03T18:49:54.727" v="642" actId="2696"/>
+        <pc:sldMkLst>
+          <pc:docMk/>
+          <pc:sldMk cId="2087938308" sldId="925"/>
+        </pc:sldMkLst>
+        <pc:spChg chg="mod">
+          <ac:chgData name="Lipani, Aldo" userId="3d811883-7188-4056-86e4-ebeb30c53017" providerId="ADAL" clId="{667C833C-76E4-6248-A772-9C8DA58B4060}" dt="2020-10-03T18:46:48.607" v="520" actId="20577"/>
+          <ac:spMkLst>
+            <pc:docMk/>
+            <pc:sldMk cId="2087938308" sldId="925"/>
+            <ac:spMk id="4" creationId="{19D76072-E128-D849-8EB1-C4005A112DD9}"/>
+          </ac:spMkLst>
+        </pc:spChg>
+      </pc:sldChg>
+      <pc:sldChg chg="add del">
+        <pc:chgData name="Lipani, Aldo" userId="3d811883-7188-4056-86e4-ebeb30c53017" providerId="ADAL" clId="{667C833C-76E4-6248-A772-9C8DA58B4060}" dt="2020-10-03T19:51:29.345" v="2625" actId="2696"/>
+        <pc:sldMkLst>
+          <pc:docMk/>
+          <pc:sldMk cId="2166635264" sldId="925"/>
+        </pc:sldMkLst>
+      </pc:sldChg>
+      <pc:sldChg chg="addSp delSp modSp add mod">
+        <pc:chgData name="Lipani, Aldo" userId="3d811883-7188-4056-86e4-ebeb30c53017" providerId="ADAL" clId="{667C833C-76E4-6248-A772-9C8DA58B4060}" dt="2020-10-03T20:02:08.467" v="2985" actId="6549"/>
+        <pc:sldMkLst>
+          <pc:docMk/>
+          <pc:sldMk cId="3656755257" sldId="926"/>
+        </pc:sldMkLst>
+        <pc:spChg chg="del">
+          <ac:chgData name="Lipani, Aldo" userId="3d811883-7188-4056-86e4-ebeb30c53017" providerId="ADAL" clId="{667C833C-76E4-6248-A772-9C8DA58B4060}" dt="2020-10-03T19:42:20.240" v="2475" actId="478"/>
+          <ac:spMkLst>
+            <pc:docMk/>
+            <pc:sldMk cId="3656755257" sldId="926"/>
+            <ac:spMk id="2" creationId="{3E8B383A-A87E-0E4F-9751-F06CD7919FB2}"/>
+          </ac:spMkLst>
+        </pc:spChg>
+        <pc:spChg chg="mod">
+          <ac:chgData name="Lipani, Aldo" userId="3d811883-7188-4056-86e4-ebeb30c53017" providerId="ADAL" clId="{667C833C-76E4-6248-A772-9C8DA58B4060}" dt="2020-10-03T20:02:08.467" v="2985" actId="6549"/>
+          <ac:spMkLst>
+            <pc:docMk/>
+            <pc:sldMk cId="3656755257" sldId="926"/>
+            <ac:spMk id="3" creationId="{D6FCC0C7-EF96-8049-B2DE-91A4034D5765}"/>
+          </ac:spMkLst>
+        </pc:spChg>
+        <pc:spChg chg="mod">
+          <ac:chgData name="Lipani, Aldo" userId="3d811883-7188-4056-86e4-ebeb30c53017" providerId="ADAL" clId="{667C833C-76E4-6248-A772-9C8DA58B4060}" dt="2020-10-03T19:49:48.955" v="2599" actId="20577"/>
+          <ac:spMkLst>
+            <pc:docMk/>
+            <pc:sldMk cId="3656755257" sldId="926"/>
+            <ac:spMk id="4" creationId="{19D76072-E128-D849-8EB1-C4005A112DD9}"/>
+          </ac:spMkLst>
+        </pc:spChg>
+        <pc:spChg chg="add del mod">
+          <ac:chgData name="Lipani, Aldo" userId="3d811883-7188-4056-86e4-ebeb30c53017" providerId="ADAL" clId="{667C833C-76E4-6248-A772-9C8DA58B4060}" dt="2020-10-03T19:38:36.839" v="2014" actId="478"/>
+          <ac:spMkLst>
+            <pc:docMk/>
+            <pc:sldMk cId="3656755257" sldId="926"/>
+            <ac:spMk id="6" creationId="{D2A3A607-685C-724A-90E3-382AFB97864B}"/>
+          </ac:spMkLst>
+        </pc:spChg>
+        <pc:spChg chg="del">
+          <ac:chgData name="Lipani, Aldo" userId="3d811883-7188-4056-86e4-ebeb30c53017" providerId="ADAL" clId="{667C833C-76E4-6248-A772-9C8DA58B4060}" dt="2020-10-03T19:42:21.688" v="2477" actId="478"/>
+          <ac:spMkLst>
+            <pc:docMk/>
+            <pc:sldMk cId="3656755257" sldId="926"/>
+            <ac:spMk id="18" creationId="{D25A65EB-D798-884A-8B28-85361D79D817}"/>
+          </ac:spMkLst>
+        </pc:spChg>
+        <pc:spChg chg="del">
+          <ac:chgData name="Lipani, Aldo" userId="3d811883-7188-4056-86e4-ebeb30c53017" providerId="ADAL" clId="{667C833C-76E4-6248-A772-9C8DA58B4060}" dt="2020-10-03T19:42:22.087" v="2478" actId="478"/>
+          <ac:spMkLst>
+            <pc:docMk/>
+            <pc:sldMk cId="3656755257" sldId="926"/>
+            <ac:spMk id="20" creationId="{50D79408-A4D4-A642-855B-A8A6E98CF7AC}"/>
+          </ac:spMkLst>
+        </pc:spChg>
+        <pc:spChg chg="del">
+          <ac:chgData name="Lipani, Aldo" userId="3d811883-7188-4056-86e4-ebeb30c53017" providerId="ADAL" clId="{667C833C-76E4-6248-A772-9C8DA58B4060}" dt="2020-10-03T19:42:21.196" v="2476" actId="478"/>
+          <ac:spMkLst>
+            <pc:docMk/>
+            <pc:sldMk cId="3656755257" sldId="926"/>
+            <ac:spMk id="21" creationId="{64878A4B-3B1F-2940-BF88-9CF409C18885}"/>
+          </ac:spMkLst>
+        </pc:spChg>
+      </pc:sldChg>
+      <pc:sldChg chg="addSp delSp modSp add mod">
+        <pc:chgData name="Lipani, Aldo" userId="3d811883-7188-4056-86e4-ebeb30c53017" providerId="ADAL" clId="{667C833C-76E4-6248-A772-9C8DA58B4060}" dt="2020-10-04T18:41:14.232" v="3352" actId="20577"/>
+        <pc:sldMkLst>
+          <pc:docMk/>
+          <pc:sldMk cId="3703090608" sldId="927"/>
+        </pc:sldMkLst>
+        <pc:spChg chg="mod">
+          <ac:chgData name="Lipani, Aldo" userId="3d811883-7188-4056-86e4-ebeb30c53017" providerId="ADAL" clId="{667C833C-76E4-6248-A772-9C8DA58B4060}" dt="2020-10-04T18:41:14.232" v="3352" actId="20577"/>
+          <ac:spMkLst>
+            <pc:docMk/>
+            <pc:sldMk cId="3703090608" sldId="927"/>
+            <ac:spMk id="3" creationId="{D6FCC0C7-EF96-8049-B2DE-91A4034D5765}"/>
+          </ac:spMkLst>
+        </pc:spChg>
+        <pc:spChg chg="mod">
+          <ac:chgData name="Lipani, Aldo" userId="3d811883-7188-4056-86e4-ebeb30c53017" providerId="ADAL" clId="{667C833C-76E4-6248-A772-9C8DA58B4060}" dt="2020-10-03T20:04:23.719" v="3144" actId="20577"/>
+          <ac:spMkLst>
+            <pc:docMk/>
+            <pc:sldMk cId="3703090608" sldId="927"/>
+            <ac:spMk id="4" creationId="{19D76072-E128-D849-8EB1-C4005A112DD9}"/>
+          </ac:spMkLst>
+        </pc:spChg>
+        <pc:spChg chg="del">
+          <ac:chgData name="Lipani, Aldo" userId="3d811883-7188-4056-86e4-ebeb30c53017" providerId="ADAL" clId="{667C833C-76E4-6248-A772-9C8DA58B4060}" dt="2020-10-03T19:53:06.266" v="2628" actId="478"/>
+          <ac:spMkLst>
+            <pc:docMk/>
+            <pc:sldMk cId="3703090608" sldId="927"/>
+            <ac:spMk id="12" creationId="{21FA620D-FD35-DD4D-8926-CD642768FD0F}"/>
+          </ac:spMkLst>
+        </pc:spChg>
+        <pc:spChg chg="del">
+          <ac:chgData name="Lipani, Aldo" userId="3d811883-7188-4056-86e4-ebeb30c53017" providerId="ADAL" clId="{667C833C-76E4-6248-A772-9C8DA58B4060}" dt="2020-10-03T19:53:06.266" v="2628" actId="478"/>
+          <ac:spMkLst>
+            <pc:docMk/>
+            <pc:sldMk cId="3703090608" sldId="927"/>
+            <ac:spMk id="13" creationId="{09E0221B-BBBC-B04B-98E3-BE56F0FA90A1}"/>
+          </ac:spMkLst>
+        </pc:spChg>
+        <pc:spChg chg="del">
+          <ac:chgData name="Lipani, Aldo" userId="3d811883-7188-4056-86e4-ebeb30c53017" providerId="ADAL" clId="{667C833C-76E4-6248-A772-9C8DA58B4060}" dt="2020-10-03T19:53:06.266" v="2628" actId="478"/>
+          <ac:spMkLst>
+            <pc:docMk/>
+            <pc:sldMk cId="3703090608" sldId="927"/>
+            <ac:spMk id="14" creationId="{ABBA8D2C-2D13-A34C-A6DD-E6B67413544A}"/>
+          </ac:spMkLst>
+        </pc:spChg>
+        <pc:spChg chg="del">
+          <ac:chgData name="Lipani, Aldo" userId="3d811883-7188-4056-86e4-ebeb30c53017" providerId="ADAL" clId="{667C833C-76E4-6248-A772-9C8DA58B4060}" dt="2020-10-03T19:53:06.266" v="2628" actId="478"/>
+          <ac:spMkLst>
+            <pc:docMk/>
+            <pc:sldMk cId="3703090608" sldId="927"/>
+            <ac:spMk id="15" creationId="{3A019D58-F614-5442-8CC0-09ADA36FA448}"/>
+          </ac:spMkLst>
+        </pc:spChg>
+        <pc:spChg chg="del">
+          <ac:chgData name="Lipani, Aldo" userId="3d811883-7188-4056-86e4-ebeb30c53017" providerId="ADAL" clId="{667C833C-76E4-6248-A772-9C8DA58B4060}" dt="2020-10-03T19:53:06.266" v="2628" actId="478"/>
+          <ac:spMkLst>
+            <pc:docMk/>
+            <pc:sldMk cId="3703090608" sldId="927"/>
+            <ac:spMk id="22" creationId="{7942A439-9E5A-834C-A91B-69A738A84228}"/>
+          </ac:spMkLst>
+        </pc:spChg>
+        <pc:spChg chg="del">
+          <ac:chgData name="Lipani, Aldo" userId="3d811883-7188-4056-86e4-ebeb30c53017" providerId="ADAL" clId="{667C833C-76E4-6248-A772-9C8DA58B4060}" dt="2020-10-03T19:53:06.266" v="2628" actId="478"/>
+          <ac:spMkLst>
+            <pc:docMk/>
+            <pc:sldMk cId="3703090608" sldId="927"/>
+            <ac:spMk id="23" creationId="{FF005369-730D-5D4E-BF0B-1AC1EC9C597E}"/>
+          </ac:spMkLst>
+        </pc:spChg>
+        <pc:spChg chg="del">
+          <ac:chgData name="Lipani, Aldo" userId="3d811883-7188-4056-86e4-ebeb30c53017" providerId="ADAL" clId="{667C833C-76E4-6248-A772-9C8DA58B4060}" dt="2020-10-03T19:53:06.266" v="2628" actId="478"/>
+          <ac:spMkLst>
+            <pc:docMk/>
+            <pc:sldMk cId="3703090608" sldId="927"/>
+            <ac:spMk id="24" creationId="{EB3DC001-8361-6540-B003-4D86574BA2CF}"/>
+          </ac:spMkLst>
+        </pc:spChg>
+        <pc:spChg chg="del">
+          <ac:chgData name="Lipani, Aldo" userId="3d811883-7188-4056-86e4-ebeb30c53017" providerId="ADAL" clId="{667C833C-76E4-6248-A772-9C8DA58B4060}" dt="2020-10-03T19:53:06.266" v="2628" actId="478"/>
+          <ac:spMkLst>
+            <pc:docMk/>
+            <pc:sldMk cId="3703090608" sldId="927"/>
+            <ac:spMk id="25" creationId="{79C5E43C-B904-E64C-ABF5-7DC327F416CE}"/>
+          </ac:spMkLst>
+        </pc:spChg>
+        <pc:spChg chg="del">
+          <ac:chgData name="Lipani, Aldo" userId="3d811883-7188-4056-86e4-ebeb30c53017" providerId="ADAL" clId="{667C833C-76E4-6248-A772-9C8DA58B4060}" dt="2020-10-03T19:53:06.266" v="2628" actId="478"/>
+          <ac:spMkLst>
+            <pc:docMk/>
+            <pc:sldMk cId="3703090608" sldId="927"/>
+            <ac:spMk id="26" creationId="{0A98E771-D2B2-4240-A16B-D53F7DB810C6}"/>
+          </ac:spMkLst>
+        </pc:spChg>
+        <pc:spChg chg="del">
+          <ac:chgData name="Lipani, Aldo" userId="3d811883-7188-4056-86e4-ebeb30c53017" providerId="ADAL" clId="{667C833C-76E4-6248-A772-9C8DA58B4060}" dt="2020-10-03T19:53:06.266" v="2628" actId="478"/>
+          <ac:spMkLst>
+            <pc:docMk/>
+            <pc:sldMk cId="3703090608" sldId="927"/>
+            <ac:spMk id="27" creationId="{94CE4DEF-4921-6E4F-A87E-C3620A02A5A2}"/>
+          </ac:spMkLst>
+        </pc:spChg>
+        <pc:spChg chg="del">
+          <ac:chgData name="Lipani, Aldo" userId="3d811883-7188-4056-86e4-ebeb30c53017" providerId="ADAL" clId="{667C833C-76E4-6248-A772-9C8DA58B4060}" dt="2020-10-03T19:53:06.266" v="2628" actId="478"/>
+          <ac:spMkLst>
+            <pc:docMk/>
+            <pc:sldMk cId="3703090608" sldId="927"/>
+            <ac:spMk id="28" creationId="{3C6E4BCF-3B62-6643-BCF6-D0E23EDB6DB1}"/>
+          </ac:spMkLst>
+        </pc:spChg>
+        <pc:spChg chg="del">
+          <ac:chgData name="Lipani, Aldo" userId="3d811883-7188-4056-86e4-ebeb30c53017" providerId="ADAL" clId="{667C833C-76E4-6248-A772-9C8DA58B4060}" dt="2020-10-03T19:53:06.266" v="2628" actId="478"/>
+          <ac:spMkLst>
+            <pc:docMk/>
+            <pc:sldMk cId="3703090608" sldId="927"/>
+            <ac:spMk id="29" creationId="{93844DDF-A03E-254E-B78D-14402935E69E}"/>
+          </ac:spMkLst>
+        </pc:spChg>
+        <pc:spChg chg="del">
+          <ac:chgData name="Lipani, Aldo" userId="3d811883-7188-4056-86e4-ebeb30c53017" providerId="ADAL" clId="{667C833C-76E4-6248-A772-9C8DA58B4060}" dt="2020-10-03T19:53:06.266" v="2628" actId="478"/>
+          <ac:spMkLst>
+            <pc:docMk/>
+            <pc:sldMk cId="3703090608" sldId="927"/>
+            <ac:spMk id="30" creationId="{851451E9-F70A-AB43-86B2-BA56FE7504D5}"/>
+          </ac:spMkLst>
+        </pc:spChg>
+        <pc:spChg chg="add mod">
+          <ac:chgData name="Lipani, Aldo" userId="3d811883-7188-4056-86e4-ebeb30c53017" providerId="ADAL" clId="{667C833C-76E4-6248-A772-9C8DA58B4060}" dt="2020-10-03T19:53:07.108" v="2629"/>
+          <ac:spMkLst>
+            <pc:docMk/>
+            <pc:sldMk cId="3703090608" sldId="927"/>
+            <ac:spMk id="33" creationId="{84469E68-8A73-2940-B74C-6447CF4F031A}"/>
+          </ac:spMkLst>
+        </pc:spChg>
+        <pc:spChg chg="add mod">
+          <ac:chgData name="Lipani, Aldo" userId="3d811883-7188-4056-86e4-ebeb30c53017" providerId="ADAL" clId="{667C833C-76E4-6248-A772-9C8DA58B4060}" dt="2020-10-03T19:54:47.724" v="2740" actId="1076"/>
+          <ac:spMkLst>
+            <pc:docMk/>
+            <pc:sldMk cId="3703090608" sldId="927"/>
+            <ac:spMk id="34" creationId="{63F78C3A-D4FE-D743-9C57-7E60F0509297}"/>
+          </ac:spMkLst>
+        </pc:spChg>
+        <pc:spChg chg="add mod">
+          <ac:chgData name="Lipani, Aldo" userId="3d811883-7188-4056-86e4-ebeb30c53017" providerId="ADAL" clId="{667C833C-76E4-6248-A772-9C8DA58B4060}" dt="2020-10-03T19:53:58.674" v="2635" actId="1076"/>
+          <ac:spMkLst>
+            <pc:docMk/>
+            <pc:sldMk cId="3703090608" sldId="927"/>
+            <ac:spMk id="35" creationId="{2EC24E06-FFA7-F84E-9A43-8FEB83CA169A}"/>
+          </ac:spMkLst>
+        </pc:spChg>
+        <pc:spChg chg="add mod">
+          <ac:chgData name="Lipani, Aldo" userId="3d811883-7188-4056-86e4-ebeb30c53017" providerId="ADAL" clId="{667C833C-76E4-6248-A772-9C8DA58B4060}" dt="2020-10-03T19:54:11.837" v="2638" actId="1076"/>
+          <ac:spMkLst>
+            <pc:docMk/>
+            <pc:sldMk cId="3703090608" sldId="927"/>
+            <ac:spMk id="36" creationId="{9311CD2A-A4C9-E340-AB05-0A825EF84BB9}"/>
+          </ac:spMkLst>
+        </pc:spChg>
+        <pc:spChg chg="add mod">
+          <ac:chgData name="Lipani, Aldo" userId="3d811883-7188-4056-86e4-ebeb30c53017" providerId="ADAL" clId="{667C833C-76E4-6248-A772-9C8DA58B4060}" dt="2020-10-03T19:53:07.108" v="2629"/>
+          <ac:spMkLst>
+            <pc:docMk/>
+            <pc:sldMk cId="3703090608" sldId="927"/>
+            <ac:spMk id="39" creationId="{D5197CBC-1150-B44B-BC78-EE3173CA4469}"/>
+          </ac:spMkLst>
+        </pc:spChg>
+        <pc:spChg chg="add mod">
+          <ac:chgData name="Lipani, Aldo" userId="3d811883-7188-4056-86e4-ebeb30c53017" providerId="ADAL" clId="{667C833C-76E4-6248-A772-9C8DA58B4060}" dt="2020-10-03T19:53:07.108" v="2629"/>
+          <ac:spMkLst>
+            <pc:docMk/>
+            <pc:sldMk cId="3703090608" sldId="927"/>
+            <ac:spMk id="40" creationId="{4147DDB1-D1FC-FC49-B553-1B1FC6D06B37}"/>
+          </ac:spMkLst>
+        </pc:spChg>
+        <pc:spChg chg="add mod">
+          <ac:chgData name="Lipani, Aldo" userId="3d811883-7188-4056-86e4-ebeb30c53017" providerId="ADAL" clId="{667C833C-76E4-6248-A772-9C8DA58B4060}" dt="2020-10-03T19:53:07.108" v="2629"/>
+          <ac:spMkLst>
+            <pc:docMk/>
+            <pc:sldMk cId="3703090608" sldId="927"/>
+            <ac:spMk id="41" creationId="{9E635688-6D3C-124F-9787-39794AF12648}"/>
+          </ac:spMkLst>
+        </pc:spChg>
+        <pc:spChg chg="add mod">
+          <ac:chgData name="Lipani, Aldo" userId="3d811883-7188-4056-86e4-ebeb30c53017" providerId="ADAL" clId="{667C833C-76E4-6248-A772-9C8DA58B4060}" dt="2020-10-03T19:53:07.108" v="2629"/>
+          <ac:spMkLst>
+            <pc:docMk/>
+            <pc:sldMk cId="3703090608" sldId="927"/>
+            <ac:spMk id="42" creationId="{9F0867A3-0E9C-D447-9BAF-3BD846A8304B}"/>
+          </ac:spMkLst>
+        </pc:spChg>
+        <pc:spChg chg="add mod">
+          <ac:chgData name="Lipani, Aldo" userId="3d811883-7188-4056-86e4-ebeb30c53017" providerId="ADAL" clId="{667C833C-76E4-6248-A772-9C8DA58B4060}" dt="2020-10-03T19:54:41.467" v="2739" actId="1038"/>
+          <ac:spMkLst>
+            <pc:docMk/>
+            <pc:sldMk cId="3703090608" sldId="927"/>
+            <ac:spMk id="43" creationId="{50361513-DB61-2B4B-83F1-254315A27DEC}"/>
+          </ac:spMkLst>
+        </pc:spChg>
+        <pc:spChg chg="add mod">
+          <ac:chgData name="Lipani, Aldo" userId="3d811883-7188-4056-86e4-ebeb30c53017" providerId="ADAL" clId="{667C833C-76E4-6248-A772-9C8DA58B4060}" dt="2020-10-03T19:54:28.918" v="2680" actId="1037"/>
+          <ac:spMkLst>
+            <pc:docMk/>
+            <pc:sldMk cId="3703090608" sldId="927"/>
+            <ac:spMk id="44" creationId="{C73B231A-1610-464A-9E21-868C8A84C793}"/>
+          </ac:spMkLst>
+        </pc:spChg>
+        <pc:spChg chg="add mod">
+          <ac:chgData name="Lipani, Aldo" userId="3d811883-7188-4056-86e4-ebeb30c53017" providerId="ADAL" clId="{667C833C-76E4-6248-A772-9C8DA58B4060}" dt="2020-10-03T19:54:38.255" v="2738" actId="1038"/>
+          <ac:spMkLst>
+            <pc:docMk/>
+            <pc:sldMk cId="3703090608" sldId="927"/>
+            <ac:spMk id="45" creationId="{1C8209EE-B564-4A42-9AFE-CFE1798367A6}"/>
+          </ac:spMkLst>
+        </pc:spChg>
+        <pc:cxnChg chg="del">
+          <ac:chgData name="Lipani, Aldo" userId="3d811883-7188-4056-86e4-ebeb30c53017" providerId="ADAL" clId="{667C833C-76E4-6248-A772-9C8DA58B4060}" dt="2020-10-03T19:53:06.266" v="2628" actId="478"/>
+          <ac:cxnSpMkLst>
+            <pc:docMk/>
+            <pc:sldMk cId="3703090608" sldId="927"/>
+            <ac:cxnSpMk id="5" creationId="{53230D9B-4A22-EB40-AAAE-CEC422E4D8E4}"/>
+          </ac:cxnSpMkLst>
+        </pc:cxnChg>
+        <pc:cxnChg chg="del">
+          <ac:chgData name="Lipani, Aldo" userId="3d811883-7188-4056-86e4-ebeb30c53017" providerId="ADAL" clId="{667C833C-76E4-6248-A772-9C8DA58B4060}" dt="2020-10-03T19:53:06.266" v="2628" actId="478"/>
+          <ac:cxnSpMkLst>
+            <pc:docMk/>
+            <pc:sldMk cId="3703090608" sldId="927"/>
+            <ac:cxnSpMk id="7" creationId="{96D19A55-D7B7-4847-882B-7F8AB184E302}"/>
+          </ac:cxnSpMkLst>
+        </pc:cxnChg>
+        <pc:cxnChg chg="del">
+          <ac:chgData name="Lipani, Aldo" userId="3d811883-7188-4056-86e4-ebeb30c53017" providerId="ADAL" clId="{667C833C-76E4-6248-A772-9C8DA58B4060}" dt="2020-10-03T19:53:06.266" v="2628" actId="478"/>
+          <ac:cxnSpMkLst>
+            <pc:docMk/>
+            <pc:sldMk cId="3703090608" sldId="927"/>
+            <ac:cxnSpMk id="17" creationId="{F6528DCB-097C-3E42-999E-1A64780C6228}"/>
+          </ac:cxnSpMkLst>
+        </pc:cxnChg>
+        <pc:cxnChg chg="del">
+          <ac:chgData name="Lipani, Aldo" userId="3d811883-7188-4056-86e4-ebeb30c53017" providerId="ADAL" clId="{667C833C-76E4-6248-A772-9C8DA58B4060}" dt="2020-10-03T19:53:06.266" v="2628" actId="478"/>
+          <ac:cxnSpMkLst>
+            <pc:docMk/>
+            <pc:sldMk cId="3703090608" sldId="927"/>
+            <ac:cxnSpMk id="19" creationId="{3AA5E420-2E21-5A46-ABCD-5E3216BCFADC}"/>
+          </ac:cxnSpMkLst>
+        </pc:cxnChg>
+        <pc:cxnChg chg="add mod">
+          <ac:chgData name="Lipani, Aldo" userId="3d811883-7188-4056-86e4-ebeb30c53017" providerId="ADAL" clId="{667C833C-76E4-6248-A772-9C8DA58B4060}" dt="2020-10-03T19:54:06.027" v="2637" actId="14100"/>
+          <ac:cxnSpMkLst>
+            <pc:docMk/>
+            <pc:sldMk cId="3703090608" sldId="927"/>
+            <ac:cxnSpMk id="31" creationId="{2ACF9993-2954-E840-ABF7-EC61321407AE}"/>
+          </ac:cxnSpMkLst>
+        </pc:cxnChg>
+        <pc:cxnChg chg="add mod">
+          <ac:chgData name="Lipani, Aldo" userId="3d811883-7188-4056-86e4-ebeb30c53017" providerId="ADAL" clId="{667C833C-76E4-6248-A772-9C8DA58B4060}" dt="2020-10-03T19:53:42.033" v="2632" actId="14100"/>
+          <ac:cxnSpMkLst>
+            <pc:docMk/>
+            <pc:sldMk cId="3703090608" sldId="927"/>
+            <ac:cxnSpMk id="32" creationId="{8078A654-A085-4E47-A4A9-48391C5BB05D}"/>
+          </ac:cxnSpMkLst>
+        </pc:cxnChg>
+        <pc:cxnChg chg="add mod">
+          <ac:chgData name="Lipani, Aldo" userId="3d811883-7188-4056-86e4-ebeb30c53017" providerId="ADAL" clId="{667C833C-76E4-6248-A772-9C8DA58B4060}" dt="2020-10-03T19:53:07.108" v="2629"/>
+          <ac:cxnSpMkLst>
+            <pc:docMk/>
+            <pc:sldMk cId="3703090608" sldId="927"/>
+            <ac:cxnSpMk id="37" creationId="{D5B0F82D-7C79-4B4E-8654-DE9C7E2127F7}"/>
+          </ac:cxnSpMkLst>
+        </pc:cxnChg>
+        <pc:cxnChg chg="add mod">
+          <ac:chgData name="Lipani, Aldo" userId="3d811883-7188-4056-86e4-ebeb30c53017" providerId="ADAL" clId="{667C833C-76E4-6248-A772-9C8DA58B4060}" dt="2020-10-03T19:53:07.108" v="2629"/>
+          <ac:cxnSpMkLst>
+            <pc:docMk/>
+            <pc:sldMk cId="3703090608" sldId="927"/>
+            <ac:cxnSpMk id="38" creationId="{2C2360FA-DD48-8345-95F6-EEDB83B200BF}"/>
+          </ac:cxnSpMkLst>
+        </pc:cxnChg>
+      </pc:sldChg>
+      <pc:sldChg chg="add del">
+        <pc:chgData name="Lipani, Aldo" userId="3d811883-7188-4056-86e4-ebeb30c53017" providerId="ADAL" clId="{667C833C-76E4-6248-A772-9C8DA58B4060}" dt="2020-10-03T20:01:16.050" v="2984" actId="2696"/>
+        <pc:sldMkLst>
+          <pc:docMk/>
+          <pc:sldMk cId="3298382777" sldId="928"/>
+        </pc:sldMkLst>
+      </pc:sldChg>
+      <pc:sldChg chg="modSp add mod ord">
+        <pc:chgData name="Lipani, Aldo" userId="3d811883-7188-4056-86e4-ebeb30c53017" providerId="ADAL" clId="{667C833C-76E4-6248-A772-9C8DA58B4060}" dt="2020-10-03T20:55:58.534" v="3236" actId="20577"/>
+        <pc:sldMkLst>
+          <pc:docMk/>
+          <pc:sldMk cId="3742423741" sldId="928"/>
+        </pc:sldMkLst>
+        <pc:spChg chg="mod">
+          <ac:chgData name="Lipani, Aldo" userId="3d811883-7188-4056-86e4-ebeb30c53017" providerId="ADAL" clId="{667C833C-76E4-6248-A772-9C8DA58B4060}" dt="2020-10-03T20:55:58.534" v="3236" actId="20577"/>
+          <ac:spMkLst>
+            <pc:docMk/>
+            <pc:sldMk cId="3742423741" sldId="928"/>
+            <ac:spMk id="6" creationId="{566B908A-85C8-D84C-A24B-BA8943763699}"/>
           </ac:spMkLst>
         </pc:spChg>
       </pc:sldChg>
@@ -4093,7 +4093,7 @@
           <a:p>
             <a:fld id="{50C96C19-BA70-3844-814A-AB1DB87EE19E}" type="datetimeFigureOut">
               <a:rPr kumimoji="1" lang="zh-CN" altLang="en-US" smtClean="0"/>
-              <a:t>2020/10/3</a:t>
+              <a:t>2021/10/30</a:t>
             </a:fld>
             <a:endParaRPr kumimoji="1" lang="zh-CN" altLang="en-US"/>
           </a:p>
@@ -4275,7 +4275,7 @@
               <a:pPr>
                 <a:defRPr/>
               </a:pPr>
-              <a:t>10/3/20</a:t>
+              <a:t>10/30/21</a:t>
             </a:fld>
             <a:endParaRPr lang="en-US" altLang="zh-CN"/>
           </a:p>
@@ -8945,14 +8945,14 @@
           </a:ln>
           <a:extLst>
             <a:ext uri="{909E8E84-426E-40dd-AFC4-6F175D3DCCD1}">
-              <a14:hiddenFill xmlns="" xmlns:a14="http://schemas.microsoft.com/office/drawing/2010/main">
+              <a14:hiddenFill xmlns:a14="http://schemas.microsoft.com/office/drawing/2010/main" xmlns="">
                 <a:solidFill>
                   <a:srgbClr val="FFFFFF"/>
                 </a:solidFill>
               </a14:hiddenFill>
             </a:ext>
             <a:ext uri="{91240B29-F687-4f45-9708-019B960494DF}">
-              <a14:hiddenLine xmlns="" xmlns:a14="http://schemas.microsoft.com/office/drawing/2010/main" w="9525">
+              <a14:hiddenLine xmlns:a14="http://schemas.microsoft.com/office/drawing/2010/main" xmlns="" w="9525">
                 <a:solidFill>
                   <a:srgbClr val="000000"/>
                 </a:solidFill>
@@ -10803,14 +10803,14 @@
           </a:ln>
           <a:extLst>
             <a:ext uri="{909E8E84-426E-40dd-AFC4-6F175D3DCCD1}">
-              <a14:hiddenFill xmlns="" xmlns:a14="http://schemas.microsoft.com/office/drawing/2010/main">
+              <a14:hiddenFill xmlns:a14="http://schemas.microsoft.com/office/drawing/2010/main" xmlns="">
                 <a:solidFill>
                   <a:srgbClr val="FFFFFF"/>
                 </a:solidFill>
               </a14:hiddenFill>
             </a:ext>
             <a:ext uri="{91240B29-F687-4f45-9708-019B960494DF}">
-              <a14:hiddenLine xmlns="" xmlns:a14="http://schemas.microsoft.com/office/drawing/2010/main" w="9525">
+              <a14:hiddenLine xmlns:a14="http://schemas.microsoft.com/office/drawing/2010/main" xmlns="" w="9525">
                 <a:solidFill>
                   <a:srgbClr val="000000"/>
                 </a:solidFill>
@@ -10846,17 +10846,17 @@
           </a:ln>
           <a:extLst>
             <a:ext uri="{FAA26D3D-D897-4be2-8F04-BA451C77F1D7}">
-              <ma14:placeholderFlag xmlns:ma14="http://schemas.microsoft.com/office/mac/drawingml/2011/main" xmlns="" val="1"/>
+              <ma14:placeholderFlag xmlns="" xmlns:ma14="http://schemas.microsoft.com/office/mac/drawingml/2011/main" val="1"/>
             </a:ext>
             <a:ext uri="{909E8E84-426E-40dd-AFC4-6F175D3DCCD1}">
-              <a14:hiddenFill xmlns="" xmlns:a14="http://schemas.microsoft.com/office/drawing/2010/main">
+              <a14:hiddenFill xmlns:a14="http://schemas.microsoft.com/office/drawing/2010/main" xmlns="">
                 <a:solidFill>
                   <a:srgbClr val="FFFFFF"/>
                 </a:solidFill>
               </a14:hiddenFill>
             </a:ext>
             <a:ext uri="{91240B29-F687-4f45-9708-019B960494DF}">
-              <a14:hiddenLine xmlns="" xmlns:a14="http://schemas.microsoft.com/office/drawing/2010/main" w="9525">
+              <a14:hiddenLine xmlns:a14="http://schemas.microsoft.com/office/drawing/2010/main" xmlns="" w="9525">
                 <a:solidFill>
                   <a:srgbClr val="000000"/>
                 </a:solidFill>
@@ -10907,17 +10907,17 @@
           </a:ln>
           <a:extLst>
             <a:ext uri="{FAA26D3D-D897-4be2-8F04-BA451C77F1D7}">
-              <ma14:placeholderFlag xmlns:ma14="http://schemas.microsoft.com/office/mac/drawingml/2011/main" xmlns="" val="1"/>
+              <ma14:placeholderFlag xmlns="" xmlns:ma14="http://schemas.microsoft.com/office/mac/drawingml/2011/main" val="1"/>
             </a:ext>
             <a:ext uri="{909E8E84-426E-40dd-AFC4-6F175D3DCCD1}">
-              <a14:hiddenFill xmlns="" xmlns:a14="http://schemas.microsoft.com/office/drawing/2010/main">
+              <a14:hiddenFill xmlns:a14="http://schemas.microsoft.com/office/drawing/2010/main" xmlns="">
                 <a:solidFill>
                   <a:srgbClr val="FFFFFF"/>
                 </a:solidFill>
               </a14:hiddenFill>
             </a:ext>
             <a:ext uri="{91240B29-F687-4f45-9708-019B960494DF}">
-              <a14:hiddenLine xmlns="" xmlns:a14="http://schemas.microsoft.com/office/drawing/2010/main" w="9525">
+              <a14:hiddenLine xmlns:a14="http://schemas.microsoft.com/office/drawing/2010/main" xmlns="" w="9525">
                 <a:solidFill>
                   <a:srgbClr val="000000"/>
                 </a:solidFill>
@@ -11030,14 +11030,14 @@
           </a:ln>
           <a:extLst>
             <a:ext uri="{909E8E84-426E-40dd-AFC4-6F175D3DCCD1}">
-              <a14:hiddenFill xmlns="" xmlns:a14="http://schemas.microsoft.com/office/drawing/2010/main">
+              <a14:hiddenFill xmlns:a14="http://schemas.microsoft.com/office/drawing/2010/main" xmlns="">
                 <a:solidFill>
                   <a:srgbClr val="FFFFFF"/>
                 </a:solidFill>
               </a14:hiddenFill>
             </a:ext>
             <a:ext uri="{91240B29-F687-4f45-9708-019B960494DF}">
-              <a14:hiddenLine xmlns="" xmlns:a14="http://schemas.microsoft.com/office/drawing/2010/main" w="9525">
+              <a14:hiddenLine xmlns:a14="http://schemas.microsoft.com/office/drawing/2010/main" xmlns="" w="9525">
                 <a:solidFill>
                   <a:srgbClr val="000000"/>
                 </a:solidFill>
@@ -11598,7 +11598,7 @@
           <a:noFill/>
           <a:extLst>
             <a:ext uri="{909E8E84-426E-40dd-AFC4-6F175D3DCCD1}">
-              <a14:hiddenFill xmlns="" xmlns:a14="http://schemas.microsoft.com/office/drawing/2010/main">
+              <a14:hiddenFill xmlns:a14="http://schemas.microsoft.com/office/drawing/2010/main" xmlns="">
                 <a:solidFill>
                   <a:srgbClr val="FFFFFF"/>
                 </a:solidFill>
@@ -19291,17 +19291,17 @@
           </a:ln>
           <a:extLst>
             <a:ext uri="{FAA26D3D-D897-4be2-8F04-BA451C77F1D7}">
-              <ma14:placeholderFlag xmlns:ma14="http://schemas.microsoft.com/office/mac/drawingml/2011/main" xmlns="" val="1"/>
+              <ma14:placeholderFlag xmlns="" xmlns:ma14="http://schemas.microsoft.com/office/mac/drawingml/2011/main" val="1"/>
             </a:ext>
             <a:ext uri="{909E8E84-426E-40dd-AFC4-6F175D3DCCD1}">
-              <a14:hiddenFill xmlns="" xmlns:a14="http://schemas.microsoft.com/office/drawing/2010/main">
+              <a14:hiddenFill xmlns:a14="http://schemas.microsoft.com/office/drawing/2010/main" xmlns="">
                 <a:solidFill>
                   <a:srgbClr val="FFFFFF"/>
                 </a:solidFill>
               </a14:hiddenFill>
             </a:ext>
             <a:ext uri="{91240B29-F687-4f45-9708-019B960494DF}">
-              <a14:hiddenLine xmlns="" xmlns:a14="http://schemas.microsoft.com/office/drawing/2010/main" w="9525">
+              <a14:hiddenLine xmlns:a14="http://schemas.microsoft.com/office/drawing/2010/main" xmlns="" w="9525">
                 <a:solidFill>
                   <a:srgbClr val="000000"/>
                 </a:solidFill>
@@ -29187,8 +29187,8 @@
           </a:p>
         </p:txBody>
       </p:sp>
-      <mc:AlternateContent xmlns:mc="http://schemas.openxmlformats.org/markup-compatibility/2006">
-        <mc:Choice xmlns:a14="http://schemas.microsoft.com/office/drawing/2010/main" Requires="a14">
+      <mc:AlternateContent xmlns:mc="http://schemas.openxmlformats.org/markup-compatibility/2006" xmlns:a14="http://schemas.microsoft.com/office/drawing/2010/main">
+        <mc:Choice Requires="a14">
           <p:sp>
             <p:nvSpPr>
               <p:cNvPr id="3" name="Content Placeholder 2">
@@ -29679,7 +29679,7 @@
             </p:txBody>
           </p:sp>
         </mc:Choice>
-        <mc:Fallback>
+        <mc:Fallback xmlns="">
           <p:sp>
             <p:nvSpPr>
               <p:cNvPr id="3" name="Content Placeholder 2">
@@ -31247,17 +31247,17 @@
           </a:ln>
           <a:extLst>
             <a:ext uri="{FAA26D3D-D897-4be2-8F04-BA451C77F1D7}">
-              <ma14:placeholderFlag xmlns:ma14="http://schemas.microsoft.com/office/mac/drawingml/2011/main" xmlns="" val="1"/>
+              <ma14:placeholderFlag xmlns="" xmlns:ma14="http://schemas.microsoft.com/office/mac/drawingml/2011/main" val="1"/>
             </a:ext>
             <a:ext uri="{909E8E84-426E-40dd-AFC4-6F175D3DCCD1}">
-              <a14:hiddenFill xmlns="" xmlns:a14="http://schemas.microsoft.com/office/drawing/2010/main">
+              <a14:hiddenFill xmlns:a14="http://schemas.microsoft.com/office/drawing/2010/main" xmlns="">
                 <a:solidFill>
                   <a:srgbClr val="FFFFFF"/>
                 </a:solidFill>
               </a14:hiddenFill>
             </a:ext>
             <a:ext uri="{91240B29-F687-4f45-9708-019B960494DF}">
-              <a14:hiddenLine xmlns="" xmlns:a14="http://schemas.microsoft.com/office/drawing/2010/main" w="9525">
+              <a14:hiddenLine xmlns:a14="http://schemas.microsoft.com/office/drawing/2010/main" xmlns="" w="9525">
                 <a:solidFill>
                   <a:srgbClr val="000000"/>
                 </a:solidFill>
@@ -31491,7 +31491,7 @@
                 </a:pPr>
                 <a:r>
                   <a:rPr lang="en-US" sz="1600" dirty="0"/>
-                  <a:t>If the non vertex points of the two lines are one above and one below the ray, then you should count this crossing only ones, otherwise you can count them twice or none.</a:t>
+                  <a:t>If the non vertex points of the two lines are one above and one below the ray, then you should count this crossing only once, otherwise you can count them twice or none.</a:t>
                 </a:r>
               </a:p>
               <a:p>

</xml_diff>

<commit_message>
fix: 1st assignment slides
</commit_message>
<xml_diff>
--- a/5 - Week/5 - Geometry with Python.pptx
+++ b/5 - Week/5 - Geometry with Python.pptx
@@ -4093,7 +4093,7 @@
           <a:p>
             <a:fld id="{50C96C19-BA70-3844-814A-AB1DB87EE19E}" type="datetimeFigureOut">
               <a:rPr kumimoji="1" lang="zh-CN" altLang="en-US" smtClean="0"/>
-              <a:t>2021/10/30</a:t>
+              <a:t>2021/11/1</a:t>
             </a:fld>
             <a:endParaRPr kumimoji="1" lang="zh-CN" altLang="en-US"/>
           </a:p>
@@ -4275,7 +4275,7 @@
               <a:pPr>
                 <a:defRPr/>
               </a:pPr>
-              <a:t>10/30/21</a:t>
+              <a:t>11/1/21</a:t>
             </a:fld>
             <a:endParaRPr lang="en-US" altLang="zh-CN"/>
           </a:p>
@@ -8945,14 +8945,14 @@
           </a:ln>
           <a:extLst>
             <a:ext uri="{909E8E84-426E-40dd-AFC4-6F175D3DCCD1}">
-              <a14:hiddenFill xmlns:a14="http://schemas.microsoft.com/office/drawing/2010/main" xmlns="">
+              <a14:hiddenFill xmlns="" xmlns:a14="http://schemas.microsoft.com/office/drawing/2010/main">
                 <a:solidFill>
                   <a:srgbClr val="FFFFFF"/>
                 </a:solidFill>
               </a14:hiddenFill>
             </a:ext>
             <a:ext uri="{91240B29-F687-4f45-9708-019B960494DF}">
-              <a14:hiddenLine xmlns:a14="http://schemas.microsoft.com/office/drawing/2010/main" xmlns="" w="9525">
+              <a14:hiddenLine xmlns="" xmlns:a14="http://schemas.microsoft.com/office/drawing/2010/main" w="9525">
                 <a:solidFill>
                   <a:srgbClr val="000000"/>
                 </a:solidFill>
@@ -10803,14 +10803,14 @@
           </a:ln>
           <a:extLst>
             <a:ext uri="{909E8E84-426E-40dd-AFC4-6F175D3DCCD1}">
-              <a14:hiddenFill xmlns:a14="http://schemas.microsoft.com/office/drawing/2010/main" xmlns="">
+              <a14:hiddenFill xmlns="" xmlns:a14="http://schemas.microsoft.com/office/drawing/2010/main">
                 <a:solidFill>
                   <a:srgbClr val="FFFFFF"/>
                 </a:solidFill>
               </a14:hiddenFill>
             </a:ext>
             <a:ext uri="{91240B29-F687-4f45-9708-019B960494DF}">
-              <a14:hiddenLine xmlns:a14="http://schemas.microsoft.com/office/drawing/2010/main" xmlns="" w="9525">
+              <a14:hiddenLine xmlns="" xmlns:a14="http://schemas.microsoft.com/office/drawing/2010/main" w="9525">
                 <a:solidFill>
                   <a:srgbClr val="000000"/>
                 </a:solidFill>
@@ -10846,17 +10846,17 @@
           </a:ln>
           <a:extLst>
             <a:ext uri="{FAA26D3D-D897-4be2-8F04-BA451C77F1D7}">
-              <ma14:placeholderFlag xmlns="" xmlns:ma14="http://schemas.microsoft.com/office/mac/drawingml/2011/main" val="1"/>
+              <ma14:placeholderFlag xmlns:ma14="http://schemas.microsoft.com/office/mac/drawingml/2011/main" xmlns="" val="1"/>
             </a:ext>
             <a:ext uri="{909E8E84-426E-40dd-AFC4-6F175D3DCCD1}">
-              <a14:hiddenFill xmlns:a14="http://schemas.microsoft.com/office/drawing/2010/main" xmlns="">
+              <a14:hiddenFill xmlns="" xmlns:a14="http://schemas.microsoft.com/office/drawing/2010/main">
                 <a:solidFill>
                   <a:srgbClr val="FFFFFF"/>
                 </a:solidFill>
               </a14:hiddenFill>
             </a:ext>
             <a:ext uri="{91240B29-F687-4f45-9708-019B960494DF}">
-              <a14:hiddenLine xmlns:a14="http://schemas.microsoft.com/office/drawing/2010/main" xmlns="" w="9525">
+              <a14:hiddenLine xmlns="" xmlns:a14="http://schemas.microsoft.com/office/drawing/2010/main" w="9525">
                 <a:solidFill>
                   <a:srgbClr val="000000"/>
                 </a:solidFill>
@@ -10907,17 +10907,17 @@
           </a:ln>
           <a:extLst>
             <a:ext uri="{FAA26D3D-D897-4be2-8F04-BA451C77F1D7}">
-              <ma14:placeholderFlag xmlns="" xmlns:ma14="http://schemas.microsoft.com/office/mac/drawingml/2011/main" val="1"/>
+              <ma14:placeholderFlag xmlns:ma14="http://schemas.microsoft.com/office/mac/drawingml/2011/main" xmlns="" val="1"/>
             </a:ext>
             <a:ext uri="{909E8E84-426E-40dd-AFC4-6F175D3DCCD1}">
-              <a14:hiddenFill xmlns:a14="http://schemas.microsoft.com/office/drawing/2010/main" xmlns="">
+              <a14:hiddenFill xmlns="" xmlns:a14="http://schemas.microsoft.com/office/drawing/2010/main">
                 <a:solidFill>
                   <a:srgbClr val="FFFFFF"/>
                 </a:solidFill>
               </a14:hiddenFill>
             </a:ext>
             <a:ext uri="{91240B29-F687-4f45-9708-019B960494DF}">
-              <a14:hiddenLine xmlns:a14="http://schemas.microsoft.com/office/drawing/2010/main" xmlns="" w="9525">
+              <a14:hiddenLine xmlns="" xmlns:a14="http://schemas.microsoft.com/office/drawing/2010/main" w="9525">
                 <a:solidFill>
                   <a:srgbClr val="000000"/>
                 </a:solidFill>
@@ -11030,14 +11030,14 @@
           </a:ln>
           <a:extLst>
             <a:ext uri="{909E8E84-426E-40dd-AFC4-6F175D3DCCD1}">
-              <a14:hiddenFill xmlns:a14="http://schemas.microsoft.com/office/drawing/2010/main" xmlns="">
+              <a14:hiddenFill xmlns="" xmlns:a14="http://schemas.microsoft.com/office/drawing/2010/main">
                 <a:solidFill>
                   <a:srgbClr val="FFFFFF"/>
                 </a:solidFill>
               </a14:hiddenFill>
             </a:ext>
             <a:ext uri="{91240B29-F687-4f45-9708-019B960494DF}">
-              <a14:hiddenLine xmlns:a14="http://schemas.microsoft.com/office/drawing/2010/main" xmlns="" w="9525">
+              <a14:hiddenLine xmlns="" xmlns:a14="http://schemas.microsoft.com/office/drawing/2010/main" w="9525">
                 <a:solidFill>
                   <a:srgbClr val="000000"/>
                 </a:solidFill>
@@ -11598,7 +11598,7 @@
           <a:noFill/>
           <a:extLst>
             <a:ext uri="{909E8E84-426E-40dd-AFC4-6F175D3DCCD1}">
-              <a14:hiddenFill xmlns:a14="http://schemas.microsoft.com/office/drawing/2010/main" xmlns="">
+              <a14:hiddenFill xmlns="" xmlns:a14="http://schemas.microsoft.com/office/drawing/2010/main">
                 <a:solidFill>
                   <a:srgbClr val="FFFFFF"/>
                 </a:solidFill>
@@ -19291,17 +19291,17 @@
           </a:ln>
           <a:extLst>
             <a:ext uri="{FAA26D3D-D897-4be2-8F04-BA451C77F1D7}">
-              <ma14:placeholderFlag xmlns="" xmlns:ma14="http://schemas.microsoft.com/office/mac/drawingml/2011/main" val="1"/>
+              <ma14:placeholderFlag xmlns:ma14="http://schemas.microsoft.com/office/mac/drawingml/2011/main" xmlns="" val="1"/>
             </a:ext>
             <a:ext uri="{909E8E84-426E-40dd-AFC4-6F175D3DCCD1}">
-              <a14:hiddenFill xmlns:a14="http://schemas.microsoft.com/office/drawing/2010/main" xmlns="">
+              <a14:hiddenFill xmlns="" xmlns:a14="http://schemas.microsoft.com/office/drawing/2010/main">
                 <a:solidFill>
                   <a:srgbClr val="FFFFFF"/>
                 </a:solidFill>
               </a14:hiddenFill>
             </a:ext>
             <a:ext uri="{91240B29-F687-4f45-9708-019B960494DF}">
-              <a14:hiddenLine xmlns:a14="http://schemas.microsoft.com/office/drawing/2010/main" xmlns="" w="9525">
+              <a14:hiddenLine xmlns="" xmlns:a14="http://schemas.microsoft.com/office/drawing/2010/main" w="9525">
                 <a:solidFill>
                   <a:srgbClr val="000000"/>
                 </a:solidFill>
@@ -31247,17 +31247,17 @@
           </a:ln>
           <a:extLst>
             <a:ext uri="{FAA26D3D-D897-4be2-8F04-BA451C77F1D7}">
-              <ma14:placeholderFlag xmlns="" xmlns:ma14="http://schemas.microsoft.com/office/mac/drawingml/2011/main" val="1"/>
+              <ma14:placeholderFlag xmlns:ma14="http://schemas.microsoft.com/office/mac/drawingml/2011/main" xmlns="" val="1"/>
             </a:ext>
             <a:ext uri="{909E8E84-426E-40dd-AFC4-6F175D3DCCD1}">
-              <a14:hiddenFill xmlns:a14="http://schemas.microsoft.com/office/drawing/2010/main" xmlns="">
+              <a14:hiddenFill xmlns="" xmlns:a14="http://schemas.microsoft.com/office/drawing/2010/main">
                 <a:solidFill>
                   <a:srgbClr val="FFFFFF"/>
                 </a:solidFill>
               </a14:hiddenFill>
             </a:ext>
             <a:ext uri="{91240B29-F687-4f45-9708-019B960494DF}">
-              <a14:hiddenLine xmlns:a14="http://schemas.microsoft.com/office/drawing/2010/main" xmlns="" w="9525">
+              <a14:hiddenLine xmlns="" xmlns:a14="http://schemas.microsoft.com/office/drawing/2010/main" w="9525">
                 <a:solidFill>
                   <a:srgbClr val="000000"/>
                 </a:solidFill>
@@ -31362,8 +31362,8 @@
           </a:p>
         </p:txBody>
       </p:sp>
-      <mc:AlternateContent xmlns:mc="http://schemas.openxmlformats.org/markup-compatibility/2006">
-        <mc:Choice xmlns:a14="http://schemas.microsoft.com/office/drawing/2010/main" Requires="a14">
+      <mc:AlternateContent xmlns:mc="http://schemas.openxmlformats.org/markup-compatibility/2006" xmlns:a14="http://schemas.microsoft.com/office/drawing/2010/main">
+        <mc:Choice Requires="a14">
           <p:sp>
             <p:nvSpPr>
               <p:cNvPr id="6" name="Content Placeholder 5">
@@ -31561,7 +31561,7 @@
             </p:txBody>
           </p:sp>
         </mc:Choice>
-        <mc:Fallback>
+        <mc:Fallback xmlns="">
           <p:sp>
             <p:nvSpPr>
               <p:cNvPr id="6" name="Content Placeholder 5">
@@ -36598,15 +36598,7 @@
             </a:r>
             <a:r>
               <a:rPr lang="en-US" dirty="0"/>
-              <a:t> by inviting me as a collaborator (</a:t>
-            </a:r>
-            <a:r>
-              <a:rPr lang="en-US" dirty="0" err="1"/>
-              <a:t>aldolipani</a:t>
-            </a:r>
-            <a:r>
-              <a:rPr lang="en-US" dirty="0"/>
-              <a:t>).</a:t>
+              <a:t>.</a:t>
             </a:r>
           </a:p>
           <a:p>
@@ -36771,36 +36763,6 @@
           </a:p>
         </p:txBody>
       </p:sp>
-      <p:pic>
-        <p:nvPicPr>
-          <p:cNvPr id="2" name="Picture 1">
-            <a:extLst>
-              <a:ext uri="{FF2B5EF4-FFF2-40B4-BE49-F238E27FC236}">
-                <a16:creationId xmlns:a16="http://schemas.microsoft.com/office/drawing/2014/main" id="{E7357855-0CCB-D040-A7F4-498A73F51159}"/>
-              </a:ext>
-            </a:extLst>
-          </p:cNvPr>
-          <p:cNvPicPr>
-            <a:picLocks noChangeAspect="1"/>
-          </p:cNvPicPr>
-          <p:nvPr/>
-        </p:nvPicPr>
-        <p:blipFill>
-          <a:blip r:embed="rId2"/>
-          <a:stretch>
-            <a:fillRect/>
-          </a:stretch>
-        </p:blipFill>
-        <p:spPr>
-          <a:xfrm>
-            <a:off x="345860" y="1340768"/>
-            <a:ext cx="6283244" cy="3566595"/>
-          </a:xfrm>
-          <a:prstGeom prst="rect">
-            <a:avLst/>
-          </a:prstGeom>
-        </p:spPr>
-      </p:pic>
       <p:sp>
         <p:nvSpPr>
           <p:cNvPr id="5" name="Footer Placeholder 2">
@@ -36836,6 +36798,36 @@
           </a:p>
         </p:txBody>
       </p:sp>
+      <p:pic>
+        <p:nvPicPr>
+          <p:cNvPr id="7" name="Picture 6">
+            <a:extLst>
+              <a:ext uri="{FF2B5EF4-FFF2-40B4-BE49-F238E27FC236}">
+                <a16:creationId xmlns:a16="http://schemas.microsoft.com/office/drawing/2014/main" id="{D3178BC4-5B28-AF45-AB03-E46EC3B2C698}"/>
+              </a:ext>
+            </a:extLst>
+          </p:cNvPr>
+          <p:cNvPicPr>
+            <a:picLocks noChangeAspect="1"/>
+          </p:cNvPicPr>
+          <p:nvPr/>
+        </p:nvPicPr>
+        <p:blipFill>
+          <a:blip r:embed="rId2"/>
+          <a:stretch>
+            <a:fillRect/>
+          </a:stretch>
+        </p:blipFill>
+        <p:spPr>
+          <a:xfrm>
+            <a:off x="395536" y="1307059"/>
+            <a:ext cx="7092280" cy="4006393"/>
+          </a:xfrm>
+          <a:prstGeom prst="rect">
+            <a:avLst/>
+          </a:prstGeom>
+        </p:spPr>
+      </p:pic>
     </p:spTree>
     <p:extLst>
       <p:ext uri="{BB962C8B-B14F-4D97-AF65-F5344CB8AC3E}">

</xml_diff>